<commit_message>
draft slides for presentation
</commit_message>
<xml_diff>
--- a/ProjectPresentation/EntityAnnotation.pptx
+++ b/ProjectPresentation/EntityAnnotation.pptx
@@ -5,13 +5,21 @@
     <p:sldMasterId id="2147483660" r:id="rId1"/>
   </p:sldMasterIdLst>
   <p:notesMasterIdLst>
-    <p:notesMasterId r:id="rId6"/>
+    <p:notesMasterId r:id="rId14"/>
   </p:notesMasterIdLst>
   <p:sldIdLst>
     <p:sldId id="259" r:id="rId2"/>
     <p:sldId id="284" r:id="rId3"/>
     <p:sldId id="258" r:id="rId4"/>
     <p:sldId id="283" r:id="rId5"/>
+    <p:sldId id="290" r:id="rId6"/>
+    <p:sldId id="286" r:id="rId7"/>
+    <p:sldId id="291" r:id="rId8"/>
+    <p:sldId id="285" r:id="rId9"/>
+    <p:sldId id="289" r:id="rId10"/>
+    <p:sldId id="292" r:id="rId11"/>
+    <p:sldId id="287" r:id="rId12"/>
+    <p:sldId id="288" r:id="rId13"/>
   </p:sldIdLst>
   <p:sldSz cx="12192000" cy="6858000"/>
   <p:notesSz cx="6858000" cy="9144000"/>
@@ -112,7 +120,7 @@
   </p:defaultTextStyle>
   <p:extLst>
     <p:ext uri="{EFAFB233-063F-42B5-8137-9DF3F51BA10A}">
-      <p15:sldGuideLst xmlns:p15="http://schemas.microsoft.com/office/powerpoint/2012/main"/>
+      <p15:sldGuideLst xmlns:p15="http://schemas.microsoft.com/office/powerpoint/2012/main" xmlns=""/>
     </p:ext>
   </p:extLst>
 </p:presentation>
@@ -200,7 +208,7 @@
           <a:p>
             <a:fld id="{A8D8494C-AE34-42CB-89A1-EF65868C4C6A}" type="datetimeFigureOut">
               <a:rPr lang="en-GB" smtClean="0"/>
-              <a:t>02/12/2016</a:t>
+              <a:t>03/12/2016</a:t>
             </a:fld>
             <a:endParaRPr lang="en-GB"/>
           </a:p>
@@ -359,7 +367,7 @@
           <a:p>
             <a:fld id="{6B56D088-27D1-433A-A9A9-E30AD3E13E16}" type="slidenum">
               <a:rPr lang="en-GB" smtClean="0"/>
-              <a:t>‹Nr.›</a:t>
+              <a:t>‹#›</a:t>
             </a:fld>
             <a:endParaRPr lang="en-GB"/>
           </a:p>
@@ -1312,13 +1320,8 @@
             </a:pPr>
             <a:r>
               <a:rPr lang="en-US" dirty="0"/>
-              <a:t>Result returned to CE </a:t>
-            </a:r>
-            <a:r>
-              <a:rPr lang="en-US"/>
-              <a:t>and visualized</a:t>
-            </a:r>
-            <a:endParaRPr lang="en-US" dirty="0"/>
+              <a:t>Result returned to CE and visualized</a:t>
+            </a:r>
           </a:p>
           <a:p>
             <a:endParaRPr lang="de-DE" dirty="0"/>
@@ -1352,6 +1355,290 @@
     <p:extLst>
       <p:ext uri="{BB962C8B-B14F-4D97-AF65-F5344CB8AC3E}">
         <p14:creationId xmlns:p14="http://schemas.microsoft.com/office/powerpoint/2010/main" val="852633847"/>
+      </p:ext>
+    </p:extLst>
+  </p:cSld>
+  <p:clrMapOvr>
+    <a:masterClrMapping/>
+  </p:clrMapOvr>
+</p:notes>
+</file>
+
+<file path=ppt/notesSlides/notesSlide5.xml><?xml version="1.0" encoding="utf-8"?>
+<p:notes xmlns:a="http://schemas.openxmlformats.org/drawingml/2006/main" xmlns:r="http://schemas.openxmlformats.org/officeDocument/2006/relationships" xmlns:p="http://schemas.openxmlformats.org/presentationml/2006/main">
+  <p:cSld>
+    <p:spTree>
+      <p:nvGrpSpPr>
+        <p:cNvPr id="1" name=""/>
+        <p:cNvGrpSpPr/>
+        <p:nvPr/>
+      </p:nvGrpSpPr>
+      <p:grpSpPr>
+        <a:xfrm>
+          <a:off x="0" y="0"/>
+          <a:ext cx="0" cy="0"/>
+          <a:chOff x="0" y="0"/>
+          <a:chExt cx="0" cy="0"/>
+        </a:xfrm>
+      </p:grpSpPr>
+      <p:sp>
+        <p:nvSpPr>
+          <p:cNvPr id="2" name="Slide Image Placeholder 1"/>
+          <p:cNvSpPr>
+            <a:spLocks noGrp="1" noRot="1" noChangeAspect="1"/>
+          </p:cNvSpPr>
+          <p:nvPr>
+            <p:ph type="sldImg"/>
+          </p:nvPr>
+        </p:nvSpPr>
+        <p:spPr/>
+      </p:sp>
+      <p:sp>
+        <p:nvSpPr>
+          <p:cNvPr id="3" name="Notes Placeholder 2"/>
+          <p:cNvSpPr>
+            <a:spLocks noGrp="1"/>
+          </p:cNvSpPr>
+          <p:nvPr>
+            <p:ph type="body" idx="1"/>
+          </p:nvPr>
+        </p:nvSpPr>
+        <p:spPr/>
+        <p:txBody>
+          <a:bodyPr/>
+          <a:lstStyle/>
+          <a:p>
+            <a:r>
+              <a:rPr lang="en-GB" dirty="0" smtClean="0"/>
+              <a:t>Demo script:</a:t>
+            </a:r>
+          </a:p>
+          <a:p>
+            <a:r>
+              <a:rPr lang="en-GB" dirty="0" smtClean="0"/>
+              <a:t>User</a:t>
+            </a:r>
+            <a:r>
+              <a:rPr lang="en-GB" baseline="0" dirty="0" smtClean="0"/>
+              <a:t> visits his favourite website (Spiegel, </a:t>
+            </a:r>
+            <a:r>
+              <a:rPr lang="en-GB" baseline="0" dirty="0" err="1" smtClean="0"/>
+              <a:t>bbc</a:t>
+            </a:r>
+            <a:r>
+              <a:rPr lang="en-GB" baseline="0" dirty="0" smtClean="0"/>
+              <a:t>, CNN)</a:t>
+            </a:r>
+          </a:p>
+          <a:p>
+            <a:r>
+              <a:rPr lang="en-GB" baseline="0" dirty="0" smtClean="0"/>
+              <a:t>Reads an article about foreign politics: Trump is filling </a:t>
+            </a:r>
+            <a:r>
+              <a:rPr lang="en-GB" baseline="0" smtClean="0"/>
+              <a:t>his cabinet (example: http://www.bbc.com/news/world-us-canada-38168382) </a:t>
+            </a:r>
+            <a:endParaRPr lang="en-GB" baseline="0" dirty="0" smtClean="0"/>
+          </a:p>
+          <a:p>
+            <a:r>
+              <a:rPr lang="en-GB" baseline="0" dirty="0" smtClean="0"/>
+              <a:t>Now Trump obviously he knows, but who is this other person that is mentioned here? </a:t>
+            </a:r>
+          </a:p>
+          <a:p>
+            <a:pPr marL="171450" indent="-171450">
+              <a:buFont typeface="Wingdings" pitchFamily="2" charset="2"/>
+              <a:buChar char="è"/>
+            </a:pPr>
+            <a:r>
+              <a:rPr lang="en-GB" baseline="0" dirty="0" smtClean="0">
+                <a:sym typeface="Wingdings" panose="05000000000000000000" pitchFamily="2" charset="2"/>
+              </a:rPr>
+              <a:t>Select the text and click the button!</a:t>
+            </a:r>
+          </a:p>
+          <a:p>
+            <a:pPr marL="0" indent="0">
+              <a:buFont typeface="Wingdings" pitchFamily="2" charset="2"/>
+              <a:buNone/>
+            </a:pPr>
+            <a:r>
+              <a:rPr lang="en-GB" baseline="0" dirty="0" smtClean="0">
+                <a:sym typeface="Wingdings" panose="05000000000000000000" pitchFamily="2" charset="2"/>
+              </a:rPr>
+              <a:t>View information about the named entities that were found:</a:t>
+            </a:r>
+          </a:p>
+          <a:p>
+            <a:pPr marL="171450" indent="-171450">
+              <a:buFont typeface="Wingdings" pitchFamily="2" charset="2"/>
+              <a:buChar char="è"/>
+            </a:pPr>
+            <a:r>
+              <a:rPr lang="en-GB" baseline="0" dirty="0" smtClean="0">
+                <a:sym typeface="Wingdings" panose="05000000000000000000" pitchFamily="2" charset="2"/>
+              </a:rPr>
+              <a:t>Information about Trump (there seems to be a lot) and the other person</a:t>
+            </a:r>
+          </a:p>
+          <a:p>
+            <a:pPr marL="171450" indent="-171450">
+              <a:buFont typeface="Wingdings" pitchFamily="2" charset="2"/>
+              <a:buChar char="è"/>
+            </a:pPr>
+            <a:r>
+              <a:rPr lang="en-GB" baseline="0" dirty="0" smtClean="0">
+                <a:sym typeface="Wingdings" panose="05000000000000000000" pitchFamily="2" charset="2"/>
+              </a:rPr>
+              <a:t>Now this is useful, but what connects Trump to this person? View visualization</a:t>
+            </a:r>
+          </a:p>
+          <a:p>
+            <a:pPr marL="171450" indent="-171450">
+              <a:buFont typeface="Wingdings" pitchFamily="2" charset="2"/>
+              <a:buChar char="è"/>
+            </a:pPr>
+            <a:endParaRPr lang="de-DE" dirty="0"/>
+          </a:p>
+        </p:txBody>
+      </p:sp>
+      <p:sp>
+        <p:nvSpPr>
+          <p:cNvPr id="4" name="Slide Number Placeholder 3"/>
+          <p:cNvSpPr>
+            <a:spLocks noGrp="1"/>
+          </p:cNvSpPr>
+          <p:nvPr>
+            <p:ph type="sldNum" sz="quarter" idx="10"/>
+          </p:nvPr>
+        </p:nvSpPr>
+        <p:spPr/>
+        <p:txBody>
+          <a:bodyPr/>
+          <a:lstStyle/>
+          <a:p>
+            <a:fld id="{6B56D088-27D1-433A-A9A9-E30AD3E13E16}" type="slidenum">
+              <a:rPr lang="en-GB" smtClean="0"/>
+              <a:t>7</a:t>
+            </a:fld>
+            <a:endParaRPr lang="en-GB"/>
+          </a:p>
+        </p:txBody>
+      </p:sp>
+    </p:spTree>
+    <p:extLst>
+      <p:ext uri="{BB962C8B-B14F-4D97-AF65-F5344CB8AC3E}">
+        <p14:creationId xmlns:p14="http://schemas.microsoft.com/office/powerpoint/2010/main" val="2749297725"/>
+      </p:ext>
+    </p:extLst>
+  </p:cSld>
+  <p:clrMapOvr>
+    <a:masterClrMapping/>
+  </p:clrMapOvr>
+</p:notes>
+</file>
+
+<file path=ppt/notesSlides/notesSlide6.xml><?xml version="1.0" encoding="utf-8"?>
+<p:notes xmlns:a="http://schemas.openxmlformats.org/drawingml/2006/main" xmlns:r="http://schemas.openxmlformats.org/officeDocument/2006/relationships" xmlns:p="http://schemas.openxmlformats.org/presentationml/2006/main">
+  <p:cSld>
+    <p:spTree>
+      <p:nvGrpSpPr>
+        <p:cNvPr id="1" name=""/>
+        <p:cNvGrpSpPr/>
+        <p:nvPr/>
+      </p:nvGrpSpPr>
+      <p:grpSpPr>
+        <a:xfrm>
+          <a:off x="0" y="0"/>
+          <a:ext cx="0" cy="0"/>
+          <a:chOff x="0" y="0"/>
+          <a:chExt cx="0" cy="0"/>
+        </a:xfrm>
+      </p:grpSpPr>
+      <p:sp>
+        <p:nvSpPr>
+          <p:cNvPr id="2" name="Slide Image Placeholder 1"/>
+          <p:cNvSpPr>
+            <a:spLocks noGrp="1" noRot="1" noChangeAspect="1"/>
+          </p:cNvSpPr>
+          <p:nvPr>
+            <p:ph type="sldImg"/>
+          </p:nvPr>
+        </p:nvSpPr>
+        <p:spPr/>
+      </p:sp>
+      <p:sp>
+        <p:nvSpPr>
+          <p:cNvPr id="3" name="Notes Placeholder 2"/>
+          <p:cNvSpPr>
+            <a:spLocks noGrp="1"/>
+          </p:cNvSpPr>
+          <p:nvPr>
+            <p:ph type="body" idx="1"/>
+          </p:nvPr>
+        </p:nvSpPr>
+        <p:spPr/>
+        <p:txBody>
+          <a:bodyPr/>
+          <a:lstStyle/>
+          <a:p>
+            <a:r>
+              <a:rPr lang="en-GB" dirty="0" smtClean="0"/>
+              <a:t>On the technical side: architecture is extensible, as in new sources can</a:t>
+            </a:r>
+            <a:r>
+              <a:rPr lang="en-GB" baseline="0" dirty="0" smtClean="0"/>
+              <a:t> easily be added</a:t>
+            </a:r>
+          </a:p>
+          <a:p>
+            <a:r>
+              <a:rPr lang="en-GB" dirty="0" smtClean="0"/>
+              <a:t>Chrome</a:t>
+            </a:r>
+            <a:r>
+              <a:rPr lang="en-GB" baseline="0" dirty="0" smtClean="0"/>
+              <a:t> extension gets pretty much everything from the server, so this would not need any updates</a:t>
+            </a:r>
+          </a:p>
+          <a:p>
+            <a:endParaRPr lang="en-GB" baseline="0" dirty="0" smtClean="0"/>
+          </a:p>
+          <a:p>
+            <a:endParaRPr lang="de-DE" dirty="0"/>
+          </a:p>
+        </p:txBody>
+      </p:sp>
+      <p:sp>
+        <p:nvSpPr>
+          <p:cNvPr id="4" name="Slide Number Placeholder 3"/>
+          <p:cNvSpPr>
+            <a:spLocks noGrp="1"/>
+          </p:cNvSpPr>
+          <p:nvPr>
+            <p:ph type="sldNum" sz="quarter" idx="10"/>
+          </p:nvPr>
+        </p:nvSpPr>
+        <p:spPr/>
+        <p:txBody>
+          <a:bodyPr/>
+          <a:lstStyle/>
+          <a:p>
+            <a:fld id="{6B56D088-27D1-433A-A9A9-E30AD3E13E16}" type="slidenum">
+              <a:rPr lang="en-GB" smtClean="0"/>
+              <a:t>8</a:t>
+            </a:fld>
+            <a:endParaRPr lang="en-GB"/>
+          </a:p>
+        </p:txBody>
+      </p:sp>
+    </p:spTree>
+    <p:extLst>
+      <p:ext uri="{BB962C8B-B14F-4D97-AF65-F5344CB8AC3E}">
+        <p14:creationId xmlns:p14="http://schemas.microsoft.com/office/powerpoint/2010/main" val="3473345627"/>
       </p:ext>
     </p:extLst>
   </p:cSld>
@@ -1550,7 +1837,7 @@
           <a:p>
             <a:fld id="{06103CAB-27D4-4953-BA7C-39BAE24E605E}" type="datetime1">
               <a:rPr lang="en-GB" smtClean="0"/>
-              <a:t>02/12/2016</a:t>
+              <a:t>03/12/2016</a:t>
             </a:fld>
             <a:endParaRPr lang="en-GB"/>
           </a:p>
@@ -1600,7 +1887,7 @@
           <a:p>
             <a:fld id="{2921BF44-F096-42DF-ADC3-B535522D2EE1}" type="slidenum">
               <a:rPr lang="en-GB" smtClean="0"/>
-              <a:t>‹Nr.›</a:t>
+              <a:t>‹#›</a:t>
             </a:fld>
             <a:endParaRPr lang="en-GB"/>
           </a:p>
@@ -1849,7 +2136,7 @@
           <a:p>
             <a:fld id="{3A8A6690-9EF3-4749-8403-602024AB73D2}" type="datetime1">
               <a:rPr lang="en-GB" smtClean="0"/>
-              <a:t>02/12/2016</a:t>
+              <a:t>03/12/2016</a:t>
             </a:fld>
             <a:endParaRPr lang="en-GB"/>
           </a:p>
@@ -1894,7 +2181,7 @@
           <a:p>
             <a:fld id="{2921BF44-F096-42DF-ADC3-B535522D2EE1}" type="slidenum">
               <a:rPr lang="en-GB" smtClean="0"/>
-              <a:t>‹Nr.›</a:t>
+              <a:t>‹#›</a:t>
             </a:fld>
             <a:endParaRPr lang="en-GB"/>
           </a:p>
@@ -2100,7 +2387,7 @@
           <a:p>
             <a:fld id="{89DB5E8A-75A3-4867-94E4-590D730EBB1E}" type="datetime1">
               <a:rPr lang="en-GB" smtClean="0"/>
-              <a:t>02/12/2016</a:t>
+              <a:t>03/12/2016</a:t>
             </a:fld>
             <a:endParaRPr lang="en-GB"/>
           </a:p>
@@ -2145,7 +2432,7 @@
           <a:p>
             <a:fld id="{2921BF44-F096-42DF-ADC3-B535522D2EE1}" type="slidenum">
               <a:rPr lang="en-GB" smtClean="0"/>
-              <a:t>‹Nr.›</a:t>
+              <a:t>‹#›</a:t>
             </a:fld>
             <a:endParaRPr lang="en-GB"/>
           </a:p>
@@ -2643,7 +2930,7 @@
           <a:p>
             <a:fld id="{56CC3CC1-5D48-4D8E-A506-FE00E1BA1FC1}" type="datetime1">
               <a:rPr lang="en-GB" smtClean="0"/>
-              <a:t>02/12/2016</a:t>
+              <a:t>03/12/2016</a:t>
             </a:fld>
             <a:endParaRPr lang="en-GB"/>
           </a:p>
@@ -2688,7 +2975,7 @@
           <a:p>
             <a:fld id="{2921BF44-F096-42DF-ADC3-B535522D2EE1}" type="slidenum">
               <a:rPr lang="en-GB" smtClean="0"/>
-              <a:t>‹Nr.›</a:t>
+              <a:t>‹#›</a:t>
             </a:fld>
             <a:endParaRPr lang="en-GB"/>
           </a:p>
@@ -2894,7 +3181,7 @@
           <a:p>
             <a:fld id="{E47C6652-7282-41FA-AD47-BB58E05EBCB1}" type="datetime1">
               <a:rPr lang="en-GB" smtClean="0"/>
-              <a:t>02/12/2016</a:t>
+              <a:t>03/12/2016</a:t>
             </a:fld>
             <a:endParaRPr lang="en-GB"/>
           </a:p>
@@ -2939,7 +3226,7 @@
           <a:p>
             <a:fld id="{2921BF44-F096-42DF-ADC3-B535522D2EE1}" type="slidenum">
               <a:rPr lang="en-GB" smtClean="0"/>
-              <a:t>‹Nr.›</a:t>
+              <a:t>‹#›</a:t>
             </a:fld>
             <a:endParaRPr lang="en-GB"/>
           </a:p>
@@ -3429,7 +3716,7 @@
           <a:p>
             <a:fld id="{9575253B-D946-4B16-A4D6-EDCC8FBA3639}" type="datetime1">
               <a:rPr lang="en-GB" smtClean="0"/>
-              <a:t>02/12/2016</a:t>
+              <a:t>03/12/2016</a:t>
             </a:fld>
             <a:endParaRPr lang="en-GB"/>
           </a:p>
@@ -3474,7 +3761,7 @@
           <a:p>
             <a:fld id="{2921BF44-F096-42DF-ADC3-B535522D2EE1}" type="slidenum">
               <a:rPr lang="en-GB" smtClean="0"/>
-              <a:t>‹Nr.›</a:t>
+              <a:t>‹#›</a:t>
             </a:fld>
             <a:endParaRPr lang="en-GB"/>
           </a:p>
@@ -3729,7 +4016,7 @@
           <a:p>
             <a:fld id="{05A78B47-D74F-482E-AC4D-924E1F9C02E1}" type="datetime1">
               <a:rPr lang="en-GB" smtClean="0"/>
-              <a:t>02/12/2016</a:t>
+              <a:t>03/12/2016</a:t>
             </a:fld>
             <a:endParaRPr lang="en-GB"/>
           </a:p>
@@ -3774,7 +4061,7 @@
           <a:p>
             <a:fld id="{2921BF44-F096-42DF-ADC3-B535522D2EE1}" type="slidenum">
               <a:rPr lang="en-GB" smtClean="0"/>
-              <a:t>‹Nr.›</a:t>
+              <a:t>‹#›</a:t>
             </a:fld>
             <a:endParaRPr lang="en-GB"/>
           </a:p>
@@ -3906,7 +4193,7 @@
           <a:p>
             <a:fld id="{9D054574-8D06-4B14-A4E3-883F870E467D}" type="datetime1">
               <a:rPr lang="en-GB" smtClean="0"/>
-              <a:t>02/12/2016</a:t>
+              <a:t>03/12/2016</a:t>
             </a:fld>
             <a:endParaRPr lang="en-GB"/>
           </a:p>
@@ -3951,7 +4238,7 @@
           <a:p>
             <a:fld id="{2921BF44-F096-42DF-ADC3-B535522D2EE1}" type="slidenum">
               <a:rPr lang="en-GB" smtClean="0"/>
-              <a:t>‹Nr.›</a:t>
+              <a:t>‹#›</a:t>
             </a:fld>
             <a:endParaRPr lang="en-GB"/>
           </a:p>
@@ -4089,7 +4376,7 @@
           <a:p>
             <a:fld id="{99CF02F4-EBA5-433C-B12C-1A26A76C696F}" type="datetime1">
               <a:rPr lang="en-GB" smtClean="0"/>
-              <a:t>02/12/2016</a:t>
+              <a:t>03/12/2016</a:t>
             </a:fld>
             <a:endParaRPr lang="en-GB"/>
           </a:p>
@@ -4134,7 +4421,7 @@
           <a:p>
             <a:fld id="{2921BF44-F096-42DF-ADC3-B535522D2EE1}" type="slidenum">
               <a:rPr lang="en-GB" smtClean="0"/>
-              <a:t>‹Nr.›</a:t>
+              <a:t>‹#›</a:t>
             </a:fld>
             <a:endParaRPr lang="en-GB"/>
           </a:p>
@@ -4281,7 +4568,7 @@
           <a:p>
             <a:fld id="{F7FB45E5-CEA6-436A-9116-67114B66AE83}" type="datetime1">
               <a:rPr lang="en-GB" smtClean="0"/>
-              <a:t>02/12/2016</a:t>
+              <a:t>03/12/2016</a:t>
             </a:fld>
             <a:endParaRPr lang="en-GB"/>
           </a:p>
@@ -4341,7 +4628,7 @@
             <a:fld id="{2921BF44-F096-42DF-ADC3-B535522D2EE1}" type="slidenum">
               <a:rPr lang="en-GB" smtClean="0"/>
               <a:pPr/>
-              <a:t>‹Nr.›</a:t>
+              <a:t>‹#›</a:t>
             </a:fld>
             <a:endParaRPr lang="en-GB" dirty="0"/>
           </a:p>
@@ -4545,7 +4832,7 @@
           <a:p>
             <a:fld id="{58772DC2-CC95-4628-A2C3-DBCC8B67E0EE}" type="datetime1">
               <a:rPr lang="en-GB" smtClean="0"/>
-              <a:t>02/12/2016</a:t>
+              <a:t>03/12/2016</a:t>
             </a:fld>
             <a:endParaRPr lang="en-GB"/>
           </a:p>
@@ -4590,7 +4877,7 @@
           <a:p>
             <a:fld id="{2921BF44-F096-42DF-ADC3-B535522D2EE1}" type="slidenum">
               <a:rPr lang="en-GB" smtClean="0"/>
-              <a:t>‹Nr.›</a:t>
+              <a:t>‹#›</a:t>
             </a:fld>
             <a:endParaRPr lang="en-GB"/>
           </a:p>
@@ -4845,7 +5132,7 @@
           <a:p>
             <a:fld id="{85706B20-101B-4EF1-A005-17BBB9B97973}" type="datetime1">
               <a:rPr lang="en-GB" smtClean="0"/>
-              <a:t>02/12/2016</a:t>
+              <a:t>03/12/2016</a:t>
             </a:fld>
             <a:endParaRPr lang="en-GB"/>
           </a:p>
@@ -4890,7 +5177,7 @@
           <a:p>
             <a:fld id="{2921BF44-F096-42DF-ADC3-B535522D2EE1}" type="slidenum">
               <a:rPr lang="en-GB" smtClean="0"/>
-              <a:t>‹Nr.›</a:t>
+              <a:t>‹#›</a:t>
             </a:fld>
             <a:endParaRPr lang="en-GB"/>
           </a:p>
@@ -5290,7 +5577,7 @@
           <a:p>
             <a:fld id="{73A24D18-03FA-444B-A6E8-081CE70D1F1D}" type="datetime1">
               <a:rPr lang="en-GB" smtClean="0"/>
-              <a:t>02/12/2016</a:t>
+              <a:t>03/12/2016</a:t>
             </a:fld>
             <a:endParaRPr lang="en-GB"/>
           </a:p>
@@ -5335,7 +5622,7 @@
           <a:p>
             <a:fld id="{2921BF44-F096-42DF-ADC3-B535522D2EE1}" type="slidenum">
               <a:rPr lang="en-GB" smtClean="0"/>
-              <a:t>‹Nr.›</a:t>
+              <a:t>‹#›</a:t>
             </a:fld>
             <a:endParaRPr lang="en-GB"/>
           </a:p>
@@ -5411,7 +5698,7 @@
           <a:p>
             <a:fld id="{5A5D0278-C667-458C-BF50-C38C35F84025}" type="datetime1">
               <a:rPr lang="en-GB" smtClean="0"/>
-              <a:t>02/12/2016</a:t>
+              <a:t>03/12/2016</a:t>
             </a:fld>
             <a:endParaRPr lang="en-GB"/>
           </a:p>
@@ -5456,7 +5743,7 @@
           <a:p>
             <a:fld id="{2921BF44-F096-42DF-ADC3-B535522D2EE1}" type="slidenum">
               <a:rPr lang="en-GB" smtClean="0"/>
-              <a:t>‹Nr.›</a:t>
+              <a:t>‹#›</a:t>
             </a:fld>
             <a:endParaRPr lang="en-GB"/>
           </a:p>
@@ -5509,7 +5796,7 @@
           <a:p>
             <a:fld id="{7779FF95-CD9F-49D0-9692-6F86CB53E266}" type="datetime1">
               <a:rPr lang="en-GB" smtClean="0"/>
-              <a:t>02/12/2016</a:t>
+              <a:t>03/12/2016</a:t>
             </a:fld>
             <a:endParaRPr lang="en-GB"/>
           </a:p>
@@ -5554,7 +5841,7 @@
           <a:p>
             <a:fld id="{2921BF44-F096-42DF-ADC3-B535522D2EE1}" type="slidenum">
               <a:rPr lang="en-GB" smtClean="0"/>
-              <a:t>‹Nr.›</a:t>
+              <a:t>‹#›</a:t>
             </a:fld>
             <a:endParaRPr lang="en-GB"/>
           </a:p>
@@ -5795,7 +6082,7 @@
           <a:p>
             <a:fld id="{6FF6C31A-CCBC-47C9-B55B-D6E279E5509C}" type="datetime1">
               <a:rPr lang="en-GB" smtClean="0"/>
-              <a:t>02/12/2016</a:t>
+              <a:t>03/12/2016</a:t>
             </a:fld>
             <a:endParaRPr lang="en-GB"/>
           </a:p>
@@ -5840,7 +6127,7 @@
           <a:p>
             <a:fld id="{2921BF44-F096-42DF-ADC3-B535522D2EE1}" type="slidenum">
               <a:rPr lang="en-GB" smtClean="0"/>
-              <a:t>‹Nr.›</a:t>
+              <a:t>‹#›</a:t>
             </a:fld>
             <a:endParaRPr lang="en-GB"/>
           </a:p>
@@ -6089,7 +6376,7 @@
           <a:p>
             <a:fld id="{23E1B9F4-BB56-4914-9BD8-B56AC1531316}" type="datetime1">
               <a:rPr lang="en-GB" smtClean="0"/>
-              <a:t>02/12/2016</a:t>
+              <a:t>03/12/2016</a:t>
             </a:fld>
             <a:endParaRPr lang="en-GB"/>
           </a:p>
@@ -6134,7 +6421,7 @@
           <a:p>
             <a:fld id="{2921BF44-F096-42DF-ADC3-B535522D2EE1}" type="slidenum">
               <a:rPr lang="en-GB" smtClean="0"/>
-              <a:t>‹Nr.›</a:t>
+              <a:t>‹#›</a:t>
             </a:fld>
             <a:endParaRPr lang="en-GB"/>
           </a:p>
@@ -6306,7 +6593,7 @@
           <a:p>
             <a:fld id="{B80DFA59-A6D8-4F35-B196-6C06090E1566}" type="datetime1">
               <a:rPr lang="en-GB" smtClean="0"/>
-              <a:t>02/12/2016</a:t>
+              <a:t>03/12/2016</a:t>
             </a:fld>
             <a:endParaRPr lang="en-GB"/>
           </a:p>
@@ -6387,7 +6674,7 @@
           <a:p>
             <a:fld id="{2921BF44-F096-42DF-ADC3-B535522D2EE1}" type="slidenum">
               <a:rPr lang="en-GB" smtClean="0"/>
-              <a:t>‹Nr.›</a:t>
+              <a:t>‹#›</a:t>
             </a:fld>
             <a:endParaRPr lang="en-GB"/>
           </a:p>
@@ -6861,20 +7148,12 @@
               <a:t>Information </a:t>
             </a:r>
             <a:r>
-              <a:rPr lang="de-DE" dirty="0" err="1"/>
-              <a:t>need</a:t>
+              <a:rPr lang="de-DE" dirty="0" smtClean="0"/>
+              <a:t>needs </a:t>
             </a:r>
             <a:r>
               <a:rPr lang="de-DE" dirty="0"/>
-              <a:t> </a:t>
-            </a:r>
-            <a:r>
-              <a:rPr lang="de-DE" dirty="0" err="1"/>
-              <a:t>context</a:t>
-            </a:r>
-            <a:r>
-              <a:rPr lang="de-DE" dirty="0"/>
-              <a:t>…</a:t>
+              <a:t>context…</a:t>
             </a:r>
           </a:p>
         </p:txBody>
@@ -7276,6 +7555,604 @@
 </p:sld>
 </file>
 
+<file path=ppt/slides/slide10.xml><?xml version="1.0" encoding="utf-8"?>
+<p:sld xmlns:a="http://schemas.openxmlformats.org/drawingml/2006/main" xmlns:r="http://schemas.openxmlformats.org/officeDocument/2006/relationships" xmlns:p="http://schemas.openxmlformats.org/presentationml/2006/main">
+  <p:cSld>
+    <p:spTree>
+      <p:nvGrpSpPr>
+        <p:cNvPr id="1" name=""/>
+        <p:cNvGrpSpPr/>
+        <p:nvPr/>
+      </p:nvGrpSpPr>
+      <p:grpSpPr>
+        <a:xfrm>
+          <a:off x="0" y="0"/>
+          <a:ext cx="0" cy="0"/>
+          <a:chOff x="0" y="0"/>
+          <a:chExt cx="0" cy="0"/>
+        </a:xfrm>
+      </p:grpSpPr>
+      <p:sp>
+        <p:nvSpPr>
+          <p:cNvPr id="2" name="Title 1"/>
+          <p:cNvSpPr>
+            <a:spLocks noGrp="1"/>
+          </p:cNvSpPr>
+          <p:nvPr>
+            <p:ph type="title"/>
+          </p:nvPr>
+        </p:nvSpPr>
+        <p:spPr/>
+        <p:txBody>
+          <a:bodyPr/>
+          <a:lstStyle/>
+          <a:p>
+            <a:r>
+              <a:rPr lang="en-GB" dirty="0" smtClean="0"/>
+              <a:t>Architecture</a:t>
+            </a:r>
+            <a:endParaRPr lang="de-DE" dirty="0"/>
+          </a:p>
+        </p:txBody>
+      </p:sp>
+      <p:sp>
+        <p:nvSpPr>
+          <p:cNvPr id="4" name="Slide Number Placeholder 3"/>
+          <p:cNvSpPr>
+            <a:spLocks noGrp="1"/>
+          </p:cNvSpPr>
+          <p:nvPr>
+            <p:ph type="sldNum" sz="quarter" idx="12"/>
+          </p:nvPr>
+        </p:nvSpPr>
+        <p:spPr/>
+        <p:txBody>
+          <a:bodyPr/>
+          <a:lstStyle/>
+          <a:p>
+            <a:fld id="{2921BF44-F096-42DF-ADC3-B535522D2EE1}" type="slidenum">
+              <a:rPr lang="en-GB" smtClean="0"/>
+              <a:pPr/>
+              <a:t>10</a:t>
+            </a:fld>
+            <a:endParaRPr lang="en-GB" dirty="0"/>
+          </a:p>
+        </p:txBody>
+      </p:sp>
+      <p:pic>
+        <p:nvPicPr>
+          <p:cNvPr id="3074" name="Picture 2" descr="C:\Users\Oliver\workspace java local\SemanticWebTechnologies\ProjectReport\img\Architecture_v2.png"/>
+          <p:cNvPicPr>
+            <a:picLocks noChangeAspect="1" noChangeArrowheads="1"/>
+          </p:cNvPicPr>
+          <p:nvPr/>
+        </p:nvPicPr>
+        <p:blipFill>
+          <a:blip r:embed="rId2">
+            <a:extLst>
+              <a:ext uri="{28A0092B-C50C-407E-A947-70E740481C1C}">
+                <a14:useLocalDpi xmlns:a14="http://schemas.microsoft.com/office/drawing/2010/main" val="0"/>
+              </a:ext>
+            </a:extLst>
+          </a:blip>
+          <a:srcRect/>
+          <a:stretch>
+            <a:fillRect/>
+          </a:stretch>
+        </p:blipFill>
+        <p:spPr bwMode="auto">
+          <a:xfrm>
+            <a:off x="3545897" y="1469914"/>
+            <a:ext cx="5100205" cy="5222875"/>
+          </a:xfrm>
+          <a:prstGeom prst="rect">
+            <a:avLst/>
+          </a:prstGeom>
+          <a:noFill/>
+          <a:extLst>
+            <a:ext uri="{909E8E84-426E-40DD-AFC4-6F175D3DCCD1}">
+              <a14:hiddenFill xmlns:a14="http://schemas.microsoft.com/office/drawing/2010/main">
+                <a:solidFill>
+                  <a:srgbClr val="FFFFFF"/>
+                </a:solidFill>
+              </a14:hiddenFill>
+            </a:ext>
+          </a:extLst>
+        </p:spPr>
+      </p:pic>
+    </p:spTree>
+    <p:extLst>
+      <p:ext uri="{BB962C8B-B14F-4D97-AF65-F5344CB8AC3E}">
+        <p14:creationId xmlns:p14="http://schemas.microsoft.com/office/powerpoint/2010/main" val="4193449090"/>
+      </p:ext>
+    </p:extLst>
+  </p:cSld>
+  <p:clrMapOvr>
+    <a:masterClrMapping/>
+  </p:clrMapOvr>
+</p:sld>
+</file>
+
+<file path=ppt/slides/slide11.xml><?xml version="1.0" encoding="utf-8"?>
+<p:sld xmlns:a="http://schemas.openxmlformats.org/drawingml/2006/main" xmlns:r="http://schemas.openxmlformats.org/officeDocument/2006/relationships" xmlns:p="http://schemas.openxmlformats.org/presentationml/2006/main" show="0">
+  <p:cSld>
+    <p:spTree>
+      <p:nvGrpSpPr>
+        <p:cNvPr id="1" name=""/>
+        <p:cNvGrpSpPr/>
+        <p:nvPr/>
+      </p:nvGrpSpPr>
+      <p:grpSpPr>
+        <a:xfrm>
+          <a:off x="0" y="0"/>
+          <a:ext cx="0" cy="0"/>
+          <a:chOff x="0" y="0"/>
+          <a:chExt cx="0" cy="0"/>
+        </a:xfrm>
+      </p:grpSpPr>
+      <p:sp>
+        <p:nvSpPr>
+          <p:cNvPr id="2" name="Title 1"/>
+          <p:cNvSpPr>
+            <a:spLocks noGrp="1"/>
+          </p:cNvSpPr>
+          <p:nvPr>
+            <p:ph type="title"/>
+          </p:nvPr>
+        </p:nvSpPr>
+        <p:spPr/>
+        <p:txBody>
+          <a:bodyPr/>
+          <a:lstStyle/>
+          <a:p>
+            <a:r>
+              <a:rPr lang="en-GB" dirty="0" smtClean="0"/>
+              <a:t>Server: REST API (1)</a:t>
+            </a:r>
+            <a:endParaRPr lang="de-DE" dirty="0"/>
+          </a:p>
+        </p:txBody>
+      </p:sp>
+      <p:sp>
+        <p:nvSpPr>
+          <p:cNvPr id="5" name="Content Placeholder 4"/>
+          <p:cNvSpPr>
+            <a:spLocks noGrp="1"/>
+          </p:cNvSpPr>
+          <p:nvPr>
+            <p:ph sz="half" idx="1"/>
+          </p:nvPr>
+        </p:nvSpPr>
+        <p:spPr/>
+        <p:txBody>
+          <a:bodyPr anchor="t">
+            <a:normAutofit/>
+          </a:bodyPr>
+          <a:lstStyle/>
+          <a:p>
+            <a:pPr marL="0" indent="0">
+              <a:buNone/>
+            </a:pPr>
+            <a:r>
+              <a:rPr lang="de-DE" dirty="0"/>
+              <a:t>POST </a:t>
+            </a:r>
+            <a:r>
+              <a:rPr lang="de-DE" dirty="0">
+                <a:hlinkClick r:id="rId2"/>
+              </a:rPr>
+              <a:t>https://</a:t>
+            </a:r>
+            <a:r>
+              <a:rPr lang="de-DE" dirty="0" smtClean="0">
+                <a:hlinkClick r:id="rId2"/>
+              </a:rPr>
+              <a:t>localhost:8443/RetrieveTriples</a:t>
+            </a:r>
+            <a:r>
+              <a:rPr lang="de-DE" dirty="0"/>
+              <a:t/>
+            </a:r>
+            <a:br>
+              <a:rPr lang="de-DE" dirty="0"/>
+            </a:br>
+            <a:r>
+              <a:rPr lang="de-DE" dirty="0" smtClean="0"/>
+              <a:t>Request </a:t>
+            </a:r>
+            <a:r>
+              <a:rPr lang="de-DE" dirty="0"/>
+              <a:t>body: </a:t>
+            </a:r>
+          </a:p>
+          <a:p>
+            <a:pPr marL="0" indent="0">
+              <a:buNone/>
+            </a:pPr>
+            <a:endParaRPr lang="en-GB" dirty="0" smtClean="0"/>
+          </a:p>
+          <a:p>
+            <a:pPr marL="0" indent="0">
+              <a:buNone/>
+            </a:pPr>
+            <a:endParaRPr lang="de-DE" dirty="0"/>
+          </a:p>
+        </p:txBody>
+      </p:sp>
+      <p:sp>
+        <p:nvSpPr>
+          <p:cNvPr id="8" name="Content Placeholder 7"/>
+          <p:cNvSpPr>
+            <a:spLocks noGrp="1"/>
+          </p:cNvSpPr>
+          <p:nvPr>
+            <p:ph sz="half" idx="2"/>
+          </p:nvPr>
+        </p:nvSpPr>
+        <p:spPr/>
+        <p:txBody>
+          <a:bodyPr anchor="t">
+            <a:normAutofit/>
+          </a:bodyPr>
+          <a:lstStyle/>
+          <a:p>
+            <a:pPr marL="0" indent="0">
+              <a:buNone/>
+            </a:pPr>
+            <a:r>
+              <a:rPr lang="en-GB" dirty="0" smtClean="0"/>
+              <a:t/>
+            </a:r>
+            <a:br>
+              <a:rPr lang="en-GB" dirty="0" smtClean="0"/>
+            </a:br>
+            <a:r>
+              <a:rPr lang="en-GB" dirty="0" smtClean="0"/>
+              <a:t>Response body:</a:t>
+            </a:r>
+            <a:endParaRPr lang="de-DE" dirty="0"/>
+          </a:p>
+        </p:txBody>
+      </p:sp>
+      <p:sp>
+        <p:nvSpPr>
+          <p:cNvPr id="4" name="Slide Number Placeholder 3"/>
+          <p:cNvSpPr>
+            <a:spLocks noGrp="1"/>
+          </p:cNvSpPr>
+          <p:nvPr>
+            <p:ph type="sldNum" sz="quarter" idx="12"/>
+          </p:nvPr>
+        </p:nvSpPr>
+        <p:spPr/>
+        <p:txBody>
+          <a:bodyPr/>
+          <a:lstStyle/>
+          <a:p>
+            <a:fld id="{2921BF44-F096-42DF-ADC3-B535522D2EE1}" type="slidenum">
+              <a:rPr lang="en-GB" smtClean="0"/>
+              <a:pPr/>
+              <a:t>11</a:t>
+            </a:fld>
+            <a:endParaRPr lang="en-GB" dirty="0"/>
+          </a:p>
+        </p:txBody>
+      </p:sp>
+      <p:pic>
+        <p:nvPicPr>
+          <p:cNvPr id="1026" name="Picture 2"/>
+          <p:cNvPicPr>
+            <a:picLocks noChangeAspect="1" noChangeArrowheads="1"/>
+          </p:cNvPicPr>
+          <p:nvPr/>
+        </p:nvPicPr>
+        <p:blipFill>
+          <a:blip r:embed="rId3">
+            <a:extLst>
+              <a:ext uri="{28A0092B-C50C-407E-A947-70E740481C1C}">
+                <a14:useLocalDpi xmlns:a14="http://schemas.microsoft.com/office/drawing/2010/main" val="0"/>
+              </a:ext>
+            </a:extLst>
+          </a:blip>
+          <a:srcRect/>
+          <a:stretch>
+            <a:fillRect/>
+          </a:stretch>
+        </p:blipFill>
+        <p:spPr bwMode="auto">
+          <a:xfrm>
+            <a:off x="6622597" y="3352207"/>
+            <a:ext cx="4495441" cy="2779939"/>
+          </a:xfrm>
+          <a:prstGeom prst="rect">
+            <a:avLst/>
+          </a:prstGeom>
+          <a:noFill/>
+          <a:ln>
+            <a:noFill/>
+          </a:ln>
+          <a:extLst>
+            <a:ext uri="{909E8E84-426E-40DD-AFC4-6F175D3DCCD1}">
+              <a14:hiddenFill xmlns:a14="http://schemas.microsoft.com/office/drawing/2010/main">
+                <a:solidFill>
+                  <a:schemeClr val="accent1"/>
+                </a:solidFill>
+              </a14:hiddenFill>
+            </a:ext>
+            <a:ext uri="{91240B29-F687-4F45-9708-019B960494DF}">
+              <a14:hiddenLine xmlns:a14="http://schemas.microsoft.com/office/drawing/2010/main" w="9525">
+                <a:solidFill>
+                  <a:schemeClr val="tx1"/>
+                </a:solidFill>
+                <a:miter lim="800000"/>
+                <a:headEnd/>
+                <a:tailEnd/>
+              </a14:hiddenLine>
+            </a:ext>
+          </a:extLst>
+        </p:spPr>
+      </p:pic>
+      <p:pic>
+        <p:nvPicPr>
+          <p:cNvPr id="1027" name="Picture 3"/>
+          <p:cNvPicPr>
+            <a:picLocks noChangeAspect="1" noChangeArrowheads="1"/>
+          </p:cNvPicPr>
+          <p:nvPr/>
+        </p:nvPicPr>
+        <p:blipFill>
+          <a:blip r:embed="rId4">
+            <a:extLst>
+              <a:ext uri="{28A0092B-C50C-407E-A947-70E740481C1C}">
+                <a14:useLocalDpi xmlns:a14="http://schemas.microsoft.com/office/drawing/2010/main" val="0"/>
+              </a:ext>
+            </a:extLst>
+          </a:blip>
+          <a:srcRect/>
+          <a:stretch>
+            <a:fillRect/>
+          </a:stretch>
+        </p:blipFill>
+        <p:spPr bwMode="auto">
+          <a:xfrm>
+            <a:off x="1602921" y="3352207"/>
+            <a:ext cx="4438650" cy="1157909"/>
+          </a:xfrm>
+          <a:prstGeom prst="rect">
+            <a:avLst/>
+          </a:prstGeom>
+          <a:noFill/>
+          <a:ln>
+            <a:noFill/>
+          </a:ln>
+          <a:extLst>
+            <a:ext uri="{909E8E84-426E-40DD-AFC4-6F175D3DCCD1}">
+              <a14:hiddenFill xmlns:a14="http://schemas.microsoft.com/office/drawing/2010/main">
+                <a:solidFill>
+                  <a:schemeClr val="accent1"/>
+                </a:solidFill>
+              </a14:hiddenFill>
+            </a:ext>
+            <a:ext uri="{91240B29-F687-4F45-9708-019B960494DF}">
+              <a14:hiddenLine xmlns:a14="http://schemas.microsoft.com/office/drawing/2010/main" w="9525">
+                <a:solidFill>
+                  <a:schemeClr val="tx1"/>
+                </a:solidFill>
+                <a:miter lim="800000"/>
+                <a:headEnd/>
+                <a:tailEnd/>
+              </a14:hiddenLine>
+            </a:ext>
+          </a:extLst>
+        </p:spPr>
+      </p:pic>
+    </p:spTree>
+    <p:extLst>
+      <p:ext uri="{BB962C8B-B14F-4D97-AF65-F5344CB8AC3E}">
+        <p14:creationId xmlns:p14="http://schemas.microsoft.com/office/powerpoint/2010/main" val="4076463865"/>
+      </p:ext>
+    </p:extLst>
+  </p:cSld>
+  <p:clrMapOvr>
+    <a:masterClrMapping/>
+  </p:clrMapOvr>
+  <mc:AlternateContent xmlns:mc="http://schemas.openxmlformats.org/markup-compatibility/2006">
+    <mc:Choice xmlns:p14="http://schemas.microsoft.com/office/powerpoint/2010/main" Requires="p14">
+      <p:transition spd="slow" p14:dur="2000"/>
+    </mc:Choice>
+    <mc:Fallback>
+      <p:transition spd="slow"/>
+    </mc:Fallback>
+  </mc:AlternateContent>
+</p:sld>
+</file>
+
+<file path=ppt/slides/slide12.xml><?xml version="1.0" encoding="utf-8"?>
+<p:sld xmlns:a="http://schemas.openxmlformats.org/drawingml/2006/main" xmlns:r="http://schemas.openxmlformats.org/officeDocument/2006/relationships" xmlns:p="http://schemas.openxmlformats.org/presentationml/2006/main" show="0">
+  <p:cSld>
+    <p:spTree>
+      <p:nvGrpSpPr>
+        <p:cNvPr id="1" name=""/>
+        <p:cNvGrpSpPr/>
+        <p:nvPr/>
+      </p:nvGrpSpPr>
+      <p:grpSpPr>
+        <a:xfrm>
+          <a:off x="0" y="0"/>
+          <a:ext cx="0" cy="0"/>
+          <a:chOff x="0" y="0"/>
+          <a:chExt cx="0" cy="0"/>
+        </a:xfrm>
+      </p:grpSpPr>
+      <p:sp>
+        <p:nvSpPr>
+          <p:cNvPr id="2" name="Title 1"/>
+          <p:cNvSpPr>
+            <a:spLocks noGrp="1"/>
+          </p:cNvSpPr>
+          <p:nvPr>
+            <p:ph type="title"/>
+          </p:nvPr>
+        </p:nvSpPr>
+        <p:spPr/>
+        <p:txBody>
+          <a:bodyPr/>
+          <a:lstStyle/>
+          <a:p>
+            <a:r>
+              <a:rPr lang="en-GB" dirty="0" smtClean="0"/>
+              <a:t>Server: REST API (2)</a:t>
+            </a:r>
+            <a:endParaRPr lang="de-DE" dirty="0"/>
+          </a:p>
+        </p:txBody>
+      </p:sp>
+      <p:sp>
+        <p:nvSpPr>
+          <p:cNvPr id="5" name="Content Placeholder 4"/>
+          <p:cNvSpPr>
+            <a:spLocks noGrp="1"/>
+          </p:cNvSpPr>
+          <p:nvPr>
+            <p:ph idx="1"/>
+          </p:nvPr>
+        </p:nvSpPr>
+        <p:spPr/>
+        <p:txBody>
+          <a:bodyPr anchor="t">
+            <a:normAutofit/>
+          </a:bodyPr>
+          <a:lstStyle/>
+          <a:p>
+            <a:pPr marL="0" indent="0">
+              <a:buNone/>
+            </a:pPr>
+            <a:r>
+              <a:rPr lang="de-DE" dirty="0"/>
+              <a:t>GET https://localhost:8443/RetrieveAvailableProperties</a:t>
+            </a:r>
+            <a:br>
+              <a:rPr lang="de-DE" dirty="0"/>
+            </a:br>
+            <a:r>
+              <a:rPr lang="de-DE" dirty="0" smtClean="0"/>
+              <a:t>Response body:</a:t>
+            </a:r>
+            <a:endParaRPr lang="de-DE" dirty="0"/>
+          </a:p>
+          <a:p>
+            <a:pPr marL="0" indent="0">
+              <a:buNone/>
+            </a:pPr>
+            <a:endParaRPr lang="en-GB" dirty="0" smtClean="0"/>
+          </a:p>
+          <a:p>
+            <a:pPr marL="0" indent="0">
+              <a:buNone/>
+            </a:pPr>
+            <a:endParaRPr lang="de-DE" dirty="0"/>
+          </a:p>
+        </p:txBody>
+      </p:sp>
+      <p:sp>
+        <p:nvSpPr>
+          <p:cNvPr id="4" name="Slide Number Placeholder 3"/>
+          <p:cNvSpPr>
+            <a:spLocks noGrp="1"/>
+          </p:cNvSpPr>
+          <p:nvPr>
+            <p:ph type="sldNum" sz="quarter" idx="12"/>
+          </p:nvPr>
+        </p:nvSpPr>
+        <p:spPr/>
+        <p:txBody>
+          <a:bodyPr/>
+          <a:lstStyle/>
+          <a:p>
+            <a:fld id="{2921BF44-F096-42DF-ADC3-B535522D2EE1}" type="slidenum">
+              <a:rPr lang="en-GB" smtClean="0"/>
+              <a:pPr/>
+              <a:t>12</a:t>
+            </a:fld>
+            <a:endParaRPr lang="en-GB" dirty="0"/>
+          </a:p>
+        </p:txBody>
+      </p:sp>
+      <p:pic>
+        <p:nvPicPr>
+          <p:cNvPr id="2050" name="Picture 2"/>
+          <p:cNvPicPr>
+            <a:picLocks noChangeAspect="1" noChangeArrowheads="1"/>
+          </p:cNvPicPr>
+          <p:nvPr/>
+        </p:nvPicPr>
+        <p:blipFill>
+          <a:blip r:embed="rId2">
+            <a:extLst>
+              <a:ext uri="{28A0092B-C50C-407E-A947-70E740481C1C}">
+                <a14:useLocalDpi xmlns:a14="http://schemas.microsoft.com/office/drawing/2010/main" val="0"/>
+              </a:ext>
+            </a:extLst>
+          </a:blip>
+          <a:srcRect/>
+          <a:stretch>
+            <a:fillRect/>
+          </a:stretch>
+        </p:blipFill>
+        <p:spPr bwMode="auto">
+          <a:xfrm>
+            <a:off x="1050472" y="2797629"/>
+            <a:ext cx="3259616" cy="3757613"/>
+          </a:xfrm>
+          <a:prstGeom prst="rect">
+            <a:avLst/>
+          </a:prstGeom>
+          <a:noFill/>
+          <a:ln>
+            <a:noFill/>
+          </a:ln>
+          <a:extLst>
+            <a:ext uri="{909E8E84-426E-40DD-AFC4-6F175D3DCCD1}">
+              <a14:hiddenFill xmlns:a14="http://schemas.microsoft.com/office/drawing/2010/main">
+                <a:solidFill>
+                  <a:schemeClr val="accent1"/>
+                </a:solidFill>
+              </a14:hiddenFill>
+            </a:ext>
+            <a:ext uri="{91240B29-F687-4F45-9708-019B960494DF}">
+              <a14:hiddenLine xmlns:a14="http://schemas.microsoft.com/office/drawing/2010/main" w="9525">
+                <a:solidFill>
+                  <a:schemeClr val="tx1"/>
+                </a:solidFill>
+                <a:miter lim="800000"/>
+                <a:headEnd/>
+                <a:tailEnd/>
+              </a14:hiddenLine>
+            </a:ext>
+          </a:extLst>
+        </p:spPr>
+      </p:pic>
+    </p:spTree>
+    <p:extLst>
+      <p:ext uri="{BB962C8B-B14F-4D97-AF65-F5344CB8AC3E}">
+        <p14:creationId xmlns:p14="http://schemas.microsoft.com/office/powerpoint/2010/main" val="3916729773"/>
+      </p:ext>
+    </p:extLst>
+  </p:cSld>
+  <p:clrMapOvr>
+    <a:masterClrMapping/>
+  </p:clrMapOvr>
+  <mc:AlternateContent xmlns:mc="http://schemas.openxmlformats.org/markup-compatibility/2006">
+    <mc:Choice xmlns:p14="http://schemas.microsoft.com/office/powerpoint/2010/main" Requires="p14">
+      <p:transition spd="slow" p14:dur="2000"/>
+    </mc:Choice>
+    <mc:Fallback>
+      <p:transition spd="slow"/>
+    </mc:Fallback>
+  </mc:AlternateContent>
+</p:sld>
+</file>
+
 <file path=ppt/slides/slide2.xml><?xml version="1.0" encoding="utf-8"?>
 <p:sld xmlns:a="http://schemas.openxmlformats.org/drawingml/2006/main" xmlns:r="http://schemas.openxmlformats.org/officeDocument/2006/relationships" xmlns:p="http://schemas.openxmlformats.org/presentationml/2006/main">
   <p:cSld>
@@ -7672,7 +8549,7 @@
                 <a14:useLocalDpi xmlns:a14="http://schemas.microsoft.com/office/drawing/2010/main" val="0"/>
               </a:ext>
               <a:ext uri="{96DAC541-7B7A-43D3-8B79-37D633B846F1}">
-                <asvg:svgBlip xmlns:asvg="http://schemas.microsoft.com/office/drawing/2016/SVG/main" r:embed="rId7"/>
+                <asvg:svgBlip xmlns:asvg="http://schemas.microsoft.com/office/drawing/2016/SVG/main" xmlns="" r:embed="rId7"/>
               </a:ext>
             </a:extLst>
           </a:blip>
@@ -7699,13 +8576,13 @@
           <p:nvPr/>
         </p:nvPicPr>
         <p:blipFill>
-          <a:blip r:embed="rId8">
+          <a:blip r:embed="rId8" cstate="print">
             <a:extLst>
               <a:ext uri="{28A0092B-C50C-407E-A947-70E740481C1C}">
                 <a14:useLocalDpi xmlns:a14="http://schemas.microsoft.com/office/drawing/2010/main" val="0"/>
               </a:ext>
               <a:ext uri="{96DAC541-7B7A-43D3-8B79-37D633B846F1}">
-                <asvg:svgBlip xmlns:asvg="http://schemas.microsoft.com/office/drawing/2016/SVG/main" r:embed="rId9"/>
+                <asvg:svgBlip xmlns:asvg="http://schemas.microsoft.com/office/drawing/2016/SVG/main" xmlns="" r:embed="rId9"/>
               </a:ext>
             </a:extLst>
           </a:blip>
@@ -7880,8 +8757,28 @@
               <a:buAutoNum type="arabicPeriod"/>
             </a:pPr>
             <a:r>
+              <a:rPr lang="en-US" dirty="0" smtClean="0"/>
+              <a:t>Server</a:t>
+            </a:r>
+          </a:p>
+          <a:p>
+            <a:pPr marL="914400" lvl="1" indent="-457200">
+              <a:buClr>
+                <a:schemeClr val="accent1">
+                  <a:lumMod val="50000"/>
+                </a:schemeClr>
+              </a:buClr>
+              <a:buSzPct val="125000"/>
+              <a:buFont typeface="+mj-lt"/>
+              <a:buAutoNum type="arabicPeriod"/>
+            </a:pPr>
+            <a:r>
+              <a:rPr lang="en-US" dirty="0" smtClean="0"/>
+              <a:t>Chrome </a:t>
+            </a:r>
+            <a:r>
               <a:rPr lang="en-US" dirty="0"/>
-              <a:t>Chrome Extension</a:t>
+              <a:t>Extension</a:t>
             </a:r>
           </a:p>
           <a:p>
@@ -7931,6 +8828,14 @@
   <p:clrMapOvr>
     <a:masterClrMapping/>
   </p:clrMapOvr>
+  <mc:AlternateContent xmlns:mc="http://schemas.openxmlformats.org/markup-compatibility/2006">
+    <mc:Choice xmlns:p14="http://schemas.microsoft.com/office/powerpoint/2010/main" Requires="p14">
+      <p:transition spd="slow" p14:dur="2000"/>
+    </mc:Choice>
+    <mc:Fallback>
+      <p:transition spd="slow"/>
+    </mc:Fallback>
+  </mc:AlternateContent>
 </p:sld>
 </file>
 
@@ -8389,13 +9294,13 @@
           <p:nvPr/>
         </p:nvPicPr>
         <p:blipFill>
-          <a:blip r:embed="rId7">
+          <a:blip r:embed="rId7" cstate="print">
             <a:extLst>
               <a:ext uri="{28A0092B-C50C-407E-A947-70E740481C1C}">
                 <a14:useLocalDpi xmlns:a14="http://schemas.microsoft.com/office/drawing/2010/main" val="0"/>
               </a:ext>
               <a:ext uri="{96DAC541-7B7A-43D3-8B79-37D633B846F1}">
-                <asvg:svgBlip xmlns:asvg="http://schemas.microsoft.com/office/drawing/2016/SVG/main" r:embed="rId8"/>
+                <asvg:svgBlip xmlns:asvg="http://schemas.microsoft.com/office/drawing/2016/SVG/main" xmlns="" r:embed="rId8"/>
               </a:ext>
             </a:extLst>
           </a:blip>
@@ -8422,13 +9327,13 @@
           <p:nvPr/>
         </p:nvPicPr>
         <p:blipFill>
-          <a:blip r:embed="rId9">
+          <a:blip r:embed="rId9" cstate="print">
             <a:extLst>
               <a:ext uri="{28A0092B-C50C-407E-A947-70E740481C1C}">
                 <a14:useLocalDpi xmlns:a14="http://schemas.microsoft.com/office/drawing/2010/main" val="0"/>
               </a:ext>
               <a:ext uri="{96DAC541-7B7A-43D3-8B79-37D633B846F1}">
-                <asvg:svgBlip xmlns:asvg="http://schemas.microsoft.com/office/drawing/2016/SVG/main" r:embed="rId10"/>
+                <asvg:svgBlip xmlns:asvg="http://schemas.microsoft.com/office/drawing/2016/SVG/main" xmlns="" r:embed="rId10"/>
               </a:ext>
             </a:extLst>
           </a:blip>
@@ -8540,7 +9445,7 @@
           <p:nvPr/>
         </p:nvPicPr>
         <p:blipFill>
-          <a:blip r:embed="rId4" cstate="print">
+          <a:blip r:embed="rId11" cstate="print">
             <a:extLst>
               <a:ext uri="{28A0092B-C50C-407E-A947-70E740481C1C}">
                 <a14:useLocalDpi xmlns:a14="http://schemas.microsoft.com/office/drawing/2010/main" val="0"/>
@@ -8570,13 +9475,13 @@
           <p:nvPr/>
         </p:nvPicPr>
         <p:blipFill>
-          <a:blip r:embed="rId9">
+          <a:blip r:embed="rId12" cstate="print">
             <a:extLst>
               <a:ext uri="{28A0092B-C50C-407E-A947-70E740481C1C}">
                 <a14:useLocalDpi xmlns:a14="http://schemas.microsoft.com/office/drawing/2010/main" val="0"/>
               </a:ext>
               <a:ext uri="{96DAC541-7B7A-43D3-8B79-37D633B846F1}">
-                <asvg:svgBlip xmlns:asvg="http://schemas.microsoft.com/office/drawing/2016/SVG/main" r:embed="rId10"/>
+                <asvg:svgBlip xmlns:asvg="http://schemas.microsoft.com/office/drawing/2016/SVG/main" xmlns="" r:embed="rId10"/>
               </a:ext>
             </a:extLst>
           </a:blip>
@@ -8603,11 +9508,11 @@
           <p:nvPr/>
         </p:nvPicPr>
         <p:blipFill>
-          <a:blip r:embed="rId5" cstate="print">
+          <a:blip r:embed="rId13" cstate="print">
             <a:extLst>
               <a:ext uri="{BEBA8EAE-BF5A-486C-A8C5-ECC9F3942E4B}">
                 <a14:imgProps xmlns:a14="http://schemas.microsoft.com/office/drawing/2010/main">
-                  <a14:imgLayer r:embed="rId6">
+                  <a14:imgLayer r:embed="rId14">
                     <a14:imgEffect>
                       <a14:backgroundRemoval t="9425" b="94089" l="0" r="100000">
                         <a14:foregroundMark x1="5272" y1="63419" x2="5272" y2="63419"/>
@@ -9062,7 +9967,7 @@
           <p:nvPr/>
         </p:nvPicPr>
         <p:blipFill>
-          <a:blip r:embed="rId11">
+          <a:blip r:embed="rId15">
             <a:extLst>
               <a:ext uri="{28A0092B-C50C-407E-A947-70E740481C1C}">
                 <a14:useLocalDpi xmlns:a14="http://schemas.microsoft.com/office/drawing/2010/main" val="0"/>
@@ -9137,13 +10042,13 @@
           <p:nvPr/>
         </p:nvPicPr>
         <p:blipFill>
-          <a:blip r:embed="rId12">
+          <a:blip r:embed="rId16">
             <a:extLst>
               <a:ext uri="{28A0092B-C50C-407E-A947-70E740481C1C}">
                 <a14:useLocalDpi xmlns:a14="http://schemas.microsoft.com/office/drawing/2010/main" val="0"/>
               </a:ext>
               <a:ext uri="{96DAC541-7B7A-43D3-8B79-37D633B846F1}">
-                <asvg:svgBlip xmlns:asvg="http://schemas.microsoft.com/office/drawing/2016/SVG/main" r:embed="rId13"/>
+                <asvg:svgBlip xmlns:asvg="http://schemas.microsoft.com/office/drawing/2016/SVG/main" xmlns="" r:embed="rId17"/>
               </a:ext>
             </a:extLst>
           </a:blip>
@@ -9170,13 +10075,13 @@
           <p:nvPr/>
         </p:nvPicPr>
         <p:blipFill>
-          <a:blip r:embed="rId14">
+          <a:blip r:embed="rId18" cstate="print">
             <a:extLst>
               <a:ext uri="{28A0092B-C50C-407E-A947-70E740481C1C}">
                 <a14:useLocalDpi xmlns:a14="http://schemas.microsoft.com/office/drawing/2010/main" val="0"/>
               </a:ext>
               <a:ext uri="{96DAC541-7B7A-43D3-8B79-37D633B846F1}">
-                <asvg:svgBlip xmlns:asvg="http://schemas.microsoft.com/office/drawing/2016/SVG/main" r:embed="rId15"/>
+                <asvg:svgBlip xmlns:asvg="http://schemas.microsoft.com/office/drawing/2016/SVG/main" xmlns="" r:embed="rId19"/>
               </a:ext>
             </a:extLst>
           </a:blip>
@@ -9203,13 +10108,13 @@
           <p:nvPr/>
         </p:nvPicPr>
         <p:blipFill>
-          <a:blip r:embed="rId16">
+          <a:blip r:embed="rId20" cstate="print">
             <a:extLst>
               <a:ext uri="{28A0092B-C50C-407E-A947-70E740481C1C}">
                 <a14:useLocalDpi xmlns:a14="http://schemas.microsoft.com/office/drawing/2010/main" val="0"/>
               </a:ext>
               <a:ext uri="{96DAC541-7B7A-43D3-8B79-37D633B846F1}">
-                <asvg:svgBlip xmlns:asvg="http://schemas.microsoft.com/office/drawing/2016/SVG/main" r:embed="rId17"/>
+                <asvg:svgBlip xmlns:asvg="http://schemas.microsoft.com/office/drawing/2016/SVG/main" xmlns="" r:embed="rId21"/>
               </a:ext>
             </a:extLst>
           </a:blip>
@@ -10211,6 +11116,643 @@
 </p:sld>
 </file>
 
+<file path=ppt/slides/slide5.xml><?xml version="1.0" encoding="utf-8"?>
+<p:sld xmlns:a="http://schemas.openxmlformats.org/drawingml/2006/main" xmlns:r="http://schemas.openxmlformats.org/officeDocument/2006/relationships" xmlns:p="http://schemas.openxmlformats.org/presentationml/2006/main">
+  <p:cSld>
+    <p:spTree>
+      <p:nvGrpSpPr>
+        <p:cNvPr id="1" name=""/>
+        <p:cNvGrpSpPr/>
+        <p:nvPr/>
+      </p:nvGrpSpPr>
+      <p:grpSpPr>
+        <a:xfrm>
+          <a:off x="0" y="0"/>
+          <a:ext cx="0" cy="0"/>
+          <a:chOff x="0" y="0"/>
+          <a:chExt cx="0" cy="0"/>
+        </a:xfrm>
+      </p:grpSpPr>
+      <p:sp>
+        <p:nvSpPr>
+          <p:cNvPr id="2" name="Title 1"/>
+          <p:cNvSpPr>
+            <a:spLocks noGrp="1"/>
+          </p:cNvSpPr>
+          <p:nvPr>
+            <p:ph type="title"/>
+          </p:nvPr>
+        </p:nvSpPr>
+        <p:spPr/>
+        <p:txBody>
+          <a:bodyPr/>
+          <a:lstStyle/>
+          <a:p>
+            <a:r>
+              <a:rPr lang="en-GB" dirty="0" smtClean="0"/>
+              <a:t>Server: REST API</a:t>
+            </a:r>
+            <a:endParaRPr lang="de-DE" dirty="0"/>
+          </a:p>
+        </p:txBody>
+      </p:sp>
+      <p:sp>
+        <p:nvSpPr>
+          <p:cNvPr id="5" name="Content Placeholder 4"/>
+          <p:cNvSpPr>
+            <a:spLocks noGrp="1"/>
+          </p:cNvSpPr>
+          <p:nvPr>
+            <p:ph sz="half" idx="1"/>
+          </p:nvPr>
+        </p:nvSpPr>
+        <p:spPr/>
+        <p:txBody>
+          <a:bodyPr anchor="t">
+            <a:normAutofit/>
+          </a:bodyPr>
+          <a:lstStyle/>
+          <a:p>
+            <a:pPr marL="0" indent="0">
+              <a:buNone/>
+            </a:pPr>
+            <a:r>
+              <a:rPr lang="de-DE" sz="1600" dirty="0" smtClean="0"/>
+              <a:t>POST </a:t>
+            </a:r>
+            <a:r>
+              <a:rPr lang="de-DE" sz="1600" dirty="0">
+                <a:hlinkClick r:id="rId2"/>
+              </a:rPr>
+              <a:t>https://</a:t>
+            </a:r>
+            <a:r>
+              <a:rPr lang="de-DE" sz="1600" dirty="0" smtClean="0">
+                <a:hlinkClick r:id="rId2"/>
+              </a:rPr>
+              <a:t>localhost:8443/RetrieveTriples</a:t>
+            </a:r>
+            <a:endParaRPr lang="de-DE" sz="1600" dirty="0" smtClean="0"/>
+          </a:p>
+          <a:p>
+            <a:pPr marL="342900" indent="-342900">
+              <a:buFont typeface="+mj-lt"/>
+              <a:buAutoNum type="arabicPeriod"/>
+            </a:pPr>
+            <a:r>
+              <a:rPr lang="en-GB" sz="1600" dirty="0" smtClean="0"/>
+              <a:t>Retrieves named entities</a:t>
+            </a:r>
+          </a:p>
+          <a:p>
+            <a:pPr lvl="1"/>
+            <a:r>
+              <a:rPr lang="en-GB" sz="1400" dirty="0" smtClean="0"/>
+              <a:t>Type, URI and properties</a:t>
+            </a:r>
+          </a:p>
+          <a:p>
+            <a:pPr marL="342900" indent="-342900">
+              <a:buFont typeface="+mj-lt"/>
+              <a:buAutoNum type="arabicPeriod"/>
+            </a:pPr>
+            <a:r>
+              <a:rPr lang="en-GB" sz="1600" dirty="0" smtClean="0"/>
+              <a:t>Retrieves context triples (connections between entities)</a:t>
+            </a:r>
+            <a:endParaRPr lang="de-DE" sz="1600" dirty="0" smtClean="0"/>
+          </a:p>
+        </p:txBody>
+      </p:sp>
+      <p:sp>
+        <p:nvSpPr>
+          <p:cNvPr id="6" name="Content Placeholder 5"/>
+          <p:cNvSpPr>
+            <a:spLocks noGrp="1"/>
+          </p:cNvSpPr>
+          <p:nvPr>
+            <p:ph sz="half" idx="2"/>
+          </p:nvPr>
+        </p:nvSpPr>
+        <p:spPr/>
+        <p:txBody>
+          <a:bodyPr anchor="t"/>
+          <a:lstStyle/>
+          <a:p>
+            <a:pPr marL="0" indent="0">
+              <a:buNone/>
+            </a:pPr>
+            <a:r>
+              <a:rPr lang="de-DE" sz="1600" dirty="0"/>
+              <a:t>GET </a:t>
+            </a:r>
+            <a:r>
+              <a:rPr lang="de-DE" sz="1600" dirty="0">
+                <a:hlinkClick r:id="rId3"/>
+              </a:rPr>
+              <a:t>https://</a:t>
+            </a:r>
+            <a:r>
+              <a:rPr lang="de-DE" sz="1600" dirty="0" smtClean="0">
+                <a:hlinkClick r:id="rId3"/>
+              </a:rPr>
+              <a:t>localhost:8443/RetrieveAvailableProperties</a:t>
+            </a:r>
+            <a:endParaRPr lang="de-DE" sz="1600" dirty="0" smtClean="0"/>
+          </a:p>
+          <a:p>
+            <a:pPr marL="342900" indent="-342900">
+              <a:buFont typeface="+mj-lt"/>
+              <a:buAutoNum type="arabicPeriod"/>
+            </a:pPr>
+            <a:r>
+              <a:rPr lang="en-GB" sz="1600" dirty="0" smtClean="0"/>
+              <a:t>Retrieves available properties per entity type</a:t>
+            </a:r>
+          </a:p>
+          <a:p>
+            <a:pPr lvl="1"/>
+            <a:r>
+              <a:rPr lang="en-GB" sz="1400" dirty="0" smtClean="0"/>
+              <a:t>URI and label</a:t>
+            </a:r>
+            <a:endParaRPr lang="de-DE" sz="1400" dirty="0"/>
+          </a:p>
+        </p:txBody>
+      </p:sp>
+      <p:sp>
+        <p:nvSpPr>
+          <p:cNvPr id="4" name="Slide Number Placeholder 3"/>
+          <p:cNvSpPr>
+            <a:spLocks noGrp="1"/>
+          </p:cNvSpPr>
+          <p:nvPr>
+            <p:ph type="sldNum" sz="quarter" idx="12"/>
+          </p:nvPr>
+        </p:nvSpPr>
+        <p:spPr/>
+        <p:txBody>
+          <a:bodyPr/>
+          <a:lstStyle/>
+          <a:p>
+            <a:fld id="{2921BF44-F096-42DF-ADC3-B535522D2EE1}" type="slidenum">
+              <a:rPr lang="en-GB" smtClean="0"/>
+              <a:pPr/>
+              <a:t>5</a:t>
+            </a:fld>
+            <a:endParaRPr lang="en-GB" dirty="0"/>
+          </a:p>
+        </p:txBody>
+      </p:sp>
+    </p:spTree>
+    <p:extLst>
+      <p:ext uri="{BB962C8B-B14F-4D97-AF65-F5344CB8AC3E}">
+        <p14:creationId xmlns:p14="http://schemas.microsoft.com/office/powerpoint/2010/main" val="1969511338"/>
+      </p:ext>
+    </p:extLst>
+  </p:cSld>
+  <p:clrMapOvr>
+    <a:masterClrMapping/>
+  </p:clrMapOvr>
+</p:sld>
+</file>
+
+<file path=ppt/slides/slide6.xml><?xml version="1.0" encoding="utf-8"?>
+<p:sld xmlns:a="http://schemas.openxmlformats.org/drawingml/2006/main" xmlns:r="http://schemas.openxmlformats.org/officeDocument/2006/relationships" xmlns:p="http://schemas.openxmlformats.org/presentationml/2006/main">
+  <p:cSld>
+    <p:spTree>
+      <p:nvGrpSpPr>
+        <p:cNvPr id="1" name=""/>
+        <p:cNvGrpSpPr/>
+        <p:nvPr/>
+      </p:nvGrpSpPr>
+      <p:grpSpPr>
+        <a:xfrm>
+          <a:off x="0" y="0"/>
+          <a:ext cx="0" cy="0"/>
+          <a:chOff x="0" y="0"/>
+          <a:chExt cx="0" cy="0"/>
+        </a:xfrm>
+      </p:grpSpPr>
+      <p:sp>
+        <p:nvSpPr>
+          <p:cNvPr id="2" name="Title 1"/>
+          <p:cNvSpPr>
+            <a:spLocks noGrp="1"/>
+          </p:cNvSpPr>
+          <p:nvPr>
+            <p:ph type="title"/>
+          </p:nvPr>
+        </p:nvSpPr>
+        <p:spPr/>
+        <p:txBody>
+          <a:bodyPr/>
+          <a:lstStyle/>
+          <a:p>
+            <a:r>
+              <a:rPr lang="en-GB" dirty="0" smtClean="0"/>
+              <a:t>Chrome extension</a:t>
+            </a:r>
+            <a:endParaRPr lang="de-DE" dirty="0"/>
+          </a:p>
+        </p:txBody>
+      </p:sp>
+      <p:sp>
+        <p:nvSpPr>
+          <p:cNvPr id="3" name="Content Placeholder 2"/>
+          <p:cNvSpPr>
+            <a:spLocks noGrp="1"/>
+          </p:cNvSpPr>
+          <p:nvPr>
+            <p:ph idx="1"/>
+          </p:nvPr>
+        </p:nvSpPr>
+        <p:spPr/>
+        <p:txBody>
+          <a:bodyPr anchor="t"/>
+          <a:lstStyle/>
+          <a:p>
+            <a:r>
+              <a:rPr lang="en-GB" dirty="0" smtClean="0"/>
+              <a:t>Background script on websites</a:t>
+            </a:r>
+          </a:p>
+          <a:p>
+            <a:r>
+              <a:rPr lang="en-GB" dirty="0" smtClean="0"/>
+              <a:t>Injects HTML and JavaScript</a:t>
+            </a:r>
+          </a:p>
+          <a:p>
+            <a:r>
+              <a:rPr lang="en-GB" dirty="0" smtClean="0"/>
+              <a:t>Handles communication with server</a:t>
+            </a:r>
+            <a:endParaRPr lang="de-DE" dirty="0"/>
+          </a:p>
+        </p:txBody>
+      </p:sp>
+      <p:sp>
+        <p:nvSpPr>
+          <p:cNvPr id="4" name="Slide Number Placeholder 3"/>
+          <p:cNvSpPr>
+            <a:spLocks noGrp="1"/>
+          </p:cNvSpPr>
+          <p:nvPr>
+            <p:ph type="sldNum" sz="quarter" idx="12"/>
+          </p:nvPr>
+        </p:nvSpPr>
+        <p:spPr/>
+        <p:txBody>
+          <a:bodyPr/>
+          <a:lstStyle/>
+          <a:p>
+            <a:fld id="{2921BF44-F096-42DF-ADC3-B535522D2EE1}" type="slidenum">
+              <a:rPr lang="en-GB" smtClean="0"/>
+              <a:pPr/>
+              <a:t>6</a:t>
+            </a:fld>
+            <a:endParaRPr lang="en-GB" dirty="0"/>
+          </a:p>
+        </p:txBody>
+      </p:sp>
+    </p:spTree>
+    <p:extLst>
+      <p:ext uri="{BB962C8B-B14F-4D97-AF65-F5344CB8AC3E}">
+        <p14:creationId xmlns:p14="http://schemas.microsoft.com/office/powerpoint/2010/main" val="1563711952"/>
+      </p:ext>
+    </p:extLst>
+  </p:cSld>
+  <p:clrMapOvr>
+    <a:masterClrMapping/>
+  </p:clrMapOvr>
+</p:sld>
+</file>
+
+<file path=ppt/slides/slide7.xml><?xml version="1.0" encoding="utf-8"?>
+<p:sld xmlns:a="http://schemas.openxmlformats.org/drawingml/2006/main" xmlns:r="http://schemas.openxmlformats.org/officeDocument/2006/relationships" xmlns:p="http://schemas.openxmlformats.org/presentationml/2006/main">
+  <p:cSld>
+    <p:spTree>
+      <p:nvGrpSpPr>
+        <p:cNvPr id="1" name=""/>
+        <p:cNvGrpSpPr/>
+        <p:nvPr/>
+      </p:nvGrpSpPr>
+      <p:grpSpPr>
+        <a:xfrm>
+          <a:off x="0" y="0"/>
+          <a:ext cx="0" cy="0"/>
+          <a:chOff x="0" y="0"/>
+          <a:chExt cx="0" cy="0"/>
+        </a:xfrm>
+      </p:grpSpPr>
+      <p:sp>
+        <p:nvSpPr>
+          <p:cNvPr id="5" name="Title 4"/>
+          <p:cNvSpPr>
+            <a:spLocks noGrp="1"/>
+          </p:cNvSpPr>
+          <p:nvPr>
+            <p:ph type="ctrTitle"/>
+          </p:nvPr>
+        </p:nvSpPr>
+        <p:spPr>
+          <a:xfrm>
+            <a:off x="1687430" y="2098525"/>
+            <a:ext cx="8574622" cy="2616199"/>
+          </a:xfrm>
+        </p:spPr>
+        <p:txBody>
+          <a:bodyPr anchor="ctr"/>
+          <a:lstStyle/>
+          <a:p>
+            <a:pPr algn="ctr"/>
+            <a:r>
+              <a:rPr lang="en-GB" dirty="0" smtClean="0"/>
+              <a:t>Demo</a:t>
+            </a:r>
+            <a:endParaRPr lang="de-DE" dirty="0"/>
+          </a:p>
+        </p:txBody>
+      </p:sp>
+      <p:sp>
+        <p:nvSpPr>
+          <p:cNvPr id="4" name="Slide Number Placeholder 3"/>
+          <p:cNvSpPr>
+            <a:spLocks noGrp="1"/>
+          </p:cNvSpPr>
+          <p:nvPr>
+            <p:ph type="sldNum" sz="quarter" idx="12"/>
+          </p:nvPr>
+        </p:nvSpPr>
+        <p:spPr/>
+        <p:txBody>
+          <a:bodyPr/>
+          <a:lstStyle/>
+          <a:p>
+            <a:fld id="{2921BF44-F096-42DF-ADC3-B535522D2EE1}" type="slidenum">
+              <a:rPr lang="en-GB" smtClean="0"/>
+              <a:pPr/>
+              <a:t>7</a:t>
+            </a:fld>
+            <a:endParaRPr lang="en-GB" dirty="0"/>
+          </a:p>
+        </p:txBody>
+      </p:sp>
+    </p:spTree>
+    <p:extLst>
+      <p:ext uri="{BB962C8B-B14F-4D97-AF65-F5344CB8AC3E}">
+        <p14:creationId xmlns:p14="http://schemas.microsoft.com/office/powerpoint/2010/main" val="2827875898"/>
+      </p:ext>
+    </p:extLst>
+  </p:cSld>
+  <p:clrMapOvr>
+    <a:masterClrMapping/>
+  </p:clrMapOvr>
+</p:sld>
+</file>
+
+<file path=ppt/slides/slide8.xml><?xml version="1.0" encoding="utf-8"?>
+<p:sld xmlns:a="http://schemas.openxmlformats.org/drawingml/2006/main" xmlns:r="http://schemas.openxmlformats.org/officeDocument/2006/relationships" xmlns:p="http://schemas.openxmlformats.org/presentationml/2006/main">
+  <p:cSld>
+    <p:spTree>
+      <p:nvGrpSpPr>
+        <p:cNvPr id="1" name=""/>
+        <p:cNvGrpSpPr/>
+        <p:nvPr/>
+      </p:nvGrpSpPr>
+      <p:grpSpPr>
+        <a:xfrm>
+          <a:off x="0" y="0"/>
+          <a:ext cx="0" cy="0"/>
+          <a:chOff x="0" y="0"/>
+          <a:chExt cx="0" cy="0"/>
+        </a:xfrm>
+      </p:grpSpPr>
+      <p:sp>
+        <p:nvSpPr>
+          <p:cNvPr id="2" name="Title 1"/>
+          <p:cNvSpPr>
+            <a:spLocks noGrp="1"/>
+          </p:cNvSpPr>
+          <p:nvPr>
+            <p:ph type="title"/>
+          </p:nvPr>
+        </p:nvSpPr>
+        <p:spPr/>
+        <p:txBody>
+          <a:bodyPr/>
+          <a:lstStyle/>
+          <a:p>
+            <a:r>
+              <a:rPr lang="en-GB" dirty="0" smtClean="0"/>
+              <a:t>Conclusion</a:t>
+            </a:r>
+            <a:endParaRPr lang="de-DE" dirty="0"/>
+          </a:p>
+        </p:txBody>
+      </p:sp>
+      <p:sp>
+        <p:nvSpPr>
+          <p:cNvPr id="3" name="Content Placeholder 2"/>
+          <p:cNvSpPr>
+            <a:spLocks noGrp="1"/>
+          </p:cNvSpPr>
+          <p:nvPr>
+            <p:ph idx="1"/>
+          </p:nvPr>
+        </p:nvSpPr>
+        <p:spPr/>
+        <p:txBody>
+          <a:bodyPr anchor="t">
+            <a:normAutofit/>
+          </a:bodyPr>
+          <a:lstStyle/>
+          <a:p>
+            <a:r>
+              <a:rPr lang="en-GB" dirty="0"/>
+              <a:t>Extensible </a:t>
+            </a:r>
+            <a:r>
+              <a:rPr lang="en-GB" dirty="0" smtClean="0"/>
+              <a:t>architecture</a:t>
+            </a:r>
+          </a:p>
+          <a:p>
+            <a:r>
+              <a:rPr lang="en-GB" dirty="0" smtClean="0"/>
+              <a:t>Easily consumable application</a:t>
+            </a:r>
+          </a:p>
+          <a:p>
+            <a:pPr lvl="1"/>
+            <a:r>
+              <a:rPr lang="en-GB" dirty="0" smtClean="0"/>
+              <a:t>Retrieves additional information about entities</a:t>
+            </a:r>
+          </a:p>
+          <a:p>
+            <a:pPr lvl="1"/>
+            <a:r>
+              <a:rPr lang="en-GB" dirty="0" smtClean="0"/>
+              <a:t>Visualizes connections between entities</a:t>
+            </a:r>
+          </a:p>
+          <a:p>
+            <a:pPr marL="0" indent="0">
+              <a:buNone/>
+            </a:pPr>
+            <a:r>
+              <a:rPr lang="en-GB" dirty="0" smtClean="0">
+                <a:sym typeface="Wingdings" panose="05000000000000000000" pitchFamily="2" charset="2"/>
+              </a:rPr>
+              <a:t> </a:t>
+            </a:r>
+            <a:r>
+              <a:rPr lang="en-GB" dirty="0" smtClean="0"/>
+              <a:t>User saves time: No Wikipedia lookups </a:t>
+            </a:r>
+            <a:r>
+              <a:rPr lang="en-GB" dirty="0" err="1" smtClean="0"/>
+              <a:t>neccessary</a:t>
+            </a:r>
+            <a:endParaRPr lang="en-GB" dirty="0" smtClean="0"/>
+          </a:p>
+        </p:txBody>
+      </p:sp>
+      <p:sp>
+        <p:nvSpPr>
+          <p:cNvPr id="4" name="Slide Number Placeholder 3"/>
+          <p:cNvSpPr>
+            <a:spLocks noGrp="1"/>
+          </p:cNvSpPr>
+          <p:nvPr>
+            <p:ph type="sldNum" sz="quarter" idx="12"/>
+          </p:nvPr>
+        </p:nvSpPr>
+        <p:spPr/>
+        <p:txBody>
+          <a:bodyPr/>
+          <a:lstStyle/>
+          <a:p>
+            <a:fld id="{2921BF44-F096-42DF-ADC3-B535522D2EE1}" type="slidenum">
+              <a:rPr lang="en-GB" smtClean="0"/>
+              <a:pPr/>
+              <a:t>8</a:t>
+            </a:fld>
+            <a:endParaRPr lang="en-GB" dirty="0"/>
+          </a:p>
+        </p:txBody>
+      </p:sp>
+    </p:spTree>
+    <p:extLst>
+      <p:ext uri="{BB962C8B-B14F-4D97-AF65-F5344CB8AC3E}">
+        <p14:creationId xmlns:p14="http://schemas.microsoft.com/office/powerpoint/2010/main" val="2861008330"/>
+      </p:ext>
+    </p:extLst>
+  </p:cSld>
+  <p:clrMapOvr>
+    <a:masterClrMapping/>
+  </p:clrMapOvr>
+</p:sld>
+</file>
+
+<file path=ppt/slides/slide9.xml><?xml version="1.0" encoding="utf-8"?>
+<p:sld xmlns:a="http://schemas.openxmlformats.org/drawingml/2006/main" xmlns:r="http://schemas.openxmlformats.org/officeDocument/2006/relationships" xmlns:p="http://schemas.openxmlformats.org/presentationml/2006/main">
+  <p:cSld>
+    <p:spTree>
+      <p:nvGrpSpPr>
+        <p:cNvPr id="1" name=""/>
+        <p:cNvGrpSpPr/>
+        <p:nvPr/>
+      </p:nvGrpSpPr>
+      <p:grpSpPr>
+        <a:xfrm>
+          <a:off x="0" y="0"/>
+          <a:ext cx="0" cy="0"/>
+          <a:chOff x="0" y="0"/>
+          <a:chExt cx="0" cy="0"/>
+        </a:xfrm>
+      </p:grpSpPr>
+      <p:sp>
+        <p:nvSpPr>
+          <p:cNvPr id="2" name="Title 1"/>
+          <p:cNvSpPr>
+            <a:spLocks noGrp="1"/>
+          </p:cNvSpPr>
+          <p:nvPr>
+            <p:ph type="title"/>
+          </p:nvPr>
+        </p:nvSpPr>
+        <p:spPr/>
+        <p:txBody>
+          <a:bodyPr/>
+          <a:lstStyle/>
+          <a:p>
+            <a:r>
+              <a:rPr lang="en-GB" dirty="0" smtClean="0"/>
+              <a:t>Backup</a:t>
+            </a:r>
+            <a:endParaRPr lang="de-DE" dirty="0"/>
+          </a:p>
+        </p:txBody>
+      </p:sp>
+      <p:sp>
+        <p:nvSpPr>
+          <p:cNvPr id="3" name="Content Placeholder 2"/>
+          <p:cNvSpPr>
+            <a:spLocks noGrp="1"/>
+          </p:cNvSpPr>
+          <p:nvPr>
+            <p:ph idx="1"/>
+          </p:nvPr>
+        </p:nvSpPr>
+        <p:spPr/>
+        <p:txBody>
+          <a:bodyPr/>
+          <a:lstStyle/>
+          <a:p>
+            <a:endParaRPr lang="de-DE"/>
+          </a:p>
+        </p:txBody>
+      </p:sp>
+      <p:sp>
+        <p:nvSpPr>
+          <p:cNvPr id="4" name="Slide Number Placeholder 3"/>
+          <p:cNvSpPr>
+            <a:spLocks noGrp="1"/>
+          </p:cNvSpPr>
+          <p:nvPr>
+            <p:ph type="sldNum" sz="quarter" idx="12"/>
+          </p:nvPr>
+        </p:nvSpPr>
+        <p:spPr/>
+        <p:txBody>
+          <a:bodyPr/>
+          <a:lstStyle/>
+          <a:p>
+            <a:fld id="{2921BF44-F096-42DF-ADC3-B535522D2EE1}" type="slidenum">
+              <a:rPr lang="en-GB" smtClean="0"/>
+              <a:pPr/>
+              <a:t>9</a:t>
+            </a:fld>
+            <a:endParaRPr lang="en-GB" dirty="0"/>
+          </a:p>
+        </p:txBody>
+      </p:sp>
+    </p:spTree>
+    <p:extLst>
+      <p:ext uri="{BB962C8B-B14F-4D97-AF65-F5344CB8AC3E}">
+        <p14:creationId xmlns:p14="http://schemas.microsoft.com/office/powerpoint/2010/main" val="333537589"/>
+      </p:ext>
+    </p:extLst>
+  </p:cSld>
+  <p:clrMapOvr>
+    <a:masterClrMapping/>
+  </p:clrMapOvr>
+</p:sld>
+</file>
+
 <file path=ppt/theme/theme1.xml><?xml version="1.0" encoding="utf-8"?>
 <a:theme xmlns:a="http://schemas.openxmlformats.org/drawingml/2006/main" name="Parallax">
   <a:themeElements>
@@ -10461,7 +12003,7 @@
   <a:extraClrSchemeLst/>
   <a:extLst>
     <a:ext uri="{05A4C25C-085E-4340-85A3-A5531E510DB2}">
-      <thm15:themeFamily xmlns:thm15="http://schemas.microsoft.com/office/thememl/2012/main" name="Parallax" id="{3388167B-A2EB-4685-9635-1831D9AEF8C4}" vid="{4F7A876A-7598-49CA-AFC8-8EDA2551E4A7}"/>
+      <thm15:themeFamily xmlns:thm15="http://schemas.microsoft.com/office/thememl/2012/main" xmlns="" name="Parallax" id="{3388167B-A2EB-4685-9635-1831D9AEF8C4}" vid="{4F7A876A-7598-49CA-AFC8-8EDA2551E4A7}"/>
     </a:ext>
   </a:extLst>
 </a:theme>
@@ -10722,7 +12264,7 @@
   <a:extraClrSchemeLst/>
   <a:extLst>
     <a:ext uri="{05A4C25C-085E-4340-85A3-A5531E510DB2}">
-      <thm15:themeFamily xmlns:thm15="http://schemas.microsoft.com/office/thememl/2012/main" name="Office Theme" id="{62F939B6-93AF-4DB8-9C6B-D6C7DFDC589F}" vid="{4A3C46E8-61CC-4603-A589-7422A47A8E4A}"/>
+      <thm15:themeFamily xmlns:thm15="http://schemas.microsoft.com/office/thememl/2012/main" xmlns="" name="Office Theme" id="{62F939B6-93AF-4DB8-9C6B-D6C7DFDC589F}" vid="{4A3C46E8-61CC-4603-A589-7422A47A8E4A}"/>
     </a:ext>
   </a:extLst>
 </a:theme>

</xml_diff>

<commit_message>
Texts and arrows in presentation
</commit_message>
<xml_diff>
--- a/ProjectPresentation/EntityAnnotation.pptx
+++ b/ProjectPresentation/EntityAnnotation.pptx
@@ -121,7 +121,7 @@
   </p:defaultTextStyle>
   <p:extLst>
     <p:ext uri="{EFAFB233-063F-42B5-8137-9DF3F51BA10A}">
-      <p15:sldGuideLst xmlns:p15="http://schemas.microsoft.com/office/powerpoint/2012/main">
+      <p15:sldGuideLst xmlns:p15="http://schemas.microsoft.com/office/powerpoint/2012/main" xmlns="">
         <p15:guide id="1" orient="horz" pos="2160">
           <p15:clr>
             <a:srgbClr val="A4A3A4"/>
@@ -379,7 +379,7 @@
           <a:p>
             <a:fld id="{6B56D088-27D1-433A-A9A9-E30AD3E13E16}" type="slidenum">
               <a:rPr lang="en-GB" smtClean="0"/>
-              <a:t>‹Nr.›</a:t>
+              <a:t>‹#›</a:t>
             </a:fld>
             <a:endParaRPr lang="en-GB"/>
           </a:p>
@@ -2109,7 +2109,7 @@
           <a:p>
             <a:fld id="{2921BF44-F096-42DF-ADC3-B535522D2EE1}" type="slidenum">
               <a:rPr lang="en-GB" smtClean="0"/>
-              <a:t>‹Nr.›</a:t>
+              <a:t>‹#›</a:t>
             </a:fld>
             <a:endParaRPr lang="en-GB"/>
           </a:p>
@@ -2403,7 +2403,7 @@
           <a:p>
             <a:fld id="{2921BF44-F096-42DF-ADC3-B535522D2EE1}" type="slidenum">
               <a:rPr lang="en-GB" smtClean="0"/>
-              <a:t>‹Nr.›</a:t>
+              <a:t>‹#›</a:t>
             </a:fld>
             <a:endParaRPr lang="en-GB"/>
           </a:p>
@@ -2654,7 +2654,7 @@
           <a:p>
             <a:fld id="{2921BF44-F096-42DF-ADC3-B535522D2EE1}" type="slidenum">
               <a:rPr lang="en-GB" smtClean="0"/>
-              <a:t>‹Nr.›</a:t>
+              <a:t>‹#›</a:t>
             </a:fld>
             <a:endParaRPr lang="en-GB"/>
           </a:p>
@@ -3197,7 +3197,7 @@
           <a:p>
             <a:fld id="{2921BF44-F096-42DF-ADC3-B535522D2EE1}" type="slidenum">
               <a:rPr lang="en-GB" smtClean="0"/>
-              <a:t>‹Nr.›</a:t>
+              <a:t>‹#›</a:t>
             </a:fld>
             <a:endParaRPr lang="en-GB"/>
           </a:p>
@@ -3448,7 +3448,7 @@
           <a:p>
             <a:fld id="{2921BF44-F096-42DF-ADC3-B535522D2EE1}" type="slidenum">
               <a:rPr lang="en-GB" smtClean="0"/>
-              <a:t>‹Nr.›</a:t>
+              <a:t>‹#›</a:t>
             </a:fld>
             <a:endParaRPr lang="en-GB"/>
           </a:p>
@@ -3983,7 +3983,7 @@
           <a:p>
             <a:fld id="{2921BF44-F096-42DF-ADC3-B535522D2EE1}" type="slidenum">
               <a:rPr lang="en-GB" smtClean="0"/>
-              <a:t>‹Nr.›</a:t>
+              <a:t>‹#›</a:t>
             </a:fld>
             <a:endParaRPr lang="en-GB"/>
           </a:p>
@@ -4283,7 +4283,7 @@
           <a:p>
             <a:fld id="{2921BF44-F096-42DF-ADC3-B535522D2EE1}" type="slidenum">
               <a:rPr lang="en-GB" smtClean="0"/>
-              <a:t>‹Nr.›</a:t>
+              <a:t>‹#›</a:t>
             </a:fld>
             <a:endParaRPr lang="en-GB"/>
           </a:p>
@@ -4460,7 +4460,7 @@
           <a:p>
             <a:fld id="{2921BF44-F096-42DF-ADC3-B535522D2EE1}" type="slidenum">
               <a:rPr lang="en-GB" smtClean="0"/>
-              <a:t>‹Nr.›</a:t>
+              <a:t>‹#›</a:t>
             </a:fld>
             <a:endParaRPr lang="en-GB"/>
           </a:p>
@@ -4643,7 +4643,7 @@
           <a:p>
             <a:fld id="{2921BF44-F096-42DF-ADC3-B535522D2EE1}" type="slidenum">
               <a:rPr lang="en-GB" smtClean="0"/>
-              <a:t>‹Nr.›</a:t>
+              <a:t>‹#›</a:t>
             </a:fld>
             <a:endParaRPr lang="en-GB"/>
           </a:p>
@@ -4850,7 +4850,7 @@
             <a:fld id="{2921BF44-F096-42DF-ADC3-B535522D2EE1}" type="slidenum">
               <a:rPr lang="en-GB" smtClean="0"/>
               <a:pPr/>
-              <a:t>‹Nr.›</a:t>
+              <a:t>‹#›</a:t>
             </a:fld>
             <a:endParaRPr lang="en-GB" dirty="0"/>
           </a:p>
@@ -5099,7 +5099,7 @@
           <a:p>
             <a:fld id="{2921BF44-F096-42DF-ADC3-B535522D2EE1}" type="slidenum">
               <a:rPr lang="en-GB" smtClean="0"/>
-              <a:t>‹Nr.›</a:t>
+              <a:t>‹#›</a:t>
             </a:fld>
             <a:endParaRPr lang="en-GB"/>
           </a:p>
@@ -5399,7 +5399,7 @@
           <a:p>
             <a:fld id="{2921BF44-F096-42DF-ADC3-B535522D2EE1}" type="slidenum">
               <a:rPr lang="en-GB" smtClean="0"/>
-              <a:t>‹Nr.›</a:t>
+              <a:t>‹#›</a:t>
             </a:fld>
             <a:endParaRPr lang="en-GB"/>
           </a:p>
@@ -5844,7 +5844,7 @@
           <a:p>
             <a:fld id="{2921BF44-F096-42DF-ADC3-B535522D2EE1}" type="slidenum">
               <a:rPr lang="en-GB" smtClean="0"/>
-              <a:t>‹Nr.›</a:t>
+              <a:t>‹#›</a:t>
             </a:fld>
             <a:endParaRPr lang="en-GB"/>
           </a:p>
@@ -5965,7 +5965,7 @@
           <a:p>
             <a:fld id="{2921BF44-F096-42DF-ADC3-B535522D2EE1}" type="slidenum">
               <a:rPr lang="en-GB" smtClean="0"/>
-              <a:t>‹Nr.›</a:t>
+              <a:t>‹#›</a:t>
             </a:fld>
             <a:endParaRPr lang="en-GB"/>
           </a:p>
@@ -6063,7 +6063,7 @@
           <a:p>
             <a:fld id="{2921BF44-F096-42DF-ADC3-B535522D2EE1}" type="slidenum">
               <a:rPr lang="en-GB" smtClean="0"/>
-              <a:t>‹Nr.›</a:t>
+              <a:t>‹#›</a:t>
             </a:fld>
             <a:endParaRPr lang="en-GB"/>
           </a:p>
@@ -6349,7 +6349,7 @@
           <a:p>
             <a:fld id="{2921BF44-F096-42DF-ADC3-B535522D2EE1}" type="slidenum">
               <a:rPr lang="en-GB" smtClean="0"/>
-              <a:t>‹Nr.›</a:t>
+              <a:t>‹#›</a:t>
             </a:fld>
             <a:endParaRPr lang="en-GB"/>
           </a:p>
@@ -6643,7 +6643,7 @@
           <a:p>
             <a:fld id="{2921BF44-F096-42DF-ADC3-B535522D2EE1}" type="slidenum">
               <a:rPr lang="en-GB" smtClean="0"/>
-              <a:t>‹Nr.›</a:t>
+              <a:t>‹#›</a:t>
             </a:fld>
             <a:endParaRPr lang="en-GB"/>
           </a:p>
@@ -6896,7 +6896,7 @@
           <a:p>
             <a:fld id="{2921BF44-F096-42DF-ADC3-B535522D2EE1}" type="slidenum">
               <a:rPr lang="en-GB" smtClean="0"/>
-              <a:t>‹Nr.›</a:t>
+              <a:t>‹#›</a:t>
             </a:fld>
             <a:endParaRPr lang="en-GB"/>
           </a:p>
@@ -7980,6 +7980,14 @@
   <p:clrMapOvr>
     <a:masterClrMapping/>
   </p:clrMapOvr>
+  <mc:AlternateContent xmlns:mc="http://schemas.openxmlformats.org/markup-compatibility/2006">
+    <mc:Choice xmlns:p14="http://schemas.microsoft.com/office/powerpoint/2010/main" Requires="p14">
+      <p:transition spd="slow" p14:dur="2000"/>
+    </mc:Choice>
+    <mc:Fallback>
+      <p:transition spd="slow"/>
+    </mc:Fallback>
+  </mc:AlternateContent>
 </p:sld>
 </file>
 
@@ -8171,6 +8179,10 @@
               </a:rPr>
               <a:t>https://localhost:8443/RetrieveTriples</a:t>
             </a:r>
+            <a:r>
+              <a:rPr lang="de-DE" dirty="0"/>
+              <a:t/>
+            </a:r>
             <a:br>
               <a:rPr lang="de-DE" dirty="0"/>
             </a:br>
@@ -8213,6 +8225,10 @@
             <a:pPr marL="0" indent="0">
               <a:buNone/>
             </a:pPr>
+            <a:r>
+              <a:rPr lang="en-GB" dirty="0"/>
+              <a:t/>
+            </a:r>
             <a:br>
               <a:rPr lang="en-GB" dirty="0"/>
             </a:br>
@@ -8942,7 +8958,7 @@
                 <a14:useLocalDpi xmlns:a14="http://schemas.microsoft.com/office/drawing/2010/main" val="0"/>
               </a:ext>
               <a:ext uri="{96DAC541-7B7A-43D3-8B79-37D633B846F1}">
-                <asvg:svgBlip xmlns:asvg="http://schemas.microsoft.com/office/drawing/2016/SVG/main" r:embed="rId7"/>
+                <asvg:svgBlip xmlns:asvg="http://schemas.microsoft.com/office/drawing/2016/SVG/main" xmlns="" r:embed="rId7"/>
               </a:ext>
             </a:extLst>
           </a:blip>
@@ -8975,7 +8991,7 @@
                 <a14:useLocalDpi xmlns:a14="http://schemas.microsoft.com/office/drawing/2010/main" val="0"/>
               </a:ext>
               <a:ext uri="{96DAC541-7B7A-43D3-8B79-37D633B846F1}">
-                <asvg:svgBlip xmlns:asvg="http://schemas.microsoft.com/office/drawing/2016/SVG/main" r:embed="rId9"/>
+                <asvg:svgBlip xmlns:asvg="http://schemas.microsoft.com/office/drawing/2016/SVG/main" xmlns="" r:embed="rId9"/>
               </a:ext>
             </a:extLst>
           </a:blip>
@@ -9596,7 +9612,7 @@
                   <a14:useLocalDpi xmlns:a14="http://schemas.microsoft.com/office/drawing/2010/main" val="0"/>
                 </a:ext>
                 <a:ext uri="{96DAC541-7B7A-43D3-8B79-37D633B846F1}">
-                  <asvg:svgBlip xmlns:asvg="http://schemas.microsoft.com/office/drawing/2016/SVG/main" r:embed="rId5"/>
+                  <asvg:svgBlip xmlns:asvg="http://schemas.microsoft.com/office/drawing/2016/SVG/main" xmlns="" r:embed="rId5"/>
                 </a:ext>
               </a:extLst>
             </a:blip>
@@ -9756,7 +9772,7 @@
                   <a14:useLocalDpi xmlns:a14="http://schemas.microsoft.com/office/drawing/2010/main" val="0"/>
                 </a:ext>
                 <a:ext uri="{96DAC541-7B7A-43D3-8B79-37D633B846F1}">
-                  <asvg:svgBlip xmlns:asvg="http://schemas.microsoft.com/office/drawing/2016/SVG/main" r:embed="rId9"/>
+                  <asvg:svgBlip xmlns:asvg="http://schemas.microsoft.com/office/drawing/2016/SVG/main" xmlns="" r:embed="rId9"/>
                 </a:ext>
               </a:extLst>
             </a:blip>
@@ -9849,7 +9865,7 @@
                     <a14:useLocalDpi xmlns:a14="http://schemas.microsoft.com/office/drawing/2010/main" val="0"/>
                   </a:ext>
                   <a:ext uri="{96DAC541-7B7A-43D3-8B79-37D633B846F1}">
-                    <asvg:svgBlip xmlns:asvg="http://schemas.microsoft.com/office/drawing/2016/SVG/main" r:embed="rId11"/>
+                    <asvg:svgBlip xmlns:asvg="http://schemas.microsoft.com/office/drawing/2016/SVG/main" xmlns="" r:embed="rId11"/>
                   </a:ext>
                 </a:extLst>
               </a:blip>
@@ -9882,7 +9898,7 @@
                     <a14:useLocalDpi xmlns:a14="http://schemas.microsoft.com/office/drawing/2010/main" val="0"/>
                   </a:ext>
                   <a:ext uri="{96DAC541-7B7A-43D3-8B79-37D633B846F1}">
-                    <asvg:svgBlip xmlns:asvg="http://schemas.microsoft.com/office/drawing/2016/SVG/main" r:embed="rId13"/>
+                    <asvg:svgBlip xmlns:asvg="http://schemas.microsoft.com/office/drawing/2016/SVG/main" xmlns="" r:embed="rId13"/>
                   </a:ext>
                 </a:extLst>
               </a:blip>
@@ -10064,7 +10080,7 @@
                 <a14:useLocalDpi xmlns:a14="http://schemas.microsoft.com/office/drawing/2010/main" val="0"/>
               </a:ext>
               <a:ext uri="{96DAC541-7B7A-43D3-8B79-37D633B846F1}">
-                <asvg:svgBlip xmlns:asvg="http://schemas.microsoft.com/office/drawing/2016/SVG/main" r:embed="rId18"/>
+                <asvg:svgBlip xmlns:asvg="http://schemas.microsoft.com/office/drawing/2016/SVG/main" xmlns="" r:embed="rId18"/>
               </a:ext>
             </a:extLst>
           </a:blip>
@@ -10097,7 +10113,7 @@
                 <a14:useLocalDpi xmlns:a14="http://schemas.microsoft.com/office/drawing/2010/main" val="0"/>
               </a:ext>
               <a:ext uri="{96DAC541-7B7A-43D3-8B79-37D633B846F1}">
-                <asvg:svgBlip xmlns:asvg="http://schemas.microsoft.com/office/drawing/2016/SVG/main" r:embed="rId20"/>
+                <asvg:svgBlip xmlns:asvg="http://schemas.microsoft.com/office/drawing/2016/SVG/main" xmlns="" r:embed="rId20"/>
               </a:ext>
             </a:extLst>
           </a:blip>
@@ -10476,13 +10492,13 @@
             <p:nvPr/>
           </p:nvPicPr>
           <p:blipFill>
-            <a:blip r:embed="rId12" cstate="print">
+            <a:blip r:embed="rId24" cstate="print">
               <a:extLst>
                 <a:ext uri="{28A0092B-C50C-407E-A947-70E740481C1C}">
                   <a14:useLocalDpi xmlns:a14="http://schemas.microsoft.com/office/drawing/2010/main" val="0"/>
                 </a:ext>
                 <a:ext uri="{96DAC541-7B7A-43D3-8B79-37D633B846F1}">
-                  <asvg:svgBlip xmlns:asvg="http://schemas.microsoft.com/office/drawing/2016/SVG/main" r:embed="rId13"/>
+                  <asvg:svgBlip xmlns:asvg="http://schemas.microsoft.com/office/drawing/2016/SVG/main" xmlns="" r:embed="rId13"/>
                 </a:ext>
               </a:extLst>
             </a:blip>
@@ -12053,7 +12069,7 @@
                   <a14:useLocalDpi xmlns:a14="http://schemas.microsoft.com/office/drawing/2010/main" val="0"/>
                 </a:ext>
                 <a:ext uri="{96DAC541-7B7A-43D3-8B79-37D633B846F1}">
-                  <asvg:svgBlip xmlns:asvg="http://schemas.microsoft.com/office/drawing/2016/SVG/main" r:embed="rId6"/>
+                  <asvg:svgBlip xmlns:asvg="http://schemas.microsoft.com/office/drawing/2016/SVG/main" xmlns="" r:embed="rId6"/>
                 </a:ext>
               </a:extLst>
             </a:blip>
@@ -12212,7 +12228,7 @@
                 <a14:useLocalDpi xmlns:a14="http://schemas.microsoft.com/office/drawing/2010/main" val="0"/>
               </a:ext>
               <a:ext uri="{96DAC541-7B7A-43D3-8B79-37D633B846F1}">
-                <asvg:svgBlip xmlns:asvg="http://schemas.microsoft.com/office/drawing/2016/SVG/main" r:embed="rId8"/>
+                <asvg:svgBlip xmlns:asvg="http://schemas.microsoft.com/office/drawing/2016/SVG/main" xmlns="" r:embed="rId8"/>
               </a:ext>
             </a:extLst>
           </a:blip>
@@ -12259,7 +12275,7 @@
                   <a14:useLocalDpi xmlns:a14="http://schemas.microsoft.com/office/drawing/2010/main" val="0"/>
                 </a:ext>
                 <a:ext uri="{96DAC541-7B7A-43D3-8B79-37D633B846F1}">
-                  <asvg:svgBlip xmlns:asvg="http://schemas.microsoft.com/office/drawing/2016/SVG/main" r:embed="rId10"/>
+                  <asvg:svgBlip xmlns:asvg="http://schemas.microsoft.com/office/drawing/2016/SVG/main" xmlns="" r:embed="rId10"/>
                 </a:ext>
               </a:extLst>
             </a:blip>
@@ -12352,7 +12368,7 @@
                     <a14:useLocalDpi xmlns:a14="http://schemas.microsoft.com/office/drawing/2010/main" val="0"/>
                   </a:ext>
                   <a:ext uri="{96DAC541-7B7A-43D3-8B79-37D633B846F1}">
-                    <asvg:svgBlip xmlns:asvg="http://schemas.microsoft.com/office/drawing/2016/SVG/main" r:embed="rId12"/>
+                    <asvg:svgBlip xmlns:asvg="http://schemas.microsoft.com/office/drawing/2016/SVG/main" xmlns="" r:embed="rId12"/>
                   </a:ext>
                 </a:extLst>
               </a:blip>
@@ -12506,7 +12522,7 @@
                   <a14:useLocalDpi xmlns:a14="http://schemas.microsoft.com/office/drawing/2010/main" val="0"/>
                 </a:ext>
                 <a:ext uri="{96DAC541-7B7A-43D3-8B79-37D633B846F1}">
-                  <asvg:svgBlip xmlns:asvg="http://schemas.microsoft.com/office/drawing/2016/SVG/main" r:embed="rId16"/>
+                  <asvg:svgBlip xmlns:asvg="http://schemas.microsoft.com/office/drawing/2016/SVG/main" xmlns="" r:embed="rId16"/>
                 </a:ext>
               </a:extLst>
             </a:blip>
@@ -12585,7 +12601,7 @@
                   <a14:useLocalDpi xmlns:a14="http://schemas.microsoft.com/office/drawing/2010/main" val="0"/>
                 </a:ext>
                 <a:ext uri="{96DAC541-7B7A-43D3-8B79-37D633B846F1}">
-                  <asvg:svgBlip xmlns:asvg="http://schemas.microsoft.com/office/drawing/2016/SVG/main" r:embed="rId18"/>
+                  <asvg:svgBlip xmlns:asvg="http://schemas.microsoft.com/office/drawing/2016/SVG/main" xmlns="" r:embed="rId18"/>
                 </a:ext>
               </a:extLst>
             </a:blip>
@@ -12830,7 +12846,7 @@
                     <a14:useLocalDpi xmlns:a14="http://schemas.microsoft.com/office/drawing/2010/main" val="0"/>
                   </a:ext>
                   <a:ext uri="{96DAC541-7B7A-43D3-8B79-37D633B846F1}">
-                    <asvg:svgBlip xmlns:asvg="http://schemas.microsoft.com/office/drawing/2016/SVG/main" r:embed="rId22"/>
+                    <asvg:svgBlip xmlns:asvg="http://schemas.microsoft.com/office/drawing/2016/SVG/main" xmlns="" r:embed="rId22"/>
                   </a:ext>
                 </a:extLst>
               </a:blip>
@@ -12857,13 +12873,13 @@
               <p:nvPr/>
             </p:nvPicPr>
             <p:blipFill>
-              <a:blip r:embed="rId15" cstate="print">
+              <a:blip r:embed="rId23" cstate="print">
                 <a:extLst>
                   <a:ext uri="{28A0092B-C50C-407E-A947-70E740481C1C}">
                     <a14:useLocalDpi xmlns:a14="http://schemas.microsoft.com/office/drawing/2010/main" val="0"/>
                   </a:ext>
                   <a:ext uri="{96DAC541-7B7A-43D3-8B79-37D633B846F1}">
-                    <asvg:svgBlip xmlns:asvg="http://schemas.microsoft.com/office/drawing/2016/SVG/main" r:embed="rId16"/>
+                    <asvg:svgBlip xmlns:asvg="http://schemas.microsoft.com/office/drawing/2016/SVG/main" xmlns="" r:embed="rId16"/>
                   </a:ext>
                 </a:extLst>
               </a:blip>
@@ -12890,11 +12906,11 @@
               <p:nvPr/>
             </p:nvPicPr>
             <p:blipFill>
-              <a:blip r:embed="rId23" cstate="print">
+              <a:blip r:embed="rId24" cstate="print">
                 <a:extLst>
                   <a:ext uri="{BEBA8EAE-BF5A-486C-A8C5-ECC9F3942E4B}">
                     <a14:imgProps xmlns:a14="http://schemas.microsoft.com/office/drawing/2010/main">
-                      <a14:imgLayer r:embed="rId24">
+                      <a14:imgLayer r:embed="rId25">
                         <a14:imgEffect>
                           <a14:backgroundRemoval t="9425" b="94089" l="0" r="100000">
                             <a14:foregroundMark x1="5272" y1="63419" x2="5272" y2="63419"/>
@@ -12935,7 +12951,7 @@
               <p:nvPr/>
             </p:nvPicPr>
             <p:blipFill rotWithShape="1">
-              <a:blip r:embed="rId25" cstate="print">
+              <a:blip r:embed="rId26" cstate="print">
                 <a:extLst>
                   <a:ext uri="{28A0092B-C50C-407E-A947-70E740481C1C}">
                     <a14:useLocalDpi xmlns:a14="http://schemas.microsoft.com/office/drawing/2010/main" val="0"/>
@@ -14083,9 +14099,13 @@
           <a:prstGeom prst="straightConnector1">
             <a:avLst/>
           </a:prstGeom>
-          <a:ln w="19050">
-            <a:headEnd type="arrow"/>
-            <a:tailEnd type="arrow"/>
+          <a:ln w="38100">
+            <a:solidFill>
+              <a:schemeClr val="accent1">
+                <a:lumMod val="50000"/>
+              </a:schemeClr>
+            </a:solidFill>
+            <a:tailEnd type="triangle"/>
           </a:ln>
         </p:spPr>
         <p:style>
@@ -14117,9 +14137,13 @@
           <a:prstGeom prst="straightConnector1">
             <a:avLst/>
           </a:prstGeom>
-          <a:ln w="19050">
-            <a:headEnd type="arrow"/>
-            <a:tailEnd type="arrow"/>
+          <a:ln w="38100">
+            <a:solidFill>
+              <a:schemeClr val="accent1">
+                <a:lumMod val="50000"/>
+              </a:schemeClr>
+            </a:solidFill>
+            <a:tailEnd type="triangle"/>
           </a:ln>
         </p:spPr>
         <p:style>
@@ -14492,7 +14516,7 @@
                   <a14:useLocalDpi xmlns:a14="http://schemas.microsoft.com/office/drawing/2010/main" val="0"/>
                 </a:ext>
                 <a:ext uri="{96DAC541-7B7A-43D3-8B79-37D633B846F1}">
-                  <asvg:svgBlip xmlns:asvg="http://schemas.microsoft.com/office/drawing/2016/SVG/main" r:embed="rId3"/>
+                  <asvg:svgBlip xmlns:asvg="http://schemas.microsoft.com/office/drawing/2016/SVG/main" xmlns="" r:embed="rId3"/>
                 </a:ext>
               </a:extLst>
             </a:blip>
@@ -14655,9 +14679,13 @@
           <a:prstGeom prst="straightConnector1">
             <a:avLst/>
           </a:prstGeom>
-          <a:ln w="19050">
-            <a:headEnd type="none"/>
-            <a:tailEnd type="arrow"/>
+          <a:ln w="38100">
+            <a:solidFill>
+              <a:schemeClr val="accent1">
+                <a:lumMod val="50000"/>
+              </a:schemeClr>
+            </a:solidFill>
+            <a:tailEnd type="triangle"/>
           </a:ln>
         </p:spPr>
         <p:style>
@@ -14689,9 +14717,13 @@
           <a:prstGeom prst="straightConnector1">
             <a:avLst/>
           </a:prstGeom>
-          <a:ln w="19050">
-            <a:headEnd type="none"/>
-            <a:tailEnd type="arrow"/>
+          <a:ln w="38100">
+            <a:solidFill>
+              <a:schemeClr val="accent1">
+                <a:lumMod val="50000"/>
+              </a:schemeClr>
+            </a:solidFill>
+            <a:tailEnd type="triangle"/>
           </a:ln>
         </p:spPr>
         <p:style>
@@ -14723,9 +14755,13 @@
           <a:prstGeom prst="straightConnector1">
             <a:avLst/>
           </a:prstGeom>
-          <a:ln w="19050">
-            <a:headEnd type="none"/>
-            <a:tailEnd type="arrow"/>
+          <a:ln w="38100">
+            <a:solidFill>
+              <a:schemeClr val="accent1">
+                <a:lumMod val="50000"/>
+              </a:schemeClr>
+            </a:solidFill>
+            <a:tailEnd type="triangle"/>
           </a:ln>
         </p:spPr>
         <p:style>
@@ -14782,10 +14818,10 @@
         </p:nvGrpSpPr>
         <p:grpSpPr>
           <a:xfrm>
-            <a:off x="8481212" y="3597193"/>
-            <a:ext cx="744023" cy="976781"/>
-            <a:chOff x="7052236" y="3700176"/>
-            <a:chExt cx="744023" cy="976781"/>
+            <a:off x="8452885" y="3597193"/>
+            <a:ext cx="809128" cy="994765"/>
+            <a:chOff x="7023909" y="3700176"/>
+            <a:chExt cx="809128" cy="994765"/>
           </a:xfrm>
         </p:grpSpPr>
         <p:pic>
@@ -14838,8 +14874,8 @@
           </p:nvSpPr>
           <p:spPr>
             <a:xfrm>
-              <a:off x="7060688" y="4399958"/>
-              <a:ext cx="735571" cy="276999"/>
+              <a:off x="7023909" y="4399596"/>
+              <a:ext cx="809128" cy="295345"/>
             </a:xfrm>
             <a:prstGeom prst="rect">
               <a:avLst/>
@@ -14854,10 +14890,10 @@
             <a:p>
               <a:pPr algn="ctr"/>
               <a:r>
-                <a:rPr lang="en-GB" sz="1200" dirty="0"/>
+                <a:rPr lang="en-GB" sz="1400" dirty="0"/>
                 <a:t>Content</a:t>
               </a:r>
-              <a:endParaRPr lang="de-DE" sz="1200" dirty="0"/>
+              <a:endParaRPr lang="de-DE" sz="1400" dirty="0"/>
             </a:p>
           </p:txBody>
         </p:sp>
@@ -14871,9 +14907,9 @@
         <p:grpSpPr>
           <a:xfrm>
             <a:off x="7791990" y="3530163"/>
-            <a:ext cx="832361" cy="1043811"/>
+            <a:ext cx="832361" cy="1071320"/>
             <a:chOff x="6306726" y="3650506"/>
-            <a:chExt cx="832361" cy="1043811"/>
+            <a:chExt cx="832361" cy="1071320"/>
           </a:xfrm>
         </p:grpSpPr>
         <p:pic>
@@ -14891,7 +14927,7 @@
                   <a14:useLocalDpi xmlns:a14="http://schemas.microsoft.com/office/drawing/2010/main" val="0"/>
                 </a:ext>
                 <a:ext uri="{96DAC541-7B7A-43D3-8B79-37D633B846F1}">
-                  <asvg:svgBlip xmlns:asvg="http://schemas.microsoft.com/office/drawing/2016/SVG/main" r:embed="rId7"/>
+                  <asvg:svgBlip xmlns:asvg="http://schemas.microsoft.com/office/drawing/2016/SVG/main" xmlns="" r:embed="rId7"/>
                 </a:ext>
               </a:extLst>
             </a:blip>
@@ -14917,8 +14953,8 @@
           </p:nvSpPr>
           <p:spPr>
             <a:xfrm>
-              <a:off x="6348579" y="4417318"/>
-              <a:ext cx="735571" cy="276999"/>
+              <a:off x="6311800" y="4426481"/>
+              <a:ext cx="809128" cy="295345"/>
             </a:xfrm>
             <a:prstGeom prst="rect">
               <a:avLst/>
@@ -14933,10 +14969,10 @@
             <a:p>
               <a:pPr algn="ctr"/>
               <a:r>
-                <a:rPr lang="en-GB" sz="1200" dirty="0"/>
+                <a:rPr lang="en-GB" sz="1400" dirty="0"/>
                 <a:t>Options</a:t>
               </a:r>
-              <a:endParaRPr lang="de-DE" sz="1200" dirty="0"/>
+              <a:endParaRPr lang="de-DE" sz="1400" dirty="0"/>
             </a:p>
           </p:txBody>
         </p:sp>
@@ -14955,9 +14991,13 @@
           <a:prstGeom prst="straightConnector1">
             <a:avLst/>
           </a:prstGeom>
-          <a:ln w="19050">
-            <a:headEnd type="none"/>
-            <a:tailEnd type="arrow"/>
+          <a:ln w="38100">
+            <a:solidFill>
+              <a:schemeClr val="accent1">
+                <a:lumMod val="50000"/>
+              </a:schemeClr>
+            </a:solidFill>
+            <a:tailEnd type="triangle"/>
           </a:ln>
         </p:spPr>
         <p:style>
@@ -14983,10 +15023,10 @@
         </p:nvGrpSpPr>
         <p:grpSpPr>
           <a:xfrm>
-            <a:off x="3805619" y="3472533"/>
-            <a:ext cx="744023" cy="915821"/>
-            <a:chOff x="7052236" y="3700176"/>
-            <a:chExt cx="744023" cy="915821"/>
+            <a:off x="3777292" y="3472533"/>
+            <a:ext cx="809128" cy="939047"/>
+            <a:chOff x="7023909" y="3700176"/>
+            <a:chExt cx="809128" cy="939047"/>
           </a:xfrm>
         </p:grpSpPr>
         <p:pic>
@@ -15039,8 +15079,8 @@
           </p:nvSpPr>
           <p:spPr>
             <a:xfrm>
-              <a:off x="7060688" y="4338998"/>
-              <a:ext cx="735571" cy="276999"/>
+              <a:off x="7023909" y="4314344"/>
+              <a:ext cx="809128" cy="324879"/>
             </a:xfrm>
             <a:prstGeom prst="rect">
               <a:avLst/>
@@ -15055,10 +15095,10 @@
             <a:p>
               <a:pPr algn="ctr"/>
               <a:r>
-                <a:rPr lang="en-GB" sz="1200" dirty="0"/>
+                <a:rPr lang="en-GB" sz="1400" dirty="0"/>
                 <a:t>Content</a:t>
               </a:r>
-              <a:endParaRPr lang="de-DE" sz="1200" dirty="0"/>
+              <a:endParaRPr lang="de-DE" sz="1400" dirty="0"/>
             </a:p>
           </p:txBody>
         </p:sp>
@@ -15331,10 +15371,10 @@
                 <a:buNone/>
               </a:pPr>
               <a:r>
-                <a:rPr lang="en-GB" sz="1200" dirty="0"/>
+                <a:rPr lang="en-GB" sz="1400" dirty="0"/>
                 <a:t>Generate button</a:t>
               </a:r>
-              <a:endParaRPr lang="de-DE" sz="1200" dirty="0"/>
+              <a:endParaRPr lang="de-DE" sz="1400" dirty="0"/>
             </a:p>
           </p:txBody>
         </p:sp>
@@ -15648,10 +15688,10 @@
                 <a:buNone/>
               </a:pPr>
               <a:r>
-                <a:rPr lang="en-GB" sz="1200" dirty="0"/>
+                <a:rPr lang="en-GB" sz="1400" dirty="0"/>
                 <a:t>Background script</a:t>
               </a:r>
-              <a:endParaRPr lang="de-DE" sz="1200" dirty="0"/>
+              <a:endParaRPr lang="de-DE" sz="1400" dirty="0"/>
             </a:p>
           </p:txBody>
         </p:sp>
@@ -15705,7 +15745,7 @@
         </p:nvGrpSpPr>
         <p:grpSpPr>
           <a:xfrm>
-            <a:off x="3503575" y="5014402"/>
+            <a:off x="3503575" y="4976302"/>
             <a:ext cx="1435837" cy="690205"/>
             <a:chOff x="3473980" y="2686347"/>
             <a:chExt cx="1435837" cy="690205"/>
@@ -15965,10 +16005,10 @@
                 <a:buNone/>
               </a:pPr>
               <a:r>
-                <a:rPr lang="en-GB" sz="1200" dirty="0"/>
+                <a:rPr lang="en-GB" sz="1400" dirty="0"/>
                 <a:t>Generate Popup</a:t>
               </a:r>
-              <a:endParaRPr lang="de-DE" sz="1200" dirty="0"/>
+              <a:endParaRPr lang="de-DE" sz="1400" dirty="0"/>
             </a:p>
           </p:txBody>
         </p:sp>
@@ -16028,9 +16068,13 @@
           <a:prstGeom prst="straightConnector1">
             <a:avLst/>
           </a:prstGeom>
-          <a:ln w="19050">
-            <a:headEnd type="none"/>
-            <a:tailEnd type="arrow"/>
+          <a:ln w="38100">
+            <a:solidFill>
+              <a:schemeClr val="accent1">
+                <a:lumMod val="50000"/>
+              </a:schemeClr>
+            </a:solidFill>
+            <a:tailEnd type="triangle"/>
           </a:ln>
         </p:spPr>
         <p:style>
@@ -16062,9 +16106,13 @@
           <a:prstGeom prst="straightConnector1">
             <a:avLst/>
           </a:prstGeom>
-          <a:ln w="19050">
-            <a:headEnd type="none"/>
-            <a:tailEnd type="arrow"/>
+          <a:ln w="38100">
+            <a:solidFill>
+              <a:schemeClr val="accent1">
+                <a:lumMod val="50000"/>
+              </a:schemeClr>
+            </a:solidFill>
+            <a:tailEnd type="triangle"/>
           </a:ln>
         </p:spPr>
         <p:style>
@@ -16090,10 +16138,10 @@
         </p:nvGrpSpPr>
         <p:grpSpPr>
           <a:xfrm>
-            <a:off x="7882497" y="4667024"/>
-            <a:ext cx="1226117" cy="794134"/>
-            <a:chOff x="7882497" y="4667024"/>
-            <a:chExt cx="1226117" cy="794134"/>
+            <a:off x="7758109" y="4667024"/>
+            <a:ext cx="1433421" cy="800686"/>
+            <a:chOff x="7758109" y="4667024"/>
+            <a:chExt cx="1433421" cy="800686"/>
           </a:xfrm>
         </p:grpSpPr>
         <p:pic>
@@ -16156,7 +16204,7 @@
                   <a14:useLocalDpi xmlns:a14="http://schemas.microsoft.com/office/drawing/2010/main" val="0"/>
                 </a:ext>
                 <a:ext uri="{96DAC541-7B7A-43D3-8B79-37D633B846F1}">
-                  <asvg:svgBlip xmlns:asvg="http://schemas.microsoft.com/office/drawing/2016/SVG/main" r:embed="rId13"/>
+                  <asvg:svgBlip xmlns:asvg="http://schemas.microsoft.com/office/drawing/2016/SVG/main" xmlns="" r:embed="rId13"/>
                 </a:ext>
               </a:extLst>
             </a:blip>
@@ -16182,8 +16230,8 @@
           </p:nvSpPr>
           <p:spPr>
             <a:xfrm>
-              <a:off x="7882497" y="5224252"/>
-              <a:ext cx="1184645" cy="236906"/>
+              <a:off x="7758109" y="5199215"/>
+              <a:ext cx="1433421" cy="268495"/>
             </a:xfrm>
             <a:prstGeom prst="rect">
               <a:avLst/>
@@ -16198,10 +16246,10 @@
             <a:p>
               <a:pPr algn="ctr"/>
               <a:r>
-                <a:rPr lang="en-GB" sz="1200" dirty="0"/>
+                <a:rPr lang="en-GB" sz="1400" dirty="0"/>
                 <a:t>Named entities</a:t>
               </a:r>
-              <a:endParaRPr lang="de-DE" sz="1200" dirty="0"/>
+              <a:endParaRPr lang="de-DE" sz="1400" dirty="0"/>
             </a:p>
           </p:txBody>
         </p:sp>
@@ -17558,7 +17606,7 @@
                   <a14:useLocalDpi xmlns:a14="http://schemas.microsoft.com/office/drawing/2010/main" val="0"/>
                 </a:ext>
                 <a:ext uri="{96DAC541-7B7A-43D3-8B79-37D633B846F1}">
-                  <asvg:svgBlip xmlns:asvg="http://schemas.microsoft.com/office/drawing/2016/SVG/main" r:embed="rId7"/>
+                  <asvg:svgBlip xmlns:asvg="http://schemas.microsoft.com/office/drawing/2016/SVG/main" xmlns="" r:embed="rId7"/>
                 </a:ext>
               </a:extLst>
             </a:blip>
@@ -17591,7 +17639,7 @@
                   <a14:useLocalDpi xmlns:a14="http://schemas.microsoft.com/office/drawing/2010/main" val="0"/>
                 </a:ext>
                 <a:ext uri="{96DAC541-7B7A-43D3-8B79-37D633B846F1}">
-                  <asvg:svgBlip xmlns:asvg="http://schemas.microsoft.com/office/drawing/2016/SVG/main" r:embed="rId9"/>
+                  <asvg:svgBlip xmlns:asvg="http://schemas.microsoft.com/office/drawing/2016/SVG/main" xmlns="" r:embed="rId9"/>
                 </a:ext>
               </a:extLst>
             </a:blip>
@@ -18235,7 +18283,7 @@
   <a:extraClrSchemeLst/>
   <a:extLst>
     <a:ext uri="{05A4C25C-085E-4340-85A3-A5531E510DB2}">
-      <thm15:themeFamily xmlns:thm15="http://schemas.microsoft.com/office/thememl/2012/main" name="Parallax" id="{3388167B-A2EB-4685-9635-1831D9AEF8C4}" vid="{4F7A876A-7598-49CA-AFC8-8EDA2551E4A7}"/>
+      <thm15:themeFamily xmlns:thm15="http://schemas.microsoft.com/office/thememl/2012/main" xmlns="" name="Parallax" id="{3388167B-A2EB-4685-9635-1831D9AEF8C4}" vid="{4F7A876A-7598-49CA-AFC8-8EDA2551E4A7}"/>
     </a:ext>
   </a:extLst>
 </a:theme>
@@ -18496,7 +18544,7 @@
   <a:extraClrSchemeLst/>
   <a:extLst>
     <a:ext uri="{05A4C25C-085E-4340-85A3-A5531E510DB2}">
-      <thm15:themeFamily xmlns:thm15="http://schemas.microsoft.com/office/thememl/2012/main" name="Office Theme" id="{62F939B6-93AF-4DB8-9C6B-D6C7DFDC589F}" vid="{4A3C46E8-61CC-4603-A589-7422A47A8E4A}"/>
+      <thm15:themeFamily xmlns:thm15="http://schemas.microsoft.com/office/thememl/2012/main" xmlns="" name="Office Theme" id="{62F939B6-93AF-4DB8-9C6B-D6C7DFDC589F}" vid="{4A3C46E8-61CC-4603-A589-7422A47A8E4A}"/>
     </a:ext>
   </a:extLst>
 </a:theme>

</xml_diff>

<commit_message>
Report: Fine Tuning; Disable YAGO2
</commit_message>
<xml_diff>
--- a/ProjectPresentation/EntityAnnotation.pptx
+++ b/ProjectPresentation/EntityAnnotation.pptx
@@ -5,7 +5,7 @@
     <p:sldMasterId id="2147483660" r:id="rId1"/>
   </p:sldMasterIdLst>
   <p:notesMasterIdLst>
-    <p:notesMasterId r:id="rId15"/>
+    <p:notesMasterId r:id="rId16"/>
   </p:notesMasterIdLst>
   <p:sldIdLst>
     <p:sldId id="259" r:id="rId2"/>
@@ -14,13 +14,14 @@
     <p:sldId id="293" r:id="rId5"/>
     <p:sldId id="290" r:id="rId6"/>
     <p:sldId id="286" r:id="rId7"/>
-    <p:sldId id="291" r:id="rId8"/>
-    <p:sldId id="285" r:id="rId9"/>
-    <p:sldId id="289" r:id="rId10"/>
-    <p:sldId id="258" r:id="rId11"/>
-    <p:sldId id="292" r:id="rId12"/>
-    <p:sldId id="287" r:id="rId13"/>
-    <p:sldId id="288" r:id="rId14"/>
+    <p:sldId id="294" r:id="rId8"/>
+    <p:sldId id="291" r:id="rId9"/>
+    <p:sldId id="285" r:id="rId10"/>
+    <p:sldId id="289" r:id="rId11"/>
+    <p:sldId id="258" r:id="rId12"/>
+    <p:sldId id="292" r:id="rId13"/>
+    <p:sldId id="287" r:id="rId14"/>
+    <p:sldId id="288" r:id="rId15"/>
   </p:sldIdLst>
   <p:sldSz cx="12192000" cy="6858000"/>
   <p:notesSz cx="6858000" cy="9144000"/>
@@ -121,7 +122,7 @@
   </p:defaultTextStyle>
   <p:extLst>
     <p:ext uri="{EFAFB233-063F-42B5-8137-9DF3F51BA10A}">
-      <p15:sldGuideLst xmlns:p15="http://schemas.microsoft.com/office/powerpoint/2012/main" xmlns="">
+      <p15:sldGuideLst xmlns:p15="http://schemas.microsoft.com/office/powerpoint/2012/main">
         <p15:guide id="1" orient="horz" pos="2160">
           <p15:clr>
             <a:srgbClr val="A4A3A4"/>
@@ -220,7 +221,7 @@
           <a:p>
             <a:fld id="{A8D8494C-AE34-42CB-89A1-EF65868C4C6A}" type="datetimeFigureOut">
               <a:rPr lang="en-GB" smtClean="0"/>
-              <a:t>05/12/2016</a:t>
+              <a:t>06/12/2016</a:t>
             </a:fld>
             <a:endParaRPr lang="en-GB"/>
           </a:p>
@@ -379,7 +380,7 @@
           <a:p>
             <a:fld id="{6B56D088-27D1-433A-A9A9-E30AD3E13E16}" type="slidenum">
               <a:rPr lang="en-GB" smtClean="0"/>
-              <a:t>‹#›</a:t>
+              <a:t>‹Nr.›</a:t>
             </a:fld>
             <a:endParaRPr lang="en-GB"/>
           </a:p>
@@ -1591,7 +1592,7 @@
           <a:p>
             <a:fld id="{6B56D088-27D1-433A-A9A9-E30AD3E13E16}" type="slidenum">
               <a:rPr lang="en-GB" smtClean="0"/>
-              <a:t>7</a:t>
+              <a:t>8</a:t>
             </a:fld>
             <a:endParaRPr lang="en-GB"/>
           </a:p>
@@ -1767,7 +1768,7 @@
           <a:p>
             <a:fld id="{6B56D088-27D1-433A-A9A9-E30AD3E13E16}" type="slidenum">
               <a:rPr lang="en-GB" smtClean="0"/>
-              <a:t>8</a:t>
+              <a:t>9</a:t>
             </a:fld>
             <a:endParaRPr lang="en-GB"/>
           </a:p>
@@ -1851,7 +1852,7 @@
           <a:p>
             <a:fld id="{6B56D088-27D1-433A-A9A9-E30AD3E13E16}" type="slidenum">
               <a:rPr lang="en-GB" smtClean="0"/>
-              <a:t>10</a:t>
+              <a:t>11</a:t>
             </a:fld>
             <a:endParaRPr lang="en-GB"/>
           </a:p>
@@ -2059,7 +2060,7 @@
           <a:p>
             <a:fld id="{06103CAB-27D4-4953-BA7C-39BAE24E605E}" type="datetime1">
               <a:rPr lang="en-GB" smtClean="0"/>
-              <a:t>05/12/2016</a:t>
+              <a:t>06/12/2016</a:t>
             </a:fld>
             <a:endParaRPr lang="en-GB"/>
           </a:p>
@@ -2109,7 +2110,7 @@
           <a:p>
             <a:fld id="{2921BF44-F096-42DF-ADC3-B535522D2EE1}" type="slidenum">
               <a:rPr lang="en-GB" smtClean="0"/>
-              <a:t>‹#›</a:t>
+              <a:t>‹Nr.›</a:t>
             </a:fld>
             <a:endParaRPr lang="en-GB"/>
           </a:p>
@@ -2358,7 +2359,7 @@
           <a:p>
             <a:fld id="{3A8A6690-9EF3-4749-8403-602024AB73D2}" type="datetime1">
               <a:rPr lang="en-GB" smtClean="0"/>
-              <a:t>05/12/2016</a:t>
+              <a:t>06/12/2016</a:t>
             </a:fld>
             <a:endParaRPr lang="en-GB"/>
           </a:p>
@@ -2403,7 +2404,7 @@
           <a:p>
             <a:fld id="{2921BF44-F096-42DF-ADC3-B535522D2EE1}" type="slidenum">
               <a:rPr lang="en-GB" smtClean="0"/>
-              <a:t>‹#›</a:t>
+              <a:t>‹Nr.›</a:t>
             </a:fld>
             <a:endParaRPr lang="en-GB"/>
           </a:p>
@@ -2609,7 +2610,7 @@
           <a:p>
             <a:fld id="{89DB5E8A-75A3-4867-94E4-590D730EBB1E}" type="datetime1">
               <a:rPr lang="en-GB" smtClean="0"/>
-              <a:t>05/12/2016</a:t>
+              <a:t>06/12/2016</a:t>
             </a:fld>
             <a:endParaRPr lang="en-GB"/>
           </a:p>
@@ -2654,7 +2655,7 @@
           <a:p>
             <a:fld id="{2921BF44-F096-42DF-ADC3-B535522D2EE1}" type="slidenum">
               <a:rPr lang="en-GB" smtClean="0"/>
-              <a:t>‹#›</a:t>
+              <a:t>‹Nr.›</a:t>
             </a:fld>
             <a:endParaRPr lang="en-GB"/>
           </a:p>
@@ -3152,7 +3153,7 @@
           <a:p>
             <a:fld id="{56CC3CC1-5D48-4D8E-A506-FE00E1BA1FC1}" type="datetime1">
               <a:rPr lang="en-GB" smtClean="0"/>
-              <a:t>05/12/2016</a:t>
+              <a:t>06/12/2016</a:t>
             </a:fld>
             <a:endParaRPr lang="en-GB"/>
           </a:p>
@@ -3197,7 +3198,7 @@
           <a:p>
             <a:fld id="{2921BF44-F096-42DF-ADC3-B535522D2EE1}" type="slidenum">
               <a:rPr lang="en-GB" smtClean="0"/>
-              <a:t>‹#›</a:t>
+              <a:t>‹Nr.›</a:t>
             </a:fld>
             <a:endParaRPr lang="en-GB"/>
           </a:p>
@@ -3403,7 +3404,7 @@
           <a:p>
             <a:fld id="{E47C6652-7282-41FA-AD47-BB58E05EBCB1}" type="datetime1">
               <a:rPr lang="en-GB" smtClean="0"/>
-              <a:t>05/12/2016</a:t>
+              <a:t>06/12/2016</a:t>
             </a:fld>
             <a:endParaRPr lang="en-GB"/>
           </a:p>
@@ -3448,7 +3449,7 @@
           <a:p>
             <a:fld id="{2921BF44-F096-42DF-ADC3-B535522D2EE1}" type="slidenum">
               <a:rPr lang="en-GB" smtClean="0"/>
-              <a:t>‹#›</a:t>
+              <a:t>‹Nr.›</a:t>
             </a:fld>
             <a:endParaRPr lang="en-GB"/>
           </a:p>
@@ -3938,7 +3939,7 @@
           <a:p>
             <a:fld id="{9575253B-D946-4B16-A4D6-EDCC8FBA3639}" type="datetime1">
               <a:rPr lang="en-GB" smtClean="0"/>
-              <a:t>05/12/2016</a:t>
+              <a:t>06/12/2016</a:t>
             </a:fld>
             <a:endParaRPr lang="en-GB"/>
           </a:p>
@@ -3983,7 +3984,7 @@
           <a:p>
             <a:fld id="{2921BF44-F096-42DF-ADC3-B535522D2EE1}" type="slidenum">
               <a:rPr lang="en-GB" smtClean="0"/>
-              <a:t>‹#›</a:t>
+              <a:t>‹Nr.›</a:t>
             </a:fld>
             <a:endParaRPr lang="en-GB"/>
           </a:p>
@@ -4238,7 +4239,7 @@
           <a:p>
             <a:fld id="{05A78B47-D74F-482E-AC4D-924E1F9C02E1}" type="datetime1">
               <a:rPr lang="en-GB" smtClean="0"/>
-              <a:t>05/12/2016</a:t>
+              <a:t>06/12/2016</a:t>
             </a:fld>
             <a:endParaRPr lang="en-GB"/>
           </a:p>
@@ -4283,7 +4284,7 @@
           <a:p>
             <a:fld id="{2921BF44-F096-42DF-ADC3-B535522D2EE1}" type="slidenum">
               <a:rPr lang="en-GB" smtClean="0"/>
-              <a:t>‹#›</a:t>
+              <a:t>‹Nr.›</a:t>
             </a:fld>
             <a:endParaRPr lang="en-GB"/>
           </a:p>
@@ -4415,7 +4416,7 @@
           <a:p>
             <a:fld id="{9D054574-8D06-4B14-A4E3-883F870E467D}" type="datetime1">
               <a:rPr lang="en-GB" smtClean="0"/>
-              <a:t>05/12/2016</a:t>
+              <a:t>06/12/2016</a:t>
             </a:fld>
             <a:endParaRPr lang="en-GB"/>
           </a:p>
@@ -4460,7 +4461,7 @@
           <a:p>
             <a:fld id="{2921BF44-F096-42DF-ADC3-B535522D2EE1}" type="slidenum">
               <a:rPr lang="en-GB" smtClean="0"/>
-              <a:t>‹#›</a:t>
+              <a:t>‹Nr.›</a:t>
             </a:fld>
             <a:endParaRPr lang="en-GB"/>
           </a:p>
@@ -4598,7 +4599,7 @@
           <a:p>
             <a:fld id="{99CF02F4-EBA5-433C-B12C-1A26A76C696F}" type="datetime1">
               <a:rPr lang="en-GB" smtClean="0"/>
-              <a:t>05/12/2016</a:t>
+              <a:t>06/12/2016</a:t>
             </a:fld>
             <a:endParaRPr lang="en-GB"/>
           </a:p>
@@ -4643,7 +4644,7 @@
           <a:p>
             <a:fld id="{2921BF44-F096-42DF-ADC3-B535522D2EE1}" type="slidenum">
               <a:rPr lang="en-GB" smtClean="0"/>
-              <a:t>‹#›</a:t>
+              <a:t>‹Nr.›</a:t>
             </a:fld>
             <a:endParaRPr lang="en-GB"/>
           </a:p>
@@ -4790,7 +4791,7 @@
           <a:p>
             <a:fld id="{F7FB45E5-CEA6-436A-9116-67114B66AE83}" type="datetime1">
               <a:rPr lang="en-GB" smtClean="0"/>
-              <a:t>05/12/2016</a:t>
+              <a:t>06/12/2016</a:t>
             </a:fld>
             <a:endParaRPr lang="en-GB"/>
           </a:p>
@@ -4850,7 +4851,7 @@
             <a:fld id="{2921BF44-F096-42DF-ADC3-B535522D2EE1}" type="slidenum">
               <a:rPr lang="en-GB" smtClean="0"/>
               <a:pPr/>
-              <a:t>‹#›</a:t>
+              <a:t>‹Nr.›</a:t>
             </a:fld>
             <a:endParaRPr lang="en-GB" dirty="0"/>
           </a:p>
@@ -5054,7 +5055,7 @@
           <a:p>
             <a:fld id="{58772DC2-CC95-4628-A2C3-DBCC8B67E0EE}" type="datetime1">
               <a:rPr lang="en-GB" smtClean="0"/>
-              <a:t>05/12/2016</a:t>
+              <a:t>06/12/2016</a:t>
             </a:fld>
             <a:endParaRPr lang="en-GB"/>
           </a:p>
@@ -5099,7 +5100,7 @@
           <a:p>
             <a:fld id="{2921BF44-F096-42DF-ADC3-B535522D2EE1}" type="slidenum">
               <a:rPr lang="en-GB" smtClean="0"/>
-              <a:t>‹#›</a:t>
+              <a:t>‹Nr.›</a:t>
             </a:fld>
             <a:endParaRPr lang="en-GB"/>
           </a:p>
@@ -5354,7 +5355,7 @@
           <a:p>
             <a:fld id="{85706B20-101B-4EF1-A005-17BBB9B97973}" type="datetime1">
               <a:rPr lang="en-GB" smtClean="0"/>
-              <a:t>05/12/2016</a:t>
+              <a:t>06/12/2016</a:t>
             </a:fld>
             <a:endParaRPr lang="en-GB"/>
           </a:p>
@@ -5399,7 +5400,7 @@
           <a:p>
             <a:fld id="{2921BF44-F096-42DF-ADC3-B535522D2EE1}" type="slidenum">
               <a:rPr lang="en-GB" smtClean="0"/>
-              <a:t>‹#›</a:t>
+              <a:t>‹Nr.›</a:t>
             </a:fld>
             <a:endParaRPr lang="en-GB"/>
           </a:p>
@@ -5799,7 +5800,7 @@
           <a:p>
             <a:fld id="{73A24D18-03FA-444B-A6E8-081CE70D1F1D}" type="datetime1">
               <a:rPr lang="en-GB" smtClean="0"/>
-              <a:t>05/12/2016</a:t>
+              <a:t>06/12/2016</a:t>
             </a:fld>
             <a:endParaRPr lang="en-GB"/>
           </a:p>
@@ -5844,7 +5845,7 @@
           <a:p>
             <a:fld id="{2921BF44-F096-42DF-ADC3-B535522D2EE1}" type="slidenum">
               <a:rPr lang="en-GB" smtClean="0"/>
-              <a:t>‹#›</a:t>
+              <a:t>‹Nr.›</a:t>
             </a:fld>
             <a:endParaRPr lang="en-GB"/>
           </a:p>
@@ -5920,7 +5921,7 @@
           <a:p>
             <a:fld id="{5A5D0278-C667-458C-BF50-C38C35F84025}" type="datetime1">
               <a:rPr lang="en-GB" smtClean="0"/>
-              <a:t>05/12/2016</a:t>
+              <a:t>06/12/2016</a:t>
             </a:fld>
             <a:endParaRPr lang="en-GB"/>
           </a:p>
@@ -5965,7 +5966,7 @@
           <a:p>
             <a:fld id="{2921BF44-F096-42DF-ADC3-B535522D2EE1}" type="slidenum">
               <a:rPr lang="en-GB" smtClean="0"/>
-              <a:t>‹#›</a:t>
+              <a:t>‹Nr.›</a:t>
             </a:fld>
             <a:endParaRPr lang="en-GB"/>
           </a:p>
@@ -6018,7 +6019,7 @@
           <a:p>
             <a:fld id="{7779FF95-CD9F-49D0-9692-6F86CB53E266}" type="datetime1">
               <a:rPr lang="en-GB" smtClean="0"/>
-              <a:t>05/12/2016</a:t>
+              <a:t>06/12/2016</a:t>
             </a:fld>
             <a:endParaRPr lang="en-GB"/>
           </a:p>
@@ -6063,7 +6064,7 @@
           <a:p>
             <a:fld id="{2921BF44-F096-42DF-ADC3-B535522D2EE1}" type="slidenum">
               <a:rPr lang="en-GB" smtClean="0"/>
-              <a:t>‹#›</a:t>
+              <a:t>‹Nr.›</a:t>
             </a:fld>
             <a:endParaRPr lang="en-GB"/>
           </a:p>
@@ -6304,7 +6305,7 @@
           <a:p>
             <a:fld id="{6FF6C31A-CCBC-47C9-B55B-D6E279E5509C}" type="datetime1">
               <a:rPr lang="en-GB" smtClean="0"/>
-              <a:t>05/12/2016</a:t>
+              <a:t>06/12/2016</a:t>
             </a:fld>
             <a:endParaRPr lang="en-GB"/>
           </a:p>
@@ -6349,7 +6350,7 @@
           <a:p>
             <a:fld id="{2921BF44-F096-42DF-ADC3-B535522D2EE1}" type="slidenum">
               <a:rPr lang="en-GB" smtClean="0"/>
-              <a:t>‹#›</a:t>
+              <a:t>‹Nr.›</a:t>
             </a:fld>
             <a:endParaRPr lang="en-GB"/>
           </a:p>
@@ -6598,7 +6599,7 @@
           <a:p>
             <a:fld id="{23E1B9F4-BB56-4914-9BD8-B56AC1531316}" type="datetime1">
               <a:rPr lang="en-GB" smtClean="0"/>
-              <a:t>05/12/2016</a:t>
+              <a:t>06/12/2016</a:t>
             </a:fld>
             <a:endParaRPr lang="en-GB"/>
           </a:p>
@@ -6643,7 +6644,7 @@
           <a:p>
             <a:fld id="{2921BF44-F096-42DF-ADC3-B535522D2EE1}" type="slidenum">
               <a:rPr lang="en-GB" smtClean="0"/>
-              <a:t>‹#›</a:t>
+              <a:t>‹Nr.›</a:t>
             </a:fld>
             <a:endParaRPr lang="en-GB"/>
           </a:p>
@@ -6815,7 +6816,7 @@
           <a:p>
             <a:fld id="{B80DFA59-A6D8-4F35-B196-6C06090E1566}" type="datetime1">
               <a:rPr lang="en-GB" smtClean="0"/>
-              <a:t>05/12/2016</a:t>
+              <a:t>06/12/2016</a:t>
             </a:fld>
             <a:endParaRPr lang="en-GB"/>
           </a:p>
@@ -6896,7 +6897,7 @@
           <a:p>
             <a:fld id="{2921BF44-F096-42DF-ADC3-B535522D2EE1}" type="slidenum">
               <a:rPr lang="en-GB" smtClean="0"/>
-              <a:t>‹#›</a:t>
+              <a:t>‹Nr.›</a:t>
             </a:fld>
             <a:endParaRPr lang="en-GB"/>
           </a:p>
@@ -7770,6 +7771,102 @@
 </file>
 
 <file path=ppt/slides/slide10.xml><?xml version="1.0" encoding="utf-8"?>
+<p:sld xmlns:a="http://schemas.openxmlformats.org/drawingml/2006/main" xmlns:r="http://schemas.openxmlformats.org/officeDocument/2006/relationships" xmlns:p="http://schemas.openxmlformats.org/presentationml/2006/main">
+  <p:cSld>
+    <p:spTree>
+      <p:nvGrpSpPr>
+        <p:cNvPr id="1" name=""/>
+        <p:cNvGrpSpPr/>
+        <p:nvPr/>
+      </p:nvGrpSpPr>
+      <p:grpSpPr>
+        <a:xfrm>
+          <a:off x="0" y="0"/>
+          <a:ext cx="0" cy="0"/>
+          <a:chOff x="0" y="0"/>
+          <a:chExt cx="0" cy="0"/>
+        </a:xfrm>
+      </p:grpSpPr>
+      <p:sp>
+        <p:nvSpPr>
+          <p:cNvPr id="2" name="Title 1"/>
+          <p:cNvSpPr>
+            <a:spLocks noGrp="1"/>
+          </p:cNvSpPr>
+          <p:nvPr>
+            <p:ph type="title"/>
+          </p:nvPr>
+        </p:nvSpPr>
+        <p:spPr/>
+        <p:txBody>
+          <a:bodyPr/>
+          <a:lstStyle/>
+          <a:p>
+            <a:r>
+              <a:rPr lang="en-GB" dirty="0"/>
+              <a:t>Backup</a:t>
+            </a:r>
+            <a:endParaRPr lang="de-DE" dirty="0"/>
+          </a:p>
+        </p:txBody>
+      </p:sp>
+      <p:sp>
+        <p:nvSpPr>
+          <p:cNvPr id="3" name="Content Placeholder 2"/>
+          <p:cNvSpPr>
+            <a:spLocks noGrp="1"/>
+          </p:cNvSpPr>
+          <p:nvPr>
+            <p:ph idx="1"/>
+          </p:nvPr>
+        </p:nvSpPr>
+        <p:spPr/>
+        <p:txBody>
+          <a:bodyPr/>
+          <a:lstStyle/>
+          <a:p>
+            <a:endParaRPr lang="de-DE"/>
+          </a:p>
+        </p:txBody>
+      </p:sp>
+      <p:sp>
+        <p:nvSpPr>
+          <p:cNvPr id="4" name="Slide Number Placeholder 3"/>
+          <p:cNvSpPr>
+            <a:spLocks noGrp="1"/>
+          </p:cNvSpPr>
+          <p:nvPr>
+            <p:ph type="sldNum" sz="quarter" idx="12"/>
+          </p:nvPr>
+        </p:nvSpPr>
+        <p:spPr/>
+        <p:txBody>
+          <a:bodyPr/>
+          <a:lstStyle/>
+          <a:p>
+            <a:fld id="{2921BF44-F096-42DF-ADC3-B535522D2EE1}" type="slidenum">
+              <a:rPr lang="en-GB" smtClean="0"/>
+              <a:pPr/>
+              <a:t>10</a:t>
+            </a:fld>
+            <a:endParaRPr lang="en-GB" dirty="0"/>
+          </a:p>
+        </p:txBody>
+      </p:sp>
+    </p:spTree>
+    <p:extLst>
+      <p:ext uri="{BB962C8B-B14F-4D97-AF65-F5344CB8AC3E}">
+        <p14:creationId xmlns:p14="http://schemas.microsoft.com/office/powerpoint/2010/main" val="333537589"/>
+      </p:ext>
+    </p:extLst>
+  </p:cSld>
+  <p:clrMapOvr>
+    <a:masterClrMapping/>
+  </p:clrMapOvr>
+</p:sld>
+</file>
+
+<file path=ppt/slides/slide11.xml><?xml version="1.0" encoding="utf-8"?>
 <p:sld xmlns:a="http://schemas.openxmlformats.org/drawingml/2006/main" xmlns:r="http://schemas.openxmlformats.org/officeDocument/2006/relationships" xmlns:p="http://schemas.openxmlformats.org/presentationml/2006/main" show="0">
   <p:cSld>
     <p:spTree>
@@ -7826,7 +7923,7 @@
           <a:p>
             <a:fld id="{2921BF44-F096-42DF-ADC3-B535522D2EE1}" type="slidenum">
               <a:rPr lang="en-GB" smtClean="0"/>
-              <a:t>10</a:t>
+              <a:t>11</a:t>
             </a:fld>
             <a:endParaRPr lang="en-GB"/>
           </a:p>
@@ -7980,18 +8077,10 @@
   <p:clrMapOvr>
     <a:masterClrMapping/>
   </p:clrMapOvr>
-  <mc:AlternateContent xmlns:mc="http://schemas.openxmlformats.org/markup-compatibility/2006">
-    <mc:Choice xmlns:p14="http://schemas.microsoft.com/office/powerpoint/2010/main" Requires="p14">
-      <p:transition spd="slow" p14:dur="2000"/>
-    </mc:Choice>
-    <mc:Fallback>
-      <p:transition spd="slow"/>
-    </mc:Fallback>
-  </mc:AlternateContent>
 </p:sld>
 </file>
 
-<file path=ppt/slides/slide11.xml><?xml version="1.0" encoding="utf-8"?>
+<file path=ppt/slides/slide12.xml><?xml version="1.0" encoding="utf-8"?>
 <p:sld xmlns:a="http://schemas.openxmlformats.org/drawingml/2006/main" xmlns:r="http://schemas.openxmlformats.org/officeDocument/2006/relationships" xmlns:p="http://schemas.openxmlformats.org/presentationml/2006/main">
   <p:cSld>
     <p:spTree>
@@ -8049,7 +8138,7 @@
             <a:fld id="{2921BF44-F096-42DF-ADC3-B535522D2EE1}" type="slidenum">
               <a:rPr lang="en-GB" smtClean="0"/>
               <a:pPr/>
-              <a:t>11</a:t>
+              <a:t>12</a:t>
             </a:fld>
             <a:endParaRPr lang="en-GB" dirty="0"/>
           </a:p>
@@ -8109,7 +8198,7 @@
 </p:sld>
 </file>
 
-<file path=ppt/slides/slide12.xml><?xml version="1.0" encoding="utf-8"?>
+<file path=ppt/slides/slide13.xml><?xml version="1.0" encoding="utf-8"?>
 <p:sld xmlns:a="http://schemas.openxmlformats.org/drawingml/2006/main" xmlns:r="http://schemas.openxmlformats.org/officeDocument/2006/relationships" xmlns:p="http://schemas.openxmlformats.org/presentationml/2006/main">
   <p:cSld>
     <p:spTree>
@@ -8179,10 +8268,6 @@
               </a:rPr>
               <a:t>https://localhost:8443/RetrieveTriples</a:t>
             </a:r>
-            <a:r>
-              <a:rPr lang="de-DE" dirty="0"/>
-              <a:t/>
-            </a:r>
             <a:br>
               <a:rPr lang="de-DE" dirty="0"/>
             </a:br>
@@ -8225,10 +8310,6 @@
             <a:pPr marL="0" indent="0">
               <a:buNone/>
             </a:pPr>
-            <a:r>
-              <a:rPr lang="en-GB" dirty="0"/>
-              <a:t/>
-            </a:r>
             <a:br>
               <a:rPr lang="en-GB" dirty="0"/>
             </a:br>
@@ -8258,7 +8339,7 @@
             <a:fld id="{2921BF44-F096-42DF-ADC3-B535522D2EE1}" type="slidenum">
               <a:rPr lang="en-GB" smtClean="0"/>
               <a:pPr/>
-              <a:t>12</a:t>
+              <a:t>13</a:t>
             </a:fld>
             <a:endParaRPr lang="en-GB" dirty="0"/>
           </a:p>
@@ -8385,7 +8466,7 @@
 </p:sld>
 </file>
 
-<file path=ppt/slides/slide13.xml><?xml version="1.0" encoding="utf-8"?>
+<file path=ppt/slides/slide14.xml><?xml version="1.0" encoding="utf-8"?>
 <p:sld xmlns:a="http://schemas.openxmlformats.org/drawingml/2006/main" xmlns:r="http://schemas.openxmlformats.org/officeDocument/2006/relationships" xmlns:p="http://schemas.openxmlformats.org/presentationml/2006/main">
   <p:cSld>
     <p:spTree>
@@ -8489,7 +8570,7 @@
             <a:fld id="{2921BF44-F096-42DF-ADC3-B535522D2EE1}" type="slidenum">
               <a:rPr lang="en-GB" smtClean="0"/>
               <a:pPr/>
-              <a:t>13</a:t>
+              <a:t>14</a:t>
             </a:fld>
             <a:endParaRPr lang="en-GB" dirty="0"/>
           </a:p>
@@ -8958,7 +9039,7 @@
                 <a14:useLocalDpi xmlns:a14="http://schemas.microsoft.com/office/drawing/2010/main" val="0"/>
               </a:ext>
               <a:ext uri="{96DAC541-7B7A-43D3-8B79-37D633B846F1}">
-                <asvg:svgBlip xmlns:asvg="http://schemas.microsoft.com/office/drawing/2016/SVG/main" xmlns="" r:embed="rId7"/>
+                <asvg:svgBlip xmlns:asvg="http://schemas.microsoft.com/office/drawing/2016/SVG/main" r:embed="rId7"/>
               </a:ext>
             </a:extLst>
           </a:blip>
@@ -8991,7 +9072,7 @@
                 <a14:useLocalDpi xmlns:a14="http://schemas.microsoft.com/office/drawing/2010/main" val="0"/>
               </a:ext>
               <a:ext uri="{96DAC541-7B7A-43D3-8B79-37D633B846F1}">
-                <asvg:svgBlip xmlns:asvg="http://schemas.microsoft.com/office/drawing/2016/SVG/main" xmlns="" r:embed="rId9"/>
+                <asvg:svgBlip xmlns:asvg="http://schemas.microsoft.com/office/drawing/2016/SVG/main" r:embed="rId9"/>
               </a:ext>
             </a:extLst>
           </a:blip>
@@ -9612,7 +9693,7 @@
                   <a14:useLocalDpi xmlns:a14="http://schemas.microsoft.com/office/drawing/2010/main" val="0"/>
                 </a:ext>
                 <a:ext uri="{96DAC541-7B7A-43D3-8B79-37D633B846F1}">
-                  <asvg:svgBlip xmlns:asvg="http://schemas.microsoft.com/office/drawing/2016/SVG/main" xmlns="" r:embed="rId5"/>
+                  <asvg:svgBlip xmlns:asvg="http://schemas.microsoft.com/office/drawing/2016/SVG/main" r:embed="rId5"/>
                 </a:ext>
               </a:extLst>
             </a:blip>
@@ -9772,7 +9853,7 @@
                   <a14:useLocalDpi xmlns:a14="http://schemas.microsoft.com/office/drawing/2010/main" val="0"/>
                 </a:ext>
                 <a:ext uri="{96DAC541-7B7A-43D3-8B79-37D633B846F1}">
-                  <asvg:svgBlip xmlns:asvg="http://schemas.microsoft.com/office/drawing/2016/SVG/main" xmlns="" r:embed="rId9"/>
+                  <asvg:svgBlip xmlns:asvg="http://schemas.microsoft.com/office/drawing/2016/SVG/main" r:embed="rId9"/>
                 </a:ext>
               </a:extLst>
             </a:blip>
@@ -9865,7 +9946,7 @@
                     <a14:useLocalDpi xmlns:a14="http://schemas.microsoft.com/office/drawing/2010/main" val="0"/>
                   </a:ext>
                   <a:ext uri="{96DAC541-7B7A-43D3-8B79-37D633B846F1}">
-                    <asvg:svgBlip xmlns:asvg="http://schemas.microsoft.com/office/drawing/2016/SVG/main" xmlns="" r:embed="rId11"/>
+                    <asvg:svgBlip xmlns:asvg="http://schemas.microsoft.com/office/drawing/2016/SVG/main" r:embed="rId11"/>
                   </a:ext>
                 </a:extLst>
               </a:blip>
@@ -9898,7 +9979,7 @@
                     <a14:useLocalDpi xmlns:a14="http://schemas.microsoft.com/office/drawing/2010/main" val="0"/>
                   </a:ext>
                   <a:ext uri="{96DAC541-7B7A-43D3-8B79-37D633B846F1}">
-                    <asvg:svgBlip xmlns:asvg="http://schemas.microsoft.com/office/drawing/2016/SVG/main" xmlns="" r:embed="rId13"/>
+                    <asvg:svgBlip xmlns:asvg="http://schemas.microsoft.com/office/drawing/2016/SVG/main" r:embed="rId13"/>
                   </a:ext>
                 </a:extLst>
               </a:blip>
@@ -10080,7 +10161,7 @@
                 <a14:useLocalDpi xmlns:a14="http://schemas.microsoft.com/office/drawing/2010/main" val="0"/>
               </a:ext>
               <a:ext uri="{96DAC541-7B7A-43D3-8B79-37D633B846F1}">
-                <asvg:svgBlip xmlns:asvg="http://schemas.microsoft.com/office/drawing/2016/SVG/main" xmlns="" r:embed="rId18"/>
+                <asvg:svgBlip xmlns:asvg="http://schemas.microsoft.com/office/drawing/2016/SVG/main" r:embed="rId18"/>
               </a:ext>
             </a:extLst>
           </a:blip>
@@ -10113,7 +10194,7 @@
                 <a14:useLocalDpi xmlns:a14="http://schemas.microsoft.com/office/drawing/2010/main" val="0"/>
               </a:ext>
               <a:ext uri="{96DAC541-7B7A-43D3-8B79-37D633B846F1}">
-                <asvg:svgBlip xmlns:asvg="http://schemas.microsoft.com/office/drawing/2016/SVG/main" xmlns="" r:embed="rId20"/>
+                <asvg:svgBlip xmlns:asvg="http://schemas.microsoft.com/office/drawing/2016/SVG/main" r:embed="rId20"/>
               </a:ext>
             </a:extLst>
           </a:blip>
@@ -10492,13 +10573,13 @@
             <p:nvPr/>
           </p:nvPicPr>
           <p:blipFill>
-            <a:blip r:embed="rId24" cstate="print">
+            <a:blip r:embed="rId12" cstate="print">
               <a:extLst>
                 <a:ext uri="{28A0092B-C50C-407E-A947-70E740481C1C}">
                   <a14:useLocalDpi xmlns:a14="http://schemas.microsoft.com/office/drawing/2010/main" val="0"/>
                 </a:ext>
                 <a:ext uri="{96DAC541-7B7A-43D3-8B79-37D633B846F1}">
-                  <asvg:svgBlip xmlns:asvg="http://schemas.microsoft.com/office/drawing/2016/SVG/main" xmlns="" r:embed="rId13"/>
+                  <asvg:svgBlip xmlns:asvg="http://schemas.microsoft.com/office/drawing/2016/SVG/main" r:embed="rId13"/>
                 </a:ext>
               </a:extLst>
             </a:blip>
@@ -12069,7 +12150,7 @@
                   <a14:useLocalDpi xmlns:a14="http://schemas.microsoft.com/office/drawing/2010/main" val="0"/>
                 </a:ext>
                 <a:ext uri="{96DAC541-7B7A-43D3-8B79-37D633B846F1}">
-                  <asvg:svgBlip xmlns:asvg="http://schemas.microsoft.com/office/drawing/2016/SVG/main" xmlns="" r:embed="rId6"/>
+                  <asvg:svgBlip xmlns:asvg="http://schemas.microsoft.com/office/drawing/2016/SVG/main" r:embed="rId6"/>
                 </a:ext>
               </a:extLst>
             </a:blip>
@@ -12228,7 +12309,7 @@
                 <a14:useLocalDpi xmlns:a14="http://schemas.microsoft.com/office/drawing/2010/main" val="0"/>
               </a:ext>
               <a:ext uri="{96DAC541-7B7A-43D3-8B79-37D633B846F1}">
-                <asvg:svgBlip xmlns:asvg="http://schemas.microsoft.com/office/drawing/2016/SVG/main" xmlns="" r:embed="rId8"/>
+                <asvg:svgBlip xmlns:asvg="http://schemas.microsoft.com/office/drawing/2016/SVG/main" r:embed="rId8"/>
               </a:ext>
             </a:extLst>
           </a:blip>
@@ -12275,7 +12356,7 @@
                   <a14:useLocalDpi xmlns:a14="http://schemas.microsoft.com/office/drawing/2010/main" val="0"/>
                 </a:ext>
                 <a:ext uri="{96DAC541-7B7A-43D3-8B79-37D633B846F1}">
-                  <asvg:svgBlip xmlns:asvg="http://schemas.microsoft.com/office/drawing/2016/SVG/main" xmlns="" r:embed="rId10"/>
+                  <asvg:svgBlip xmlns:asvg="http://schemas.microsoft.com/office/drawing/2016/SVG/main" r:embed="rId10"/>
                 </a:ext>
               </a:extLst>
             </a:blip>
@@ -12368,7 +12449,7 @@
                     <a14:useLocalDpi xmlns:a14="http://schemas.microsoft.com/office/drawing/2010/main" val="0"/>
                   </a:ext>
                   <a:ext uri="{96DAC541-7B7A-43D3-8B79-37D633B846F1}">
-                    <asvg:svgBlip xmlns:asvg="http://schemas.microsoft.com/office/drawing/2016/SVG/main" xmlns="" r:embed="rId12"/>
+                    <asvg:svgBlip xmlns:asvg="http://schemas.microsoft.com/office/drawing/2016/SVG/main" r:embed="rId12"/>
                   </a:ext>
                 </a:extLst>
               </a:blip>
@@ -12522,7 +12603,7 @@
                   <a14:useLocalDpi xmlns:a14="http://schemas.microsoft.com/office/drawing/2010/main" val="0"/>
                 </a:ext>
                 <a:ext uri="{96DAC541-7B7A-43D3-8B79-37D633B846F1}">
-                  <asvg:svgBlip xmlns:asvg="http://schemas.microsoft.com/office/drawing/2016/SVG/main" xmlns="" r:embed="rId16"/>
+                  <asvg:svgBlip xmlns:asvg="http://schemas.microsoft.com/office/drawing/2016/SVG/main" r:embed="rId16"/>
                 </a:ext>
               </a:extLst>
             </a:blip>
@@ -12601,7 +12682,7 @@
                   <a14:useLocalDpi xmlns:a14="http://schemas.microsoft.com/office/drawing/2010/main" val="0"/>
                 </a:ext>
                 <a:ext uri="{96DAC541-7B7A-43D3-8B79-37D633B846F1}">
-                  <asvg:svgBlip xmlns:asvg="http://schemas.microsoft.com/office/drawing/2016/SVG/main" xmlns="" r:embed="rId18"/>
+                  <asvg:svgBlip xmlns:asvg="http://schemas.microsoft.com/office/drawing/2016/SVG/main" r:embed="rId18"/>
                 </a:ext>
               </a:extLst>
             </a:blip>
@@ -12846,7 +12927,7 @@
                     <a14:useLocalDpi xmlns:a14="http://schemas.microsoft.com/office/drawing/2010/main" val="0"/>
                   </a:ext>
                   <a:ext uri="{96DAC541-7B7A-43D3-8B79-37D633B846F1}">
-                    <asvg:svgBlip xmlns:asvg="http://schemas.microsoft.com/office/drawing/2016/SVG/main" xmlns="" r:embed="rId22"/>
+                    <asvg:svgBlip xmlns:asvg="http://schemas.microsoft.com/office/drawing/2016/SVG/main" r:embed="rId22"/>
                   </a:ext>
                 </a:extLst>
               </a:blip>
@@ -12873,13 +12954,13 @@
               <p:nvPr/>
             </p:nvPicPr>
             <p:blipFill>
-              <a:blip r:embed="rId23" cstate="print">
+              <a:blip r:embed="rId15" cstate="print">
                 <a:extLst>
                   <a:ext uri="{28A0092B-C50C-407E-A947-70E740481C1C}">
                     <a14:useLocalDpi xmlns:a14="http://schemas.microsoft.com/office/drawing/2010/main" val="0"/>
                   </a:ext>
                   <a:ext uri="{96DAC541-7B7A-43D3-8B79-37D633B846F1}">
-                    <asvg:svgBlip xmlns:asvg="http://schemas.microsoft.com/office/drawing/2016/SVG/main" xmlns="" r:embed="rId16"/>
+                    <asvg:svgBlip xmlns:asvg="http://schemas.microsoft.com/office/drawing/2016/SVG/main" r:embed="rId16"/>
                   </a:ext>
                 </a:extLst>
               </a:blip>
@@ -12906,11 +12987,11 @@
               <p:nvPr/>
             </p:nvPicPr>
             <p:blipFill>
-              <a:blip r:embed="rId24" cstate="print">
+              <a:blip r:embed="rId23" cstate="print">
                 <a:extLst>
                   <a:ext uri="{BEBA8EAE-BF5A-486C-A8C5-ECC9F3942E4B}">
                     <a14:imgProps xmlns:a14="http://schemas.microsoft.com/office/drawing/2010/main">
-                      <a14:imgLayer r:embed="rId25">
+                      <a14:imgLayer r:embed="rId24">
                         <a14:imgEffect>
                           <a14:backgroundRemoval t="9425" b="94089" l="0" r="100000">
                             <a14:foregroundMark x1="5272" y1="63419" x2="5272" y2="63419"/>
@@ -12951,7 +13032,7 @@
               <p:nvPr/>
             </p:nvPicPr>
             <p:blipFill rotWithShape="1">
-              <a:blip r:embed="rId26" cstate="print">
+              <a:blip r:embed="rId25" cstate="print">
                 <a:extLst>
                   <a:ext uri="{28A0092B-C50C-407E-A947-70E740481C1C}">
                     <a14:useLocalDpi xmlns:a14="http://schemas.microsoft.com/office/drawing/2010/main" val="0"/>
@@ -14516,7 +14597,7 @@
                   <a14:useLocalDpi xmlns:a14="http://schemas.microsoft.com/office/drawing/2010/main" val="0"/>
                 </a:ext>
                 <a:ext uri="{96DAC541-7B7A-43D3-8B79-37D633B846F1}">
-                  <asvg:svgBlip xmlns:asvg="http://schemas.microsoft.com/office/drawing/2016/SVG/main" xmlns="" r:embed="rId3"/>
+                  <asvg:svgBlip xmlns:asvg="http://schemas.microsoft.com/office/drawing/2016/SVG/main" r:embed="rId3"/>
                 </a:ext>
               </a:extLst>
             </a:blip>
@@ -14787,8 +14868,8 @@
         </p:nvSpPr>
         <p:spPr>
           <a:xfrm>
-            <a:off x="1281841" y="4754334"/>
-            <a:ext cx="735571" cy="276999"/>
+            <a:off x="1235677" y="4754334"/>
+            <a:ext cx="781736" cy="307777"/>
           </a:xfrm>
           <a:prstGeom prst="rect">
             <a:avLst/>
@@ -14803,10 +14884,10 @@
           <a:p>
             <a:pPr algn="ctr"/>
             <a:r>
-              <a:rPr lang="en-GB" sz="1200" dirty="0"/>
+              <a:rPr lang="en-GB" sz="1400" dirty="0"/>
               <a:t>Website</a:t>
             </a:r>
-            <a:endParaRPr lang="de-DE" sz="1200" dirty="0"/>
+            <a:endParaRPr lang="de-DE" sz="1400" dirty="0"/>
           </a:p>
         </p:txBody>
       </p:sp>
@@ -14927,7 +15008,7 @@
                   <a14:useLocalDpi xmlns:a14="http://schemas.microsoft.com/office/drawing/2010/main" val="0"/>
                 </a:ext>
                 <a:ext uri="{96DAC541-7B7A-43D3-8B79-37D633B846F1}">
-                  <asvg:svgBlip xmlns:asvg="http://schemas.microsoft.com/office/drawing/2016/SVG/main" xmlns="" r:embed="rId7"/>
+                  <asvg:svgBlip xmlns:asvg="http://schemas.microsoft.com/office/drawing/2016/SVG/main" r:embed="rId7"/>
                 </a:ext>
               </a:extLst>
             </a:blip>
@@ -16204,7 +16285,7 @@
                   <a14:useLocalDpi xmlns:a14="http://schemas.microsoft.com/office/drawing/2010/main" val="0"/>
                 </a:ext>
                 <a:ext uri="{96DAC541-7B7A-43D3-8B79-37D633B846F1}">
-                  <asvg:svgBlip xmlns:asvg="http://schemas.microsoft.com/office/drawing/2016/SVG/main" xmlns="" r:embed="rId13"/>
+                  <asvg:svgBlip xmlns:asvg="http://schemas.microsoft.com/office/drawing/2016/SVG/main" r:embed="rId13"/>
                 </a:ext>
               </a:extLst>
             </a:blip>
@@ -17001,6 +17082,2721 @@
       </p:grpSpPr>
       <p:sp>
         <p:nvSpPr>
+          <p:cNvPr id="2" name="Title 1"/>
+          <p:cNvSpPr>
+            <a:spLocks noGrp="1"/>
+          </p:cNvSpPr>
+          <p:nvPr>
+            <p:ph type="title"/>
+          </p:nvPr>
+        </p:nvSpPr>
+        <p:spPr/>
+        <p:txBody>
+          <a:bodyPr/>
+          <a:lstStyle/>
+          <a:p>
+            <a:r>
+              <a:rPr lang="en-GB" dirty="0"/>
+              <a:t>Chrome extension</a:t>
+            </a:r>
+            <a:endParaRPr lang="de-DE" dirty="0"/>
+          </a:p>
+        </p:txBody>
+      </p:sp>
+      <p:sp>
+        <p:nvSpPr>
+          <p:cNvPr id="4" name="Slide Number Placeholder 3"/>
+          <p:cNvSpPr>
+            <a:spLocks noGrp="1"/>
+          </p:cNvSpPr>
+          <p:nvPr>
+            <p:ph type="sldNum" sz="quarter" idx="12"/>
+          </p:nvPr>
+        </p:nvSpPr>
+        <p:spPr/>
+        <p:txBody>
+          <a:bodyPr/>
+          <a:lstStyle/>
+          <a:p>
+            <a:fld id="{2921BF44-F096-42DF-ADC3-B535522D2EE1}" type="slidenum">
+              <a:rPr lang="en-GB" smtClean="0"/>
+              <a:pPr/>
+              <a:t>7</a:t>
+            </a:fld>
+            <a:endParaRPr lang="en-GB" dirty="0"/>
+          </a:p>
+        </p:txBody>
+      </p:sp>
+      <p:sp>
+        <p:nvSpPr>
+          <p:cNvPr id="5" name="Rechteck: abgerundete Ecken 2"/>
+          <p:cNvSpPr/>
+          <p:nvPr/>
+        </p:nvSpPr>
+        <p:spPr>
+          <a:xfrm>
+            <a:off x="5900049" y="2146225"/>
+            <a:ext cx="1624093" cy="3772030"/>
+          </a:xfrm>
+          <a:prstGeom prst="roundRect">
+            <a:avLst/>
+          </a:prstGeom>
+          <a:noFill/>
+          <a:ln>
+            <a:solidFill>
+              <a:schemeClr val="accent1"/>
+            </a:solidFill>
+          </a:ln>
+        </p:spPr>
+        <p:style>
+          <a:lnRef idx="2">
+            <a:schemeClr val="accent1">
+              <a:shade val="50000"/>
+            </a:schemeClr>
+          </a:lnRef>
+          <a:fillRef idx="1">
+            <a:schemeClr val="accent1"/>
+          </a:fillRef>
+          <a:effectRef idx="0">
+            <a:schemeClr val="accent1"/>
+          </a:effectRef>
+          <a:fontRef idx="minor">
+            <a:schemeClr val="lt1"/>
+          </a:fontRef>
+        </p:style>
+        <p:txBody>
+          <a:bodyPr rtlCol="0" anchor="t"/>
+          <a:lstStyle/>
+          <a:p>
+            <a:r>
+              <a:rPr lang="de-DE" dirty="0">
+                <a:solidFill>
+                  <a:schemeClr val="tx1"/>
+                </a:solidFill>
+              </a:rPr>
+              <a:t>Chrome Extension</a:t>
+            </a:r>
+          </a:p>
+        </p:txBody>
+      </p:sp>
+      <p:grpSp>
+        <p:nvGrpSpPr>
+          <p:cNvPr id="10" name="Group 9"/>
+          <p:cNvGrpSpPr/>
+          <p:nvPr/>
+        </p:nvGrpSpPr>
+        <p:grpSpPr>
+          <a:xfrm>
+            <a:off x="830747" y="3322815"/>
+            <a:ext cx="1637760" cy="1637760"/>
+            <a:chOff x="998955" y="4243888"/>
+            <a:chExt cx="1637760" cy="1637760"/>
+          </a:xfrm>
+        </p:grpSpPr>
+        <p:pic>
+          <p:nvPicPr>
+            <p:cNvPr id="6" name="Grafik 131" descr="Monitor"/>
+            <p:cNvPicPr>
+              <a:picLocks noChangeAspect="1"/>
+            </p:cNvPicPr>
+            <p:nvPr/>
+          </p:nvPicPr>
+          <p:blipFill>
+            <a:blip r:embed="rId2">
+              <a:extLst>
+                <a:ext uri="{28A0092B-C50C-407E-A947-70E740481C1C}">
+                  <a14:useLocalDpi xmlns:a14="http://schemas.microsoft.com/office/drawing/2010/main" val="0"/>
+                </a:ext>
+                <a:ext uri="{96DAC541-7B7A-43D3-8B79-37D633B846F1}">
+                  <asvg:svgBlip xmlns:asvg="http://schemas.microsoft.com/office/drawing/2016/SVG/main" r:embed="rId3"/>
+                </a:ext>
+              </a:extLst>
+            </a:blip>
+            <a:stretch>
+              <a:fillRect/>
+            </a:stretch>
+          </p:blipFill>
+          <p:spPr>
+            <a:xfrm>
+              <a:off x="998955" y="4243888"/>
+              <a:ext cx="1637760" cy="1637760"/>
+            </a:xfrm>
+            <a:prstGeom prst="rect">
+              <a:avLst/>
+            </a:prstGeom>
+          </p:spPr>
+        </p:pic>
+        <p:pic>
+          <p:nvPicPr>
+            <p:cNvPr id="8" name="Grafik 6"/>
+            <p:cNvPicPr>
+              <a:picLocks noChangeAspect="1"/>
+            </p:cNvPicPr>
+            <p:nvPr/>
+          </p:nvPicPr>
+          <p:blipFill>
+            <a:blip r:embed="rId4"/>
+            <a:stretch>
+              <a:fillRect/>
+            </a:stretch>
+          </p:blipFill>
+          <p:spPr>
+            <a:xfrm>
+              <a:off x="1238251" y="4585594"/>
+              <a:ext cx="1159408" cy="735437"/>
+            </a:xfrm>
+            <a:prstGeom prst="rect">
+              <a:avLst/>
+            </a:prstGeom>
+          </p:spPr>
+        </p:pic>
+      </p:grpSp>
+      <p:sp>
+        <p:nvSpPr>
+          <p:cNvPr id="11" name="Rechteck: abgerundete Ecken 2"/>
+          <p:cNvSpPr/>
+          <p:nvPr/>
+        </p:nvSpPr>
+        <p:spPr>
+          <a:xfrm>
+            <a:off x="844414" y="2109618"/>
+            <a:ext cx="1624093" cy="3772030"/>
+          </a:xfrm>
+          <a:prstGeom prst="roundRect">
+            <a:avLst/>
+          </a:prstGeom>
+          <a:noFill/>
+          <a:ln>
+            <a:solidFill>
+              <a:schemeClr val="accent1"/>
+            </a:solidFill>
+          </a:ln>
+        </p:spPr>
+        <p:style>
+          <a:lnRef idx="2">
+            <a:schemeClr val="accent1">
+              <a:shade val="50000"/>
+            </a:schemeClr>
+          </a:lnRef>
+          <a:fillRef idx="1">
+            <a:schemeClr val="accent1"/>
+          </a:fillRef>
+          <a:effectRef idx="0">
+            <a:schemeClr val="accent1"/>
+          </a:effectRef>
+          <a:fontRef idx="minor">
+            <a:schemeClr val="lt1"/>
+          </a:fontRef>
+        </p:style>
+        <p:txBody>
+          <a:bodyPr rtlCol="0" anchor="t"/>
+          <a:lstStyle/>
+          <a:p>
+            <a:r>
+              <a:rPr lang="de-DE" dirty="0">
+                <a:solidFill>
+                  <a:schemeClr val="tx1"/>
+                </a:solidFill>
+              </a:rPr>
+              <a:t>Browser</a:t>
+            </a:r>
+          </a:p>
+        </p:txBody>
+      </p:sp>
+      <p:sp>
+        <p:nvSpPr>
+          <p:cNvPr id="13" name="Rechteck: abgerundete Ecken 206"/>
+          <p:cNvSpPr/>
+          <p:nvPr/>
+        </p:nvSpPr>
+        <p:spPr>
+          <a:xfrm>
+            <a:off x="9448153" y="2146225"/>
+            <a:ext cx="1599088" cy="3772030"/>
+          </a:xfrm>
+          <a:prstGeom prst="roundRect">
+            <a:avLst/>
+          </a:prstGeom>
+          <a:solidFill>
+            <a:schemeClr val="bg2"/>
+          </a:solidFill>
+          <a:ln>
+            <a:solidFill>
+              <a:schemeClr val="accent1"/>
+            </a:solidFill>
+          </a:ln>
+        </p:spPr>
+        <p:style>
+          <a:lnRef idx="2">
+            <a:schemeClr val="accent1">
+              <a:shade val="50000"/>
+            </a:schemeClr>
+          </a:lnRef>
+          <a:fillRef idx="1">
+            <a:schemeClr val="accent1"/>
+          </a:fillRef>
+          <a:effectRef idx="0">
+            <a:schemeClr val="accent1"/>
+          </a:effectRef>
+          <a:fontRef idx="minor">
+            <a:schemeClr val="lt1"/>
+          </a:fontRef>
+        </p:style>
+        <p:txBody>
+          <a:bodyPr rtlCol="0" anchor="t"/>
+          <a:lstStyle/>
+          <a:p>
+            <a:r>
+              <a:rPr lang="de-DE" dirty="0">
+                <a:solidFill>
+                  <a:schemeClr val="tx1"/>
+                </a:solidFill>
+              </a:rPr>
+              <a:t>Server</a:t>
+            </a:r>
+          </a:p>
+        </p:txBody>
+      </p:sp>
+      <p:cxnSp>
+        <p:nvCxnSpPr>
+          <p:cNvPr id="15" name="Straight Arrow Connector 14"/>
+          <p:cNvCxnSpPr/>
+          <p:nvPr/>
+        </p:nvCxnSpPr>
+        <p:spPr>
+          <a:xfrm>
+            <a:off x="7524141" y="3895617"/>
+            <a:ext cx="1924011" cy="0"/>
+          </a:xfrm>
+          <a:prstGeom prst="straightConnector1">
+            <a:avLst/>
+          </a:prstGeom>
+          <a:ln w="38100">
+            <a:solidFill>
+              <a:schemeClr val="accent1">
+                <a:lumMod val="50000"/>
+              </a:schemeClr>
+            </a:solidFill>
+            <a:tailEnd type="triangle"/>
+          </a:ln>
+        </p:spPr>
+        <p:style>
+          <a:lnRef idx="1">
+            <a:schemeClr val="accent1"/>
+          </a:lnRef>
+          <a:fillRef idx="0">
+            <a:schemeClr val="accent1"/>
+          </a:fillRef>
+          <a:effectRef idx="0">
+            <a:schemeClr val="accent1"/>
+          </a:effectRef>
+          <a:fontRef idx="minor">
+            <a:schemeClr val="tx1"/>
+          </a:fontRef>
+        </p:style>
+      </p:cxnSp>
+      <p:cxnSp>
+        <p:nvCxnSpPr>
+          <p:cNvPr id="20" name="Straight Arrow Connector 19"/>
+          <p:cNvCxnSpPr/>
+          <p:nvPr/>
+        </p:nvCxnSpPr>
+        <p:spPr>
+          <a:xfrm flipH="1">
+            <a:off x="2468509" y="2523657"/>
+            <a:ext cx="3420946" cy="14345"/>
+          </a:xfrm>
+          <a:prstGeom prst="straightConnector1">
+            <a:avLst/>
+          </a:prstGeom>
+          <a:ln w="38100">
+            <a:solidFill>
+              <a:schemeClr val="accent1">
+                <a:lumMod val="50000"/>
+              </a:schemeClr>
+            </a:solidFill>
+            <a:tailEnd type="triangle"/>
+          </a:ln>
+        </p:spPr>
+        <p:style>
+          <a:lnRef idx="1">
+            <a:schemeClr val="accent1"/>
+          </a:lnRef>
+          <a:fillRef idx="0">
+            <a:schemeClr val="accent1"/>
+          </a:fillRef>
+          <a:effectRef idx="0">
+            <a:schemeClr val="accent1"/>
+          </a:effectRef>
+          <a:fontRef idx="minor">
+            <a:schemeClr val="tx1"/>
+          </a:fontRef>
+        </p:style>
+      </p:cxnSp>
+      <p:cxnSp>
+        <p:nvCxnSpPr>
+          <p:cNvPr id="49" name="Straight Arrow Connector 48"/>
+          <p:cNvCxnSpPr/>
+          <p:nvPr/>
+        </p:nvCxnSpPr>
+        <p:spPr>
+          <a:xfrm flipH="1" flipV="1">
+            <a:off x="2468510" y="3371215"/>
+            <a:ext cx="3420945" cy="12560"/>
+          </a:xfrm>
+          <a:prstGeom prst="straightConnector1">
+            <a:avLst/>
+          </a:prstGeom>
+          <a:ln w="38100">
+            <a:solidFill>
+              <a:schemeClr val="accent1">
+                <a:lumMod val="50000"/>
+              </a:schemeClr>
+            </a:solidFill>
+            <a:tailEnd type="triangle"/>
+          </a:ln>
+        </p:spPr>
+        <p:style>
+          <a:lnRef idx="1">
+            <a:schemeClr val="accent1"/>
+          </a:lnRef>
+          <a:fillRef idx="0">
+            <a:schemeClr val="accent1"/>
+          </a:fillRef>
+          <a:effectRef idx="0">
+            <a:schemeClr val="accent1"/>
+          </a:effectRef>
+          <a:fontRef idx="minor">
+            <a:schemeClr val="tx1"/>
+          </a:fontRef>
+        </p:style>
+      </p:cxnSp>
+      <p:sp>
+        <p:nvSpPr>
+          <p:cNvPr id="58" name="TextBox 57"/>
+          <p:cNvSpPr txBox="1"/>
+          <p:nvPr/>
+        </p:nvSpPr>
+        <p:spPr>
+          <a:xfrm>
+            <a:off x="1235677" y="4754334"/>
+            <a:ext cx="781736" cy="307777"/>
+          </a:xfrm>
+          <a:prstGeom prst="rect">
+            <a:avLst/>
+          </a:prstGeom>
+          <a:noFill/>
+        </p:spPr>
+        <p:txBody>
+          <a:bodyPr wrap="square" rtlCol="0">
+            <a:spAutoFit/>
+          </a:bodyPr>
+          <a:lstStyle/>
+          <a:p>
+            <a:pPr algn="ctr"/>
+            <a:r>
+              <a:rPr lang="en-GB" sz="1400" dirty="0"/>
+              <a:t>Website</a:t>
+            </a:r>
+            <a:endParaRPr lang="de-DE" sz="1400" dirty="0"/>
+          </a:p>
+        </p:txBody>
+      </p:sp>
+      <p:grpSp>
+        <p:nvGrpSpPr>
+          <p:cNvPr id="61" name="Group 60"/>
+          <p:cNvGrpSpPr/>
+          <p:nvPr/>
+        </p:nvGrpSpPr>
+        <p:grpSpPr>
+          <a:xfrm>
+            <a:off x="8452885" y="2923749"/>
+            <a:ext cx="809128" cy="994765"/>
+            <a:chOff x="7023909" y="3700176"/>
+            <a:chExt cx="809128" cy="994765"/>
+          </a:xfrm>
+        </p:grpSpPr>
+        <p:pic>
+          <p:nvPicPr>
+            <p:cNvPr id="9" name="Picture 4" descr="http://westwoodcivicclub.com/wp-content/uploads/2015/11/news-icon.png"/>
+            <p:cNvPicPr>
+              <a:picLocks noChangeAspect="1" noChangeArrowheads="1"/>
+            </p:cNvPicPr>
+            <p:nvPr/>
+          </p:nvPicPr>
+          <p:blipFill rotWithShape="1">
+            <a:blip r:embed="rId5" cstate="print">
+              <a:extLst>
+                <a:ext uri="{28A0092B-C50C-407E-A947-70E740481C1C}">
+                  <a14:useLocalDpi xmlns:a14="http://schemas.microsoft.com/office/drawing/2010/main" val="0"/>
+                </a:ext>
+              </a:extLst>
+            </a:blip>
+            <a:srcRect l="5276" t="6248" r="6322" b="6114"/>
+            <a:stretch/>
+          </p:blipFill>
+          <p:spPr bwMode="auto">
+            <a:xfrm>
+              <a:off x="7052236" y="3700176"/>
+              <a:ext cx="724042" cy="717781"/>
+            </a:xfrm>
+            <a:prstGeom prst="rect">
+              <a:avLst/>
+            </a:prstGeom>
+            <a:noFill/>
+            <a:effectLst>
+              <a:softEdge rad="63500"/>
+            </a:effectLst>
+            <a:extLst>
+              <a:ext uri="{909E8E84-426E-40DD-AFC4-6F175D3DCCD1}">
+                <a14:hiddenFill xmlns:a14="http://schemas.microsoft.com/office/drawing/2010/main">
+                  <a:solidFill>
+                    <a:srgbClr val="FFFFFF"/>
+                  </a:solidFill>
+                </a14:hiddenFill>
+              </a:ext>
+            </a:extLst>
+          </p:spPr>
+        </p:pic>
+        <p:sp>
+          <p:nvSpPr>
+            <p:cNvPr id="57" name="TextBox 56"/>
+            <p:cNvSpPr txBox="1"/>
+            <p:nvPr/>
+          </p:nvSpPr>
+          <p:spPr>
+            <a:xfrm>
+              <a:off x="7023909" y="4399596"/>
+              <a:ext cx="809128" cy="295345"/>
+            </a:xfrm>
+            <a:prstGeom prst="rect">
+              <a:avLst/>
+            </a:prstGeom>
+            <a:noFill/>
+          </p:spPr>
+          <p:txBody>
+            <a:bodyPr wrap="square" rtlCol="0">
+              <a:spAutoFit/>
+            </a:bodyPr>
+            <a:lstStyle/>
+            <a:p>
+              <a:pPr algn="ctr"/>
+              <a:r>
+                <a:rPr lang="en-GB" sz="1400" dirty="0"/>
+                <a:t>Content</a:t>
+              </a:r>
+              <a:endParaRPr lang="de-DE" sz="1400" dirty="0"/>
+            </a:p>
+          </p:txBody>
+        </p:sp>
+      </p:grpSp>
+      <p:grpSp>
+        <p:nvGrpSpPr>
+          <p:cNvPr id="60" name="Group 59"/>
+          <p:cNvGrpSpPr/>
+          <p:nvPr/>
+        </p:nvGrpSpPr>
+        <p:grpSpPr>
+          <a:xfrm>
+            <a:off x="7791990" y="2856719"/>
+            <a:ext cx="832361" cy="1071320"/>
+            <a:chOff x="6306726" y="3650506"/>
+            <a:chExt cx="832361" cy="1071320"/>
+          </a:xfrm>
+        </p:grpSpPr>
+        <p:pic>
+          <p:nvPicPr>
+            <p:cNvPr id="7" name="Grafik 132" descr="Prüfliste"/>
+            <p:cNvPicPr>
+              <a:picLocks noChangeAspect="1"/>
+            </p:cNvPicPr>
+            <p:nvPr/>
+          </p:nvPicPr>
+          <p:blipFill>
+            <a:blip r:embed="rId6" cstate="print">
+              <a:extLst>
+                <a:ext uri="{28A0092B-C50C-407E-A947-70E740481C1C}">
+                  <a14:useLocalDpi xmlns:a14="http://schemas.microsoft.com/office/drawing/2010/main" val="0"/>
+                </a:ext>
+                <a:ext uri="{96DAC541-7B7A-43D3-8B79-37D633B846F1}">
+                  <asvg:svgBlip xmlns:asvg="http://schemas.microsoft.com/office/drawing/2016/SVG/main" r:embed="rId7"/>
+                </a:ext>
+              </a:extLst>
+            </a:blip>
+            <a:stretch>
+              <a:fillRect/>
+            </a:stretch>
+          </p:blipFill>
+          <p:spPr>
+            <a:xfrm>
+              <a:off x="6306726" y="3650506"/>
+              <a:ext cx="832361" cy="832361"/>
+            </a:xfrm>
+            <a:prstGeom prst="rect">
+              <a:avLst/>
+            </a:prstGeom>
+          </p:spPr>
+        </p:pic>
+        <p:sp>
+          <p:nvSpPr>
+            <p:cNvPr id="56" name="TextBox 55"/>
+            <p:cNvSpPr txBox="1"/>
+            <p:nvPr/>
+          </p:nvSpPr>
+          <p:spPr>
+            <a:xfrm>
+              <a:off x="6311800" y="4426481"/>
+              <a:ext cx="809128" cy="295345"/>
+            </a:xfrm>
+            <a:prstGeom prst="rect">
+              <a:avLst/>
+            </a:prstGeom>
+            <a:noFill/>
+          </p:spPr>
+          <p:txBody>
+            <a:bodyPr wrap="square" rtlCol="0">
+              <a:spAutoFit/>
+            </a:bodyPr>
+            <a:lstStyle/>
+            <a:p>
+              <a:pPr algn="ctr"/>
+              <a:r>
+                <a:rPr lang="en-GB" sz="1400" dirty="0"/>
+                <a:t>Options</a:t>
+              </a:r>
+              <a:endParaRPr lang="de-DE" sz="1400" dirty="0"/>
+            </a:p>
+          </p:txBody>
+        </p:sp>
+      </p:grpSp>
+      <p:cxnSp>
+        <p:nvCxnSpPr>
+          <p:cNvPr id="69" name="Straight Arrow Connector 68"/>
+          <p:cNvCxnSpPr/>
+          <p:nvPr/>
+        </p:nvCxnSpPr>
+        <p:spPr>
+          <a:xfrm flipV="1">
+            <a:off x="2476128" y="4339880"/>
+            <a:ext cx="3431540" cy="1"/>
+          </a:xfrm>
+          <a:prstGeom prst="straightConnector1">
+            <a:avLst/>
+          </a:prstGeom>
+          <a:ln w="38100">
+            <a:solidFill>
+              <a:schemeClr val="accent1">
+                <a:lumMod val="50000"/>
+              </a:schemeClr>
+            </a:solidFill>
+            <a:tailEnd type="triangle"/>
+          </a:ln>
+        </p:spPr>
+        <p:style>
+          <a:lnRef idx="1">
+            <a:schemeClr val="accent1"/>
+          </a:lnRef>
+          <a:fillRef idx="0">
+            <a:schemeClr val="accent1"/>
+          </a:fillRef>
+          <a:effectRef idx="0">
+            <a:schemeClr val="accent1"/>
+          </a:effectRef>
+          <a:fontRef idx="minor">
+            <a:schemeClr val="tx1"/>
+          </a:fontRef>
+        </p:style>
+      </p:cxnSp>
+      <p:grpSp>
+        <p:nvGrpSpPr>
+          <p:cNvPr id="66" name="Group 65"/>
+          <p:cNvGrpSpPr/>
+          <p:nvPr/>
+        </p:nvGrpSpPr>
+        <p:grpSpPr>
+          <a:xfrm>
+            <a:off x="3777292" y="3472533"/>
+            <a:ext cx="809128" cy="939047"/>
+            <a:chOff x="7023909" y="3700176"/>
+            <a:chExt cx="809128" cy="939047"/>
+          </a:xfrm>
+        </p:grpSpPr>
+        <p:pic>
+          <p:nvPicPr>
+            <p:cNvPr id="67" name="Picture 4" descr="http://westwoodcivicclub.com/wp-content/uploads/2015/11/news-icon.png"/>
+            <p:cNvPicPr>
+              <a:picLocks noChangeAspect="1" noChangeArrowheads="1"/>
+            </p:cNvPicPr>
+            <p:nvPr/>
+          </p:nvPicPr>
+          <p:blipFill rotWithShape="1">
+            <a:blip r:embed="rId5" cstate="print">
+              <a:extLst>
+                <a:ext uri="{28A0092B-C50C-407E-A947-70E740481C1C}">
+                  <a14:useLocalDpi xmlns:a14="http://schemas.microsoft.com/office/drawing/2010/main" val="0"/>
+                </a:ext>
+              </a:extLst>
+            </a:blip>
+            <a:srcRect l="5276" t="6248" r="6322" b="6114"/>
+            <a:stretch/>
+          </p:blipFill>
+          <p:spPr bwMode="auto">
+            <a:xfrm>
+              <a:off x="7052236" y="3700176"/>
+              <a:ext cx="724042" cy="717781"/>
+            </a:xfrm>
+            <a:prstGeom prst="rect">
+              <a:avLst/>
+            </a:prstGeom>
+            <a:noFill/>
+            <a:effectLst>
+              <a:softEdge rad="63500"/>
+            </a:effectLst>
+            <a:extLst>
+              <a:ext uri="{909E8E84-426E-40DD-AFC4-6F175D3DCCD1}">
+                <a14:hiddenFill xmlns:a14="http://schemas.microsoft.com/office/drawing/2010/main">
+                  <a:solidFill>
+                    <a:srgbClr val="FFFFFF"/>
+                  </a:solidFill>
+                </a14:hiddenFill>
+              </a:ext>
+            </a:extLst>
+          </p:spPr>
+        </p:pic>
+        <p:sp>
+          <p:nvSpPr>
+            <p:cNvPr id="68" name="TextBox 67"/>
+            <p:cNvSpPr txBox="1"/>
+            <p:nvPr/>
+          </p:nvSpPr>
+          <p:spPr>
+            <a:xfrm>
+              <a:off x="7023909" y="4314344"/>
+              <a:ext cx="809128" cy="324879"/>
+            </a:xfrm>
+            <a:prstGeom prst="rect">
+              <a:avLst/>
+            </a:prstGeom>
+            <a:noFill/>
+          </p:spPr>
+          <p:txBody>
+            <a:bodyPr wrap="square" rtlCol="0">
+              <a:spAutoFit/>
+            </a:bodyPr>
+            <a:lstStyle/>
+            <a:p>
+              <a:pPr algn="ctr"/>
+              <a:r>
+                <a:rPr lang="en-GB" sz="1400" dirty="0"/>
+                <a:t>Content</a:t>
+              </a:r>
+              <a:endParaRPr lang="de-DE" sz="1400" dirty="0"/>
+            </a:p>
+          </p:txBody>
+        </p:sp>
+      </p:grpSp>
+      <p:grpSp>
+        <p:nvGrpSpPr>
+          <p:cNvPr id="74" name="Group 73"/>
+          <p:cNvGrpSpPr/>
+          <p:nvPr/>
+        </p:nvGrpSpPr>
+        <p:grpSpPr>
+          <a:xfrm>
+            <a:off x="3473980" y="2686347"/>
+            <a:ext cx="1435837" cy="690205"/>
+            <a:chOff x="3473980" y="2686347"/>
+            <a:chExt cx="1435837" cy="690205"/>
+          </a:xfrm>
+        </p:grpSpPr>
+        <p:sp>
+          <p:nvSpPr>
+            <p:cNvPr id="53" name="Content Placeholder 5"/>
+            <p:cNvSpPr txBox="1">
+              <a:spLocks/>
+            </p:cNvSpPr>
+            <p:nvPr/>
+          </p:nvSpPr>
+          <p:spPr>
+            <a:xfrm>
+              <a:off x="3473980" y="3092547"/>
+              <a:ext cx="1435837" cy="284005"/>
+            </a:xfrm>
+            <a:prstGeom prst="rect">
+              <a:avLst/>
+            </a:prstGeom>
+          </p:spPr>
+          <p:txBody>
+            <a:bodyPr anchor="t">
+              <a:noAutofit/>
+            </a:bodyPr>
+            <a:lstStyle>
+              <a:lvl1pPr marL="285750" indent="-285750" algn="l" defTabSz="457200" rtl="0" eaLnBrk="1" latinLnBrk="0" hangingPunct="1">
+                <a:spcBef>
+                  <a:spcPct val="20000"/>
+                </a:spcBef>
+                <a:spcAft>
+                  <a:spcPts val="600"/>
+                </a:spcAft>
+                <a:buClr>
+                  <a:schemeClr val="accent1">
+                    <a:lumMod val="75000"/>
+                  </a:schemeClr>
+                </a:buClr>
+                <a:buSzPct val="145000"/>
+                <a:buFont typeface="Arial"/>
+                <a:buChar char="•"/>
+                <a:defRPr sz="2400" kern="1200" cap="none">
+                  <a:solidFill>
+                    <a:schemeClr val="tx1"/>
+                  </a:solidFill>
+                  <a:effectLst/>
+                  <a:latin typeface="+mn-lt"/>
+                  <a:ea typeface="+mn-ea"/>
+                  <a:cs typeface="+mn-cs"/>
+                </a:defRPr>
+              </a:lvl1pPr>
+              <a:lvl2pPr marL="742950" indent="-285750" algn="l" defTabSz="457200" rtl="0" eaLnBrk="1" latinLnBrk="0" hangingPunct="1">
+                <a:spcBef>
+                  <a:spcPct val="20000"/>
+                </a:spcBef>
+                <a:spcAft>
+                  <a:spcPts val="600"/>
+                </a:spcAft>
+                <a:buClr>
+                  <a:schemeClr val="accent1">
+                    <a:lumMod val="75000"/>
+                  </a:schemeClr>
+                </a:buClr>
+                <a:buSzPct val="145000"/>
+                <a:buFont typeface="Arial"/>
+                <a:buChar char="•"/>
+                <a:defRPr sz="2000" kern="1200" cap="none">
+                  <a:solidFill>
+                    <a:schemeClr val="tx1"/>
+                  </a:solidFill>
+                  <a:effectLst/>
+                  <a:latin typeface="+mn-lt"/>
+                  <a:ea typeface="+mn-ea"/>
+                  <a:cs typeface="+mn-cs"/>
+                </a:defRPr>
+              </a:lvl2pPr>
+              <a:lvl3pPr marL="1200150" indent="-285750" algn="l" defTabSz="457200" rtl="0" eaLnBrk="1" latinLnBrk="0" hangingPunct="1">
+                <a:spcBef>
+                  <a:spcPct val="20000"/>
+                </a:spcBef>
+                <a:spcAft>
+                  <a:spcPts val="600"/>
+                </a:spcAft>
+                <a:buClr>
+                  <a:schemeClr val="accent1">
+                    <a:lumMod val="75000"/>
+                  </a:schemeClr>
+                </a:buClr>
+                <a:buSzPct val="145000"/>
+                <a:buFont typeface="Arial"/>
+                <a:buChar char="•"/>
+                <a:defRPr sz="1800" kern="1200" cap="none">
+                  <a:solidFill>
+                    <a:schemeClr val="tx1"/>
+                  </a:solidFill>
+                  <a:effectLst/>
+                  <a:latin typeface="+mn-lt"/>
+                  <a:ea typeface="+mn-ea"/>
+                  <a:cs typeface="+mn-cs"/>
+                </a:defRPr>
+              </a:lvl3pPr>
+              <a:lvl4pPr marL="1543050" indent="-171450" algn="l" defTabSz="457200" rtl="0" eaLnBrk="1" latinLnBrk="0" hangingPunct="1">
+                <a:spcBef>
+                  <a:spcPct val="20000"/>
+                </a:spcBef>
+                <a:spcAft>
+                  <a:spcPts val="600"/>
+                </a:spcAft>
+                <a:buClr>
+                  <a:schemeClr val="accent1">
+                    <a:lumMod val="75000"/>
+                  </a:schemeClr>
+                </a:buClr>
+                <a:buSzPct val="145000"/>
+                <a:buFont typeface="Arial"/>
+                <a:buChar char="•"/>
+                <a:defRPr sz="1600" kern="1200" cap="none">
+                  <a:solidFill>
+                    <a:schemeClr val="tx1"/>
+                  </a:solidFill>
+                  <a:effectLst/>
+                  <a:latin typeface="+mn-lt"/>
+                  <a:ea typeface="+mn-ea"/>
+                  <a:cs typeface="+mn-cs"/>
+                </a:defRPr>
+              </a:lvl4pPr>
+              <a:lvl5pPr marL="2000250" indent="-171450" algn="l" defTabSz="457200" rtl="0" eaLnBrk="1" latinLnBrk="0" hangingPunct="1">
+                <a:spcBef>
+                  <a:spcPct val="20000"/>
+                </a:spcBef>
+                <a:spcAft>
+                  <a:spcPts val="600"/>
+                </a:spcAft>
+                <a:buClr>
+                  <a:schemeClr val="accent1">
+                    <a:lumMod val="75000"/>
+                  </a:schemeClr>
+                </a:buClr>
+                <a:buSzPct val="145000"/>
+                <a:buFont typeface="Arial"/>
+                <a:buChar char="•"/>
+                <a:defRPr sz="1400" kern="1200" cap="none">
+                  <a:solidFill>
+                    <a:schemeClr val="tx1"/>
+                  </a:solidFill>
+                  <a:effectLst/>
+                  <a:latin typeface="+mn-lt"/>
+                  <a:ea typeface="+mn-ea"/>
+                  <a:cs typeface="+mn-cs"/>
+                </a:defRPr>
+              </a:lvl5pPr>
+              <a:lvl6pPr marL="2514600" indent="-228600" algn="l" defTabSz="457200" rtl="0" eaLnBrk="1" latinLnBrk="0" hangingPunct="1">
+                <a:spcBef>
+                  <a:spcPct val="20000"/>
+                </a:spcBef>
+                <a:spcAft>
+                  <a:spcPts val="600"/>
+                </a:spcAft>
+                <a:buClr>
+                  <a:schemeClr val="accent1">
+                    <a:lumMod val="75000"/>
+                  </a:schemeClr>
+                </a:buClr>
+                <a:buSzPct val="145000"/>
+                <a:buFont typeface="Arial"/>
+                <a:buChar char="•"/>
+                <a:defRPr sz="1400" kern="1200" cap="none">
+                  <a:solidFill>
+                    <a:schemeClr val="tx1"/>
+                  </a:solidFill>
+                  <a:effectLst/>
+                  <a:latin typeface="+mn-lt"/>
+                  <a:ea typeface="+mn-ea"/>
+                  <a:cs typeface="+mn-cs"/>
+                </a:defRPr>
+              </a:lvl6pPr>
+              <a:lvl7pPr marL="2971800" indent="-228600" algn="l" defTabSz="457200" rtl="0" eaLnBrk="1" latinLnBrk="0" hangingPunct="1">
+                <a:spcBef>
+                  <a:spcPct val="20000"/>
+                </a:spcBef>
+                <a:spcAft>
+                  <a:spcPts val="600"/>
+                </a:spcAft>
+                <a:buClr>
+                  <a:schemeClr val="accent1">
+                    <a:lumMod val="75000"/>
+                  </a:schemeClr>
+                </a:buClr>
+                <a:buSzPct val="145000"/>
+                <a:buFont typeface="Arial"/>
+                <a:buChar char="•"/>
+                <a:defRPr sz="1400" kern="1200" cap="none">
+                  <a:solidFill>
+                    <a:schemeClr val="tx1"/>
+                  </a:solidFill>
+                  <a:effectLst/>
+                  <a:latin typeface="+mn-lt"/>
+                  <a:ea typeface="+mn-ea"/>
+                  <a:cs typeface="+mn-cs"/>
+                </a:defRPr>
+              </a:lvl7pPr>
+              <a:lvl8pPr marL="3429000" indent="-228600" algn="l" defTabSz="457200" rtl="0" eaLnBrk="1" latinLnBrk="0" hangingPunct="1">
+                <a:spcBef>
+                  <a:spcPct val="20000"/>
+                </a:spcBef>
+                <a:spcAft>
+                  <a:spcPts val="600"/>
+                </a:spcAft>
+                <a:buClr>
+                  <a:schemeClr val="accent1">
+                    <a:lumMod val="75000"/>
+                  </a:schemeClr>
+                </a:buClr>
+                <a:buSzPct val="145000"/>
+                <a:buFont typeface="Arial"/>
+                <a:buChar char="•"/>
+                <a:defRPr sz="1400" kern="1200" cap="none">
+                  <a:solidFill>
+                    <a:schemeClr val="tx1"/>
+                  </a:solidFill>
+                  <a:effectLst/>
+                  <a:latin typeface="+mn-lt"/>
+                  <a:ea typeface="+mn-ea"/>
+                  <a:cs typeface="+mn-cs"/>
+                </a:defRPr>
+              </a:lvl8pPr>
+              <a:lvl9pPr marL="3886200" indent="-228600" algn="l" defTabSz="457200" rtl="0" eaLnBrk="1" latinLnBrk="0" hangingPunct="1">
+                <a:spcBef>
+                  <a:spcPct val="20000"/>
+                </a:spcBef>
+                <a:spcAft>
+                  <a:spcPts val="600"/>
+                </a:spcAft>
+                <a:buClr>
+                  <a:schemeClr val="accent1">
+                    <a:lumMod val="75000"/>
+                  </a:schemeClr>
+                </a:buClr>
+                <a:buSzPct val="145000"/>
+                <a:buFont typeface="Arial"/>
+                <a:buChar char="•"/>
+                <a:defRPr sz="1400" kern="1200" cap="none">
+                  <a:solidFill>
+                    <a:schemeClr val="tx1"/>
+                  </a:solidFill>
+                  <a:effectLst/>
+                  <a:latin typeface="+mn-lt"/>
+                  <a:ea typeface="+mn-ea"/>
+                  <a:cs typeface="+mn-cs"/>
+                </a:defRPr>
+              </a:lvl9pPr>
+            </a:lstStyle>
+            <a:p>
+              <a:pPr marL="0" indent="0" algn="ctr">
+                <a:buFont typeface="Arial"/>
+                <a:buNone/>
+              </a:pPr>
+              <a:r>
+                <a:rPr lang="en-GB" sz="1400" dirty="0"/>
+                <a:t>Generate button</a:t>
+              </a:r>
+              <a:endParaRPr lang="de-DE" sz="1400" dirty="0"/>
+            </a:p>
+          </p:txBody>
+        </p:sp>
+        <p:pic>
+          <p:nvPicPr>
+            <p:cNvPr id="1028" name="Picture 4" descr="https://cdn0.iconfinder.com/data/icons/HTML5/512/HTML_Logo.png"/>
+            <p:cNvPicPr>
+              <a:picLocks noChangeAspect="1" noChangeArrowheads="1"/>
+            </p:cNvPicPr>
+            <p:nvPr/>
+          </p:nvPicPr>
+          <p:blipFill>
+            <a:blip r:embed="rId8" cstate="print">
+              <a:extLst>
+                <a:ext uri="{28A0092B-C50C-407E-A947-70E740481C1C}">
+                  <a14:useLocalDpi xmlns:a14="http://schemas.microsoft.com/office/drawing/2010/main" val="0"/>
+                </a:ext>
+              </a:extLst>
+            </a:blip>
+            <a:srcRect/>
+            <a:stretch>
+              <a:fillRect/>
+            </a:stretch>
+          </p:blipFill>
+          <p:spPr bwMode="auto">
+            <a:xfrm>
+              <a:off x="3929051" y="2686347"/>
+              <a:ext cx="495120" cy="495120"/>
+            </a:xfrm>
+            <a:prstGeom prst="rect">
+              <a:avLst/>
+            </a:prstGeom>
+            <a:noFill/>
+            <a:extLst>
+              <a:ext uri="{909E8E84-426E-40DD-AFC4-6F175D3DCCD1}">
+                <a14:hiddenFill xmlns:a14="http://schemas.microsoft.com/office/drawing/2010/main">
+                  <a:solidFill>
+                    <a:srgbClr val="FFFFFF"/>
+                  </a:solidFill>
+                </a14:hiddenFill>
+              </a:ext>
+            </a:extLst>
+          </p:spPr>
+        </p:pic>
+      </p:grpSp>
+      <p:grpSp>
+        <p:nvGrpSpPr>
+          <p:cNvPr id="75" name="Group 74"/>
+          <p:cNvGrpSpPr/>
+          <p:nvPr/>
+        </p:nvGrpSpPr>
+        <p:grpSpPr>
+          <a:xfrm>
+            <a:off x="3404128" y="1789542"/>
+            <a:ext cx="1558157" cy="734114"/>
+            <a:chOff x="2946928" y="1789542"/>
+            <a:chExt cx="1558157" cy="734114"/>
+          </a:xfrm>
+        </p:grpSpPr>
+        <p:sp>
+          <p:nvSpPr>
+            <p:cNvPr id="23" name="Content Placeholder 5"/>
+            <p:cNvSpPr txBox="1">
+              <a:spLocks/>
+            </p:cNvSpPr>
+            <p:nvPr/>
+          </p:nvSpPr>
+          <p:spPr>
+            <a:xfrm>
+              <a:off x="2946928" y="2239651"/>
+              <a:ext cx="1558157" cy="284005"/>
+            </a:xfrm>
+            <a:prstGeom prst="rect">
+              <a:avLst/>
+            </a:prstGeom>
+          </p:spPr>
+          <p:txBody>
+            <a:bodyPr anchor="t">
+              <a:noAutofit/>
+            </a:bodyPr>
+            <a:lstStyle>
+              <a:lvl1pPr marL="285750" indent="-285750" algn="l" defTabSz="457200" rtl="0" eaLnBrk="1" latinLnBrk="0" hangingPunct="1">
+                <a:spcBef>
+                  <a:spcPct val="20000"/>
+                </a:spcBef>
+                <a:spcAft>
+                  <a:spcPts val="600"/>
+                </a:spcAft>
+                <a:buClr>
+                  <a:schemeClr val="accent1">
+                    <a:lumMod val="75000"/>
+                  </a:schemeClr>
+                </a:buClr>
+                <a:buSzPct val="145000"/>
+                <a:buFont typeface="Arial"/>
+                <a:buChar char="•"/>
+                <a:defRPr sz="2400" kern="1200" cap="none">
+                  <a:solidFill>
+                    <a:schemeClr val="tx1"/>
+                  </a:solidFill>
+                  <a:effectLst/>
+                  <a:latin typeface="+mn-lt"/>
+                  <a:ea typeface="+mn-ea"/>
+                  <a:cs typeface="+mn-cs"/>
+                </a:defRPr>
+              </a:lvl1pPr>
+              <a:lvl2pPr marL="742950" indent="-285750" algn="l" defTabSz="457200" rtl="0" eaLnBrk="1" latinLnBrk="0" hangingPunct="1">
+                <a:spcBef>
+                  <a:spcPct val="20000"/>
+                </a:spcBef>
+                <a:spcAft>
+                  <a:spcPts val="600"/>
+                </a:spcAft>
+                <a:buClr>
+                  <a:schemeClr val="accent1">
+                    <a:lumMod val="75000"/>
+                  </a:schemeClr>
+                </a:buClr>
+                <a:buSzPct val="145000"/>
+                <a:buFont typeface="Arial"/>
+                <a:buChar char="•"/>
+                <a:defRPr sz="2000" kern="1200" cap="none">
+                  <a:solidFill>
+                    <a:schemeClr val="tx1"/>
+                  </a:solidFill>
+                  <a:effectLst/>
+                  <a:latin typeface="+mn-lt"/>
+                  <a:ea typeface="+mn-ea"/>
+                  <a:cs typeface="+mn-cs"/>
+                </a:defRPr>
+              </a:lvl2pPr>
+              <a:lvl3pPr marL="1200150" indent="-285750" algn="l" defTabSz="457200" rtl="0" eaLnBrk="1" latinLnBrk="0" hangingPunct="1">
+                <a:spcBef>
+                  <a:spcPct val="20000"/>
+                </a:spcBef>
+                <a:spcAft>
+                  <a:spcPts val="600"/>
+                </a:spcAft>
+                <a:buClr>
+                  <a:schemeClr val="accent1">
+                    <a:lumMod val="75000"/>
+                  </a:schemeClr>
+                </a:buClr>
+                <a:buSzPct val="145000"/>
+                <a:buFont typeface="Arial"/>
+                <a:buChar char="•"/>
+                <a:defRPr sz="1800" kern="1200" cap="none">
+                  <a:solidFill>
+                    <a:schemeClr val="tx1"/>
+                  </a:solidFill>
+                  <a:effectLst/>
+                  <a:latin typeface="+mn-lt"/>
+                  <a:ea typeface="+mn-ea"/>
+                  <a:cs typeface="+mn-cs"/>
+                </a:defRPr>
+              </a:lvl3pPr>
+              <a:lvl4pPr marL="1543050" indent="-171450" algn="l" defTabSz="457200" rtl="0" eaLnBrk="1" latinLnBrk="0" hangingPunct="1">
+                <a:spcBef>
+                  <a:spcPct val="20000"/>
+                </a:spcBef>
+                <a:spcAft>
+                  <a:spcPts val="600"/>
+                </a:spcAft>
+                <a:buClr>
+                  <a:schemeClr val="accent1">
+                    <a:lumMod val="75000"/>
+                  </a:schemeClr>
+                </a:buClr>
+                <a:buSzPct val="145000"/>
+                <a:buFont typeface="Arial"/>
+                <a:buChar char="•"/>
+                <a:defRPr sz="1600" kern="1200" cap="none">
+                  <a:solidFill>
+                    <a:schemeClr val="tx1"/>
+                  </a:solidFill>
+                  <a:effectLst/>
+                  <a:latin typeface="+mn-lt"/>
+                  <a:ea typeface="+mn-ea"/>
+                  <a:cs typeface="+mn-cs"/>
+                </a:defRPr>
+              </a:lvl4pPr>
+              <a:lvl5pPr marL="2000250" indent="-171450" algn="l" defTabSz="457200" rtl="0" eaLnBrk="1" latinLnBrk="0" hangingPunct="1">
+                <a:spcBef>
+                  <a:spcPct val="20000"/>
+                </a:spcBef>
+                <a:spcAft>
+                  <a:spcPts val="600"/>
+                </a:spcAft>
+                <a:buClr>
+                  <a:schemeClr val="accent1">
+                    <a:lumMod val="75000"/>
+                  </a:schemeClr>
+                </a:buClr>
+                <a:buSzPct val="145000"/>
+                <a:buFont typeface="Arial"/>
+                <a:buChar char="•"/>
+                <a:defRPr sz="1400" kern="1200" cap="none">
+                  <a:solidFill>
+                    <a:schemeClr val="tx1"/>
+                  </a:solidFill>
+                  <a:effectLst/>
+                  <a:latin typeface="+mn-lt"/>
+                  <a:ea typeface="+mn-ea"/>
+                  <a:cs typeface="+mn-cs"/>
+                </a:defRPr>
+              </a:lvl5pPr>
+              <a:lvl6pPr marL="2514600" indent="-228600" algn="l" defTabSz="457200" rtl="0" eaLnBrk="1" latinLnBrk="0" hangingPunct="1">
+                <a:spcBef>
+                  <a:spcPct val="20000"/>
+                </a:spcBef>
+                <a:spcAft>
+                  <a:spcPts val="600"/>
+                </a:spcAft>
+                <a:buClr>
+                  <a:schemeClr val="accent1">
+                    <a:lumMod val="75000"/>
+                  </a:schemeClr>
+                </a:buClr>
+                <a:buSzPct val="145000"/>
+                <a:buFont typeface="Arial"/>
+                <a:buChar char="•"/>
+                <a:defRPr sz="1400" kern="1200" cap="none">
+                  <a:solidFill>
+                    <a:schemeClr val="tx1"/>
+                  </a:solidFill>
+                  <a:effectLst/>
+                  <a:latin typeface="+mn-lt"/>
+                  <a:ea typeface="+mn-ea"/>
+                  <a:cs typeface="+mn-cs"/>
+                </a:defRPr>
+              </a:lvl6pPr>
+              <a:lvl7pPr marL="2971800" indent="-228600" algn="l" defTabSz="457200" rtl="0" eaLnBrk="1" latinLnBrk="0" hangingPunct="1">
+                <a:spcBef>
+                  <a:spcPct val="20000"/>
+                </a:spcBef>
+                <a:spcAft>
+                  <a:spcPts val="600"/>
+                </a:spcAft>
+                <a:buClr>
+                  <a:schemeClr val="accent1">
+                    <a:lumMod val="75000"/>
+                  </a:schemeClr>
+                </a:buClr>
+                <a:buSzPct val="145000"/>
+                <a:buFont typeface="Arial"/>
+                <a:buChar char="•"/>
+                <a:defRPr sz="1400" kern="1200" cap="none">
+                  <a:solidFill>
+                    <a:schemeClr val="tx1"/>
+                  </a:solidFill>
+                  <a:effectLst/>
+                  <a:latin typeface="+mn-lt"/>
+                  <a:ea typeface="+mn-ea"/>
+                  <a:cs typeface="+mn-cs"/>
+                </a:defRPr>
+              </a:lvl7pPr>
+              <a:lvl8pPr marL="3429000" indent="-228600" algn="l" defTabSz="457200" rtl="0" eaLnBrk="1" latinLnBrk="0" hangingPunct="1">
+                <a:spcBef>
+                  <a:spcPct val="20000"/>
+                </a:spcBef>
+                <a:spcAft>
+                  <a:spcPts val="600"/>
+                </a:spcAft>
+                <a:buClr>
+                  <a:schemeClr val="accent1">
+                    <a:lumMod val="75000"/>
+                  </a:schemeClr>
+                </a:buClr>
+                <a:buSzPct val="145000"/>
+                <a:buFont typeface="Arial"/>
+                <a:buChar char="•"/>
+                <a:defRPr sz="1400" kern="1200" cap="none">
+                  <a:solidFill>
+                    <a:schemeClr val="tx1"/>
+                  </a:solidFill>
+                  <a:effectLst/>
+                  <a:latin typeface="+mn-lt"/>
+                  <a:ea typeface="+mn-ea"/>
+                  <a:cs typeface="+mn-cs"/>
+                </a:defRPr>
+              </a:lvl8pPr>
+              <a:lvl9pPr marL="3886200" indent="-228600" algn="l" defTabSz="457200" rtl="0" eaLnBrk="1" latinLnBrk="0" hangingPunct="1">
+                <a:spcBef>
+                  <a:spcPct val="20000"/>
+                </a:spcBef>
+                <a:spcAft>
+                  <a:spcPts val="600"/>
+                </a:spcAft>
+                <a:buClr>
+                  <a:schemeClr val="accent1">
+                    <a:lumMod val="75000"/>
+                  </a:schemeClr>
+                </a:buClr>
+                <a:buSzPct val="145000"/>
+                <a:buFont typeface="Arial"/>
+                <a:buChar char="•"/>
+                <a:defRPr sz="1400" kern="1200" cap="none">
+                  <a:solidFill>
+                    <a:schemeClr val="tx1"/>
+                  </a:solidFill>
+                  <a:effectLst/>
+                  <a:latin typeface="+mn-lt"/>
+                  <a:ea typeface="+mn-ea"/>
+                  <a:cs typeface="+mn-cs"/>
+                </a:defRPr>
+              </a:lvl9pPr>
+            </a:lstStyle>
+            <a:p>
+              <a:pPr marL="0" indent="0" algn="ctr">
+                <a:buFont typeface="Arial"/>
+                <a:buNone/>
+              </a:pPr>
+              <a:r>
+                <a:rPr lang="en-GB" sz="1400" dirty="0"/>
+                <a:t>Background script</a:t>
+              </a:r>
+              <a:endParaRPr lang="de-DE" sz="1400" dirty="0"/>
+            </a:p>
+          </p:txBody>
+        </p:sp>
+        <p:pic>
+          <p:nvPicPr>
+            <p:cNvPr id="1030" name="Picture 6" descr="http://dev.bowdenweb.com/a/i/js/icons/javascript-icon-512-04.png"/>
+            <p:cNvPicPr>
+              <a:picLocks noChangeAspect="1" noChangeArrowheads="1"/>
+            </p:cNvPicPr>
+            <p:nvPr/>
+          </p:nvPicPr>
+          <p:blipFill>
+            <a:blip r:embed="rId9" cstate="print">
+              <a:extLst>
+                <a:ext uri="{28A0092B-C50C-407E-A947-70E740481C1C}">
+                  <a14:useLocalDpi xmlns:a14="http://schemas.microsoft.com/office/drawing/2010/main" val="0"/>
+                </a:ext>
+              </a:extLst>
+            </a:blip>
+            <a:srcRect/>
+            <a:stretch>
+              <a:fillRect/>
+            </a:stretch>
+          </p:blipFill>
+          <p:spPr bwMode="auto">
+            <a:xfrm>
+              <a:off x="3479472" y="1789542"/>
+              <a:ext cx="450109" cy="450109"/>
+            </a:xfrm>
+            <a:prstGeom prst="rect">
+              <a:avLst/>
+            </a:prstGeom>
+            <a:noFill/>
+            <a:extLst>
+              <a:ext uri="{909E8E84-426E-40DD-AFC4-6F175D3DCCD1}">
+                <a14:hiddenFill xmlns:a14="http://schemas.microsoft.com/office/drawing/2010/main">
+                  <a:solidFill>
+                    <a:srgbClr val="FFFFFF"/>
+                  </a:solidFill>
+                </a14:hiddenFill>
+              </a:ext>
+            </a:extLst>
+          </p:spPr>
+        </p:pic>
+      </p:grpSp>
+      <p:grpSp>
+        <p:nvGrpSpPr>
+          <p:cNvPr id="84" name="Group 83"/>
+          <p:cNvGrpSpPr/>
+          <p:nvPr/>
+        </p:nvGrpSpPr>
+        <p:grpSpPr>
+          <a:xfrm>
+            <a:off x="3503575" y="4976302"/>
+            <a:ext cx="1435837" cy="690205"/>
+            <a:chOff x="3473980" y="2686347"/>
+            <a:chExt cx="1435837" cy="690205"/>
+          </a:xfrm>
+        </p:grpSpPr>
+        <p:sp>
+          <p:nvSpPr>
+            <p:cNvPr id="85" name="Content Placeholder 5"/>
+            <p:cNvSpPr txBox="1">
+              <a:spLocks/>
+            </p:cNvSpPr>
+            <p:nvPr/>
+          </p:nvSpPr>
+          <p:spPr>
+            <a:xfrm>
+              <a:off x="3473980" y="3092547"/>
+              <a:ext cx="1435837" cy="284005"/>
+            </a:xfrm>
+            <a:prstGeom prst="rect">
+              <a:avLst/>
+            </a:prstGeom>
+          </p:spPr>
+          <p:txBody>
+            <a:bodyPr anchor="t">
+              <a:noAutofit/>
+            </a:bodyPr>
+            <a:lstStyle>
+              <a:lvl1pPr marL="285750" indent="-285750" algn="l" defTabSz="457200" rtl="0" eaLnBrk="1" latinLnBrk="0" hangingPunct="1">
+                <a:spcBef>
+                  <a:spcPct val="20000"/>
+                </a:spcBef>
+                <a:spcAft>
+                  <a:spcPts val="600"/>
+                </a:spcAft>
+                <a:buClr>
+                  <a:schemeClr val="accent1">
+                    <a:lumMod val="75000"/>
+                  </a:schemeClr>
+                </a:buClr>
+                <a:buSzPct val="145000"/>
+                <a:buFont typeface="Arial"/>
+                <a:buChar char="•"/>
+                <a:defRPr sz="2400" kern="1200" cap="none">
+                  <a:solidFill>
+                    <a:schemeClr val="tx1"/>
+                  </a:solidFill>
+                  <a:effectLst/>
+                  <a:latin typeface="+mn-lt"/>
+                  <a:ea typeface="+mn-ea"/>
+                  <a:cs typeface="+mn-cs"/>
+                </a:defRPr>
+              </a:lvl1pPr>
+              <a:lvl2pPr marL="742950" indent="-285750" algn="l" defTabSz="457200" rtl="0" eaLnBrk="1" latinLnBrk="0" hangingPunct="1">
+                <a:spcBef>
+                  <a:spcPct val="20000"/>
+                </a:spcBef>
+                <a:spcAft>
+                  <a:spcPts val="600"/>
+                </a:spcAft>
+                <a:buClr>
+                  <a:schemeClr val="accent1">
+                    <a:lumMod val="75000"/>
+                  </a:schemeClr>
+                </a:buClr>
+                <a:buSzPct val="145000"/>
+                <a:buFont typeface="Arial"/>
+                <a:buChar char="•"/>
+                <a:defRPr sz="2000" kern="1200" cap="none">
+                  <a:solidFill>
+                    <a:schemeClr val="tx1"/>
+                  </a:solidFill>
+                  <a:effectLst/>
+                  <a:latin typeface="+mn-lt"/>
+                  <a:ea typeface="+mn-ea"/>
+                  <a:cs typeface="+mn-cs"/>
+                </a:defRPr>
+              </a:lvl2pPr>
+              <a:lvl3pPr marL="1200150" indent="-285750" algn="l" defTabSz="457200" rtl="0" eaLnBrk="1" latinLnBrk="0" hangingPunct="1">
+                <a:spcBef>
+                  <a:spcPct val="20000"/>
+                </a:spcBef>
+                <a:spcAft>
+                  <a:spcPts val="600"/>
+                </a:spcAft>
+                <a:buClr>
+                  <a:schemeClr val="accent1">
+                    <a:lumMod val="75000"/>
+                  </a:schemeClr>
+                </a:buClr>
+                <a:buSzPct val="145000"/>
+                <a:buFont typeface="Arial"/>
+                <a:buChar char="•"/>
+                <a:defRPr sz="1800" kern="1200" cap="none">
+                  <a:solidFill>
+                    <a:schemeClr val="tx1"/>
+                  </a:solidFill>
+                  <a:effectLst/>
+                  <a:latin typeface="+mn-lt"/>
+                  <a:ea typeface="+mn-ea"/>
+                  <a:cs typeface="+mn-cs"/>
+                </a:defRPr>
+              </a:lvl3pPr>
+              <a:lvl4pPr marL="1543050" indent="-171450" algn="l" defTabSz="457200" rtl="0" eaLnBrk="1" latinLnBrk="0" hangingPunct="1">
+                <a:spcBef>
+                  <a:spcPct val="20000"/>
+                </a:spcBef>
+                <a:spcAft>
+                  <a:spcPts val="600"/>
+                </a:spcAft>
+                <a:buClr>
+                  <a:schemeClr val="accent1">
+                    <a:lumMod val="75000"/>
+                  </a:schemeClr>
+                </a:buClr>
+                <a:buSzPct val="145000"/>
+                <a:buFont typeface="Arial"/>
+                <a:buChar char="•"/>
+                <a:defRPr sz="1600" kern="1200" cap="none">
+                  <a:solidFill>
+                    <a:schemeClr val="tx1"/>
+                  </a:solidFill>
+                  <a:effectLst/>
+                  <a:latin typeface="+mn-lt"/>
+                  <a:ea typeface="+mn-ea"/>
+                  <a:cs typeface="+mn-cs"/>
+                </a:defRPr>
+              </a:lvl4pPr>
+              <a:lvl5pPr marL="2000250" indent="-171450" algn="l" defTabSz="457200" rtl="0" eaLnBrk="1" latinLnBrk="0" hangingPunct="1">
+                <a:spcBef>
+                  <a:spcPct val="20000"/>
+                </a:spcBef>
+                <a:spcAft>
+                  <a:spcPts val="600"/>
+                </a:spcAft>
+                <a:buClr>
+                  <a:schemeClr val="accent1">
+                    <a:lumMod val="75000"/>
+                  </a:schemeClr>
+                </a:buClr>
+                <a:buSzPct val="145000"/>
+                <a:buFont typeface="Arial"/>
+                <a:buChar char="•"/>
+                <a:defRPr sz="1400" kern="1200" cap="none">
+                  <a:solidFill>
+                    <a:schemeClr val="tx1"/>
+                  </a:solidFill>
+                  <a:effectLst/>
+                  <a:latin typeface="+mn-lt"/>
+                  <a:ea typeface="+mn-ea"/>
+                  <a:cs typeface="+mn-cs"/>
+                </a:defRPr>
+              </a:lvl5pPr>
+              <a:lvl6pPr marL="2514600" indent="-228600" algn="l" defTabSz="457200" rtl="0" eaLnBrk="1" latinLnBrk="0" hangingPunct="1">
+                <a:spcBef>
+                  <a:spcPct val="20000"/>
+                </a:spcBef>
+                <a:spcAft>
+                  <a:spcPts val="600"/>
+                </a:spcAft>
+                <a:buClr>
+                  <a:schemeClr val="accent1">
+                    <a:lumMod val="75000"/>
+                  </a:schemeClr>
+                </a:buClr>
+                <a:buSzPct val="145000"/>
+                <a:buFont typeface="Arial"/>
+                <a:buChar char="•"/>
+                <a:defRPr sz="1400" kern="1200" cap="none">
+                  <a:solidFill>
+                    <a:schemeClr val="tx1"/>
+                  </a:solidFill>
+                  <a:effectLst/>
+                  <a:latin typeface="+mn-lt"/>
+                  <a:ea typeface="+mn-ea"/>
+                  <a:cs typeface="+mn-cs"/>
+                </a:defRPr>
+              </a:lvl6pPr>
+              <a:lvl7pPr marL="2971800" indent="-228600" algn="l" defTabSz="457200" rtl="0" eaLnBrk="1" latinLnBrk="0" hangingPunct="1">
+                <a:spcBef>
+                  <a:spcPct val="20000"/>
+                </a:spcBef>
+                <a:spcAft>
+                  <a:spcPts val="600"/>
+                </a:spcAft>
+                <a:buClr>
+                  <a:schemeClr val="accent1">
+                    <a:lumMod val="75000"/>
+                  </a:schemeClr>
+                </a:buClr>
+                <a:buSzPct val="145000"/>
+                <a:buFont typeface="Arial"/>
+                <a:buChar char="•"/>
+                <a:defRPr sz="1400" kern="1200" cap="none">
+                  <a:solidFill>
+                    <a:schemeClr val="tx1"/>
+                  </a:solidFill>
+                  <a:effectLst/>
+                  <a:latin typeface="+mn-lt"/>
+                  <a:ea typeface="+mn-ea"/>
+                  <a:cs typeface="+mn-cs"/>
+                </a:defRPr>
+              </a:lvl7pPr>
+              <a:lvl8pPr marL="3429000" indent="-228600" algn="l" defTabSz="457200" rtl="0" eaLnBrk="1" latinLnBrk="0" hangingPunct="1">
+                <a:spcBef>
+                  <a:spcPct val="20000"/>
+                </a:spcBef>
+                <a:spcAft>
+                  <a:spcPts val="600"/>
+                </a:spcAft>
+                <a:buClr>
+                  <a:schemeClr val="accent1">
+                    <a:lumMod val="75000"/>
+                  </a:schemeClr>
+                </a:buClr>
+                <a:buSzPct val="145000"/>
+                <a:buFont typeface="Arial"/>
+                <a:buChar char="•"/>
+                <a:defRPr sz="1400" kern="1200" cap="none">
+                  <a:solidFill>
+                    <a:schemeClr val="tx1"/>
+                  </a:solidFill>
+                  <a:effectLst/>
+                  <a:latin typeface="+mn-lt"/>
+                  <a:ea typeface="+mn-ea"/>
+                  <a:cs typeface="+mn-cs"/>
+                </a:defRPr>
+              </a:lvl8pPr>
+              <a:lvl9pPr marL="3886200" indent="-228600" algn="l" defTabSz="457200" rtl="0" eaLnBrk="1" latinLnBrk="0" hangingPunct="1">
+                <a:spcBef>
+                  <a:spcPct val="20000"/>
+                </a:spcBef>
+                <a:spcAft>
+                  <a:spcPts val="600"/>
+                </a:spcAft>
+                <a:buClr>
+                  <a:schemeClr val="accent1">
+                    <a:lumMod val="75000"/>
+                  </a:schemeClr>
+                </a:buClr>
+                <a:buSzPct val="145000"/>
+                <a:buFont typeface="Arial"/>
+                <a:buChar char="•"/>
+                <a:defRPr sz="1400" kern="1200" cap="none">
+                  <a:solidFill>
+                    <a:schemeClr val="tx1"/>
+                  </a:solidFill>
+                  <a:effectLst/>
+                  <a:latin typeface="+mn-lt"/>
+                  <a:ea typeface="+mn-ea"/>
+                  <a:cs typeface="+mn-cs"/>
+                </a:defRPr>
+              </a:lvl9pPr>
+            </a:lstStyle>
+            <a:p>
+              <a:pPr marL="0" indent="0" algn="ctr">
+                <a:buFont typeface="Arial"/>
+                <a:buNone/>
+              </a:pPr>
+              <a:r>
+                <a:rPr lang="en-GB" sz="1400" dirty="0"/>
+                <a:t>Generate Popup</a:t>
+              </a:r>
+              <a:endParaRPr lang="de-DE" sz="1400" dirty="0"/>
+            </a:p>
+          </p:txBody>
+        </p:sp>
+        <p:pic>
+          <p:nvPicPr>
+            <p:cNvPr id="86" name="Picture 4" descr="https://cdn0.iconfinder.com/data/icons/HTML5/512/HTML_Logo.png"/>
+            <p:cNvPicPr>
+              <a:picLocks noChangeAspect="1" noChangeArrowheads="1"/>
+            </p:cNvPicPr>
+            <p:nvPr/>
+          </p:nvPicPr>
+          <p:blipFill>
+            <a:blip r:embed="rId8" cstate="print">
+              <a:extLst>
+                <a:ext uri="{28A0092B-C50C-407E-A947-70E740481C1C}">
+                  <a14:useLocalDpi xmlns:a14="http://schemas.microsoft.com/office/drawing/2010/main" val="0"/>
+                </a:ext>
+              </a:extLst>
+            </a:blip>
+            <a:srcRect/>
+            <a:stretch>
+              <a:fillRect/>
+            </a:stretch>
+          </p:blipFill>
+          <p:spPr bwMode="auto">
+            <a:xfrm>
+              <a:off x="3929051" y="2686347"/>
+              <a:ext cx="495120" cy="495120"/>
+            </a:xfrm>
+            <a:prstGeom prst="rect">
+              <a:avLst/>
+            </a:prstGeom>
+            <a:noFill/>
+            <a:extLst>
+              <a:ext uri="{909E8E84-426E-40DD-AFC4-6F175D3DCCD1}">
+                <a14:hiddenFill xmlns:a14="http://schemas.microsoft.com/office/drawing/2010/main">
+                  <a:solidFill>
+                    <a:srgbClr val="FFFFFF"/>
+                  </a:solidFill>
+                </a14:hiddenFill>
+              </a:ext>
+            </a:extLst>
+          </p:spPr>
+        </p:pic>
+      </p:grpSp>
+      <p:cxnSp>
+        <p:nvCxnSpPr>
+          <p:cNvPr id="87" name="Straight Arrow Connector 86"/>
+          <p:cNvCxnSpPr/>
+          <p:nvPr/>
+        </p:nvCxnSpPr>
+        <p:spPr>
+          <a:xfrm flipH="1">
+            <a:off x="2468510" y="5647747"/>
+            <a:ext cx="3439159" cy="26380"/>
+          </a:xfrm>
+          <a:prstGeom prst="straightConnector1">
+            <a:avLst/>
+          </a:prstGeom>
+          <a:ln w="38100">
+            <a:solidFill>
+              <a:schemeClr val="accent1">
+                <a:lumMod val="50000"/>
+              </a:schemeClr>
+            </a:solidFill>
+            <a:tailEnd type="triangle"/>
+          </a:ln>
+        </p:spPr>
+        <p:style>
+          <a:lnRef idx="1">
+            <a:schemeClr val="accent1"/>
+          </a:lnRef>
+          <a:fillRef idx="0">
+            <a:schemeClr val="accent1"/>
+          </a:fillRef>
+          <a:effectRef idx="0">
+            <a:schemeClr val="accent1"/>
+          </a:effectRef>
+          <a:fontRef idx="minor">
+            <a:schemeClr val="tx1"/>
+          </a:fontRef>
+        </p:style>
+      </p:cxnSp>
+      <p:cxnSp>
+        <p:nvCxnSpPr>
+          <p:cNvPr id="91" name="Straight Arrow Connector 90"/>
+          <p:cNvCxnSpPr/>
+          <p:nvPr/>
+        </p:nvCxnSpPr>
+        <p:spPr>
+          <a:xfrm flipH="1" flipV="1">
+            <a:off x="7524141" y="5467706"/>
+            <a:ext cx="1924012" cy="1"/>
+          </a:xfrm>
+          <a:prstGeom prst="straightConnector1">
+            <a:avLst/>
+          </a:prstGeom>
+          <a:ln w="38100">
+            <a:solidFill>
+              <a:schemeClr val="accent1">
+                <a:lumMod val="50000"/>
+              </a:schemeClr>
+            </a:solidFill>
+            <a:tailEnd type="triangle"/>
+          </a:ln>
+        </p:spPr>
+        <p:style>
+          <a:lnRef idx="1">
+            <a:schemeClr val="accent1"/>
+          </a:lnRef>
+          <a:fillRef idx="0">
+            <a:schemeClr val="accent1"/>
+          </a:fillRef>
+          <a:effectRef idx="0">
+            <a:schemeClr val="accent1"/>
+          </a:effectRef>
+          <a:fontRef idx="minor">
+            <a:schemeClr val="tx1"/>
+          </a:fontRef>
+        </p:style>
+      </p:cxnSp>
+      <p:grpSp>
+        <p:nvGrpSpPr>
+          <p:cNvPr id="97" name="Group 96"/>
+          <p:cNvGrpSpPr/>
+          <p:nvPr/>
+        </p:nvGrpSpPr>
+        <p:grpSpPr>
+          <a:xfrm>
+            <a:off x="5900049" y="3190992"/>
+            <a:ext cx="1558157" cy="969753"/>
+            <a:chOff x="2946928" y="1582478"/>
+            <a:chExt cx="1558157" cy="969753"/>
+          </a:xfrm>
+        </p:grpSpPr>
+        <p:sp>
+          <p:nvSpPr>
+            <p:cNvPr id="98" name="Content Placeholder 5"/>
+            <p:cNvSpPr txBox="1">
+              <a:spLocks/>
+            </p:cNvSpPr>
+            <p:nvPr/>
+          </p:nvSpPr>
+          <p:spPr>
+            <a:xfrm>
+              <a:off x="2946928" y="2268226"/>
+              <a:ext cx="1558157" cy="284005"/>
+            </a:xfrm>
+            <a:prstGeom prst="rect">
+              <a:avLst/>
+            </a:prstGeom>
+          </p:spPr>
+          <p:txBody>
+            <a:bodyPr anchor="t">
+              <a:noAutofit/>
+            </a:bodyPr>
+            <a:lstStyle>
+              <a:lvl1pPr marL="285750" indent="-285750" algn="l" defTabSz="457200" rtl="0" eaLnBrk="1" latinLnBrk="0" hangingPunct="1">
+                <a:spcBef>
+                  <a:spcPct val="20000"/>
+                </a:spcBef>
+                <a:spcAft>
+                  <a:spcPts val="600"/>
+                </a:spcAft>
+                <a:buClr>
+                  <a:schemeClr val="accent1">
+                    <a:lumMod val="75000"/>
+                  </a:schemeClr>
+                </a:buClr>
+                <a:buSzPct val="145000"/>
+                <a:buFont typeface="Arial"/>
+                <a:buChar char="•"/>
+                <a:defRPr sz="2400" kern="1200" cap="none">
+                  <a:solidFill>
+                    <a:schemeClr val="tx1"/>
+                  </a:solidFill>
+                  <a:effectLst/>
+                  <a:latin typeface="+mn-lt"/>
+                  <a:ea typeface="+mn-ea"/>
+                  <a:cs typeface="+mn-cs"/>
+                </a:defRPr>
+              </a:lvl1pPr>
+              <a:lvl2pPr marL="742950" indent="-285750" algn="l" defTabSz="457200" rtl="0" eaLnBrk="1" latinLnBrk="0" hangingPunct="1">
+                <a:spcBef>
+                  <a:spcPct val="20000"/>
+                </a:spcBef>
+                <a:spcAft>
+                  <a:spcPts val="600"/>
+                </a:spcAft>
+                <a:buClr>
+                  <a:schemeClr val="accent1">
+                    <a:lumMod val="75000"/>
+                  </a:schemeClr>
+                </a:buClr>
+                <a:buSzPct val="145000"/>
+                <a:buFont typeface="Arial"/>
+                <a:buChar char="•"/>
+                <a:defRPr sz="2000" kern="1200" cap="none">
+                  <a:solidFill>
+                    <a:schemeClr val="tx1"/>
+                  </a:solidFill>
+                  <a:effectLst/>
+                  <a:latin typeface="+mn-lt"/>
+                  <a:ea typeface="+mn-ea"/>
+                  <a:cs typeface="+mn-cs"/>
+                </a:defRPr>
+              </a:lvl2pPr>
+              <a:lvl3pPr marL="1200150" indent="-285750" algn="l" defTabSz="457200" rtl="0" eaLnBrk="1" latinLnBrk="0" hangingPunct="1">
+                <a:spcBef>
+                  <a:spcPct val="20000"/>
+                </a:spcBef>
+                <a:spcAft>
+                  <a:spcPts val="600"/>
+                </a:spcAft>
+                <a:buClr>
+                  <a:schemeClr val="accent1">
+                    <a:lumMod val="75000"/>
+                  </a:schemeClr>
+                </a:buClr>
+                <a:buSzPct val="145000"/>
+                <a:buFont typeface="Arial"/>
+                <a:buChar char="•"/>
+                <a:defRPr sz="1800" kern="1200" cap="none">
+                  <a:solidFill>
+                    <a:schemeClr val="tx1"/>
+                  </a:solidFill>
+                  <a:effectLst/>
+                  <a:latin typeface="+mn-lt"/>
+                  <a:ea typeface="+mn-ea"/>
+                  <a:cs typeface="+mn-cs"/>
+                </a:defRPr>
+              </a:lvl3pPr>
+              <a:lvl4pPr marL="1543050" indent="-171450" algn="l" defTabSz="457200" rtl="0" eaLnBrk="1" latinLnBrk="0" hangingPunct="1">
+                <a:spcBef>
+                  <a:spcPct val="20000"/>
+                </a:spcBef>
+                <a:spcAft>
+                  <a:spcPts val="600"/>
+                </a:spcAft>
+                <a:buClr>
+                  <a:schemeClr val="accent1">
+                    <a:lumMod val="75000"/>
+                  </a:schemeClr>
+                </a:buClr>
+                <a:buSzPct val="145000"/>
+                <a:buFont typeface="Arial"/>
+                <a:buChar char="•"/>
+                <a:defRPr sz="1600" kern="1200" cap="none">
+                  <a:solidFill>
+                    <a:schemeClr val="tx1"/>
+                  </a:solidFill>
+                  <a:effectLst/>
+                  <a:latin typeface="+mn-lt"/>
+                  <a:ea typeface="+mn-ea"/>
+                  <a:cs typeface="+mn-cs"/>
+                </a:defRPr>
+              </a:lvl4pPr>
+              <a:lvl5pPr marL="2000250" indent="-171450" algn="l" defTabSz="457200" rtl="0" eaLnBrk="1" latinLnBrk="0" hangingPunct="1">
+                <a:spcBef>
+                  <a:spcPct val="20000"/>
+                </a:spcBef>
+                <a:spcAft>
+                  <a:spcPts val="600"/>
+                </a:spcAft>
+                <a:buClr>
+                  <a:schemeClr val="accent1">
+                    <a:lumMod val="75000"/>
+                  </a:schemeClr>
+                </a:buClr>
+                <a:buSzPct val="145000"/>
+                <a:buFont typeface="Arial"/>
+                <a:buChar char="•"/>
+                <a:defRPr sz="1400" kern="1200" cap="none">
+                  <a:solidFill>
+                    <a:schemeClr val="tx1"/>
+                  </a:solidFill>
+                  <a:effectLst/>
+                  <a:latin typeface="+mn-lt"/>
+                  <a:ea typeface="+mn-ea"/>
+                  <a:cs typeface="+mn-cs"/>
+                </a:defRPr>
+              </a:lvl5pPr>
+              <a:lvl6pPr marL="2514600" indent="-228600" algn="l" defTabSz="457200" rtl="0" eaLnBrk="1" latinLnBrk="0" hangingPunct="1">
+                <a:spcBef>
+                  <a:spcPct val="20000"/>
+                </a:spcBef>
+                <a:spcAft>
+                  <a:spcPts val="600"/>
+                </a:spcAft>
+                <a:buClr>
+                  <a:schemeClr val="accent1">
+                    <a:lumMod val="75000"/>
+                  </a:schemeClr>
+                </a:buClr>
+                <a:buSzPct val="145000"/>
+                <a:buFont typeface="Arial"/>
+                <a:buChar char="•"/>
+                <a:defRPr sz="1400" kern="1200" cap="none">
+                  <a:solidFill>
+                    <a:schemeClr val="tx1"/>
+                  </a:solidFill>
+                  <a:effectLst/>
+                  <a:latin typeface="+mn-lt"/>
+                  <a:ea typeface="+mn-ea"/>
+                  <a:cs typeface="+mn-cs"/>
+                </a:defRPr>
+              </a:lvl6pPr>
+              <a:lvl7pPr marL="2971800" indent="-228600" algn="l" defTabSz="457200" rtl="0" eaLnBrk="1" latinLnBrk="0" hangingPunct="1">
+                <a:spcBef>
+                  <a:spcPct val="20000"/>
+                </a:spcBef>
+                <a:spcAft>
+                  <a:spcPts val="600"/>
+                </a:spcAft>
+                <a:buClr>
+                  <a:schemeClr val="accent1">
+                    <a:lumMod val="75000"/>
+                  </a:schemeClr>
+                </a:buClr>
+                <a:buSzPct val="145000"/>
+                <a:buFont typeface="Arial"/>
+                <a:buChar char="•"/>
+                <a:defRPr sz="1400" kern="1200" cap="none">
+                  <a:solidFill>
+                    <a:schemeClr val="tx1"/>
+                  </a:solidFill>
+                  <a:effectLst/>
+                  <a:latin typeface="+mn-lt"/>
+                  <a:ea typeface="+mn-ea"/>
+                  <a:cs typeface="+mn-cs"/>
+                </a:defRPr>
+              </a:lvl7pPr>
+              <a:lvl8pPr marL="3429000" indent="-228600" algn="l" defTabSz="457200" rtl="0" eaLnBrk="1" latinLnBrk="0" hangingPunct="1">
+                <a:spcBef>
+                  <a:spcPct val="20000"/>
+                </a:spcBef>
+                <a:spcAft>
+                  <a:spcPts val="600"/>
+                </a:spcAft>
+                <a:buClr>
+                  <a:schemeClr val="accent1">
+                    <a:lumMod val="75000"/>
+                  </a:schemeClr>
+                </a:buClr>
+                <a:buSzPct val="145000"/>
+                <a:buFont typeface="Arial"/>
+                <a:buChar char="•"/>
+                <a:defRPr sz="1400" kern="1200" cap="none">
+                  <a:solidFill>
+                    <a:schemeClr val="tx1"/>
+                  </a:solidFill>
+                  <a:effectLst/>
+                  <a:latin typeface="+mn-lt"/>
+                  <a:ea typeface="+mn-ea"/>
+                  <a:cs typeface="+mn-cs"/>
+                </a:defRPr>
+              </a:lvl8pPr>
+              <a:lvl9pPr marL="3886200" indent="-228600" algn="l" defTabSz="457200" rtl="0" eaLnBrk="1" latinLnBrk="0" hangingPunct="1">
+                <a:spcBef>
+                  <a:spcPct val="20000"/>
+                </a:spcBef>
+                <a:spcAft>
+                  <a:spcPts val="600"/>
+                </a:spcAft>
+                <a:buClr>
+                  <a:schemeClr val="accent1">
+                    <a:lumMod val="75000"/>
+                  </a:schemeClr>
+                </a:buClr>
+                <a:buSzPct val="145000"/>
+                <a:buFont typeface="Arial"/>
+                <a:buChar char="•"/>
+                <a:defRPr sz="1400" kern="1200" cap="none">
+                  <a:solidFill>
+                    <a:schemeClr val="tx1"/>
+                  </a:solidFill>
+                  <a:effectLst/>
+                  <a:latin typeface="+mn-lt"/>
+                  <a:ea typeface="+mn-ea"/>
+                  <a:cs typeface="+mn-cs"/>
+                </a:defRPr>
+              </a:lvl9pPr>
+            </a:lstStyle>
+            <a:p>
+              <a:pPr marL="0" indent="0" algn="ctr">
+                <a:buFont typeface="Arial"/>
+                <a:buNone/>
+              </a:pPr>
+              <a:r>
+                <a:rPr lang="en-GB" sz="1400" dirty="0"/>
+                <a:t>JavaScript</a:t>
+              </a:r>
+              <a:endParaRPr lang="de-DE" sz="1200" dirty="0"/>
+            </a:p>
+          </p:txBody>
+        </p:sp>
+        <p:pic>
+          <p:nvPicPr>
+            <p:cNvPr id="99" name="Picture 6" descr="http://dev.bowdenweb.com/a/i/js/icons/javascript-icon-512-04.png"/>
+            <p:cNvPicPr>
+              <a:picLocks noChangeAspect="1" noChangeArrowheads="1"/>
+            </p:cNvPicPr>
+            <p:nvPr/>
+          </p:nvPicPr>
+          <p:blipFill>
+            <a:blip r:embed="rId10" cstate="print">
+              <a:extLst>
+                <a:ext uri="{28A0092B-C50C-407E-A947-70E740481C1C}">
+                  <a14:useLocalDpi xmlns:a14="http://schemas.microsoft.com/office/drawing/2010/main" val="0"/>
+                </a:ext>
+              </a:extLst>
+            </a:blip>
+            <a:srcRect/>
+            <a:stretch>
+              <a:fillRect/>
+            </a:stretch>
+          </p:blipFill>
+          <p:spPr bwMode="auto">
+            <a:xfrm>
+              <a:off x="3358133" y="1582478"/>
+              <a:ext cx="676223" cy="676223"/>
+            </a:xfrm>
+            <a:prstGeom prst="rect">
+              <a:avLst/>
+            </a:prstGeom>
+            <a:noFill/>
+            <a:extLst>
+              <a:ext uri="{909E8E84-426E-40DD-AFC4-6F175D3DCCD1}">
+                <a14:hiddenFill xmlns:a14="http://schemas.microsoft.com/office/drawing/2010/main">
+                  <a:solidFill>
+                    <a:srgbClr val="FFFFFF"/>
+                  </a:solidFill>
+                </a14:hiddenFill>
+              </a:ext>
+            </a:extLst>
+          </p:spPr>
+        </p:pic>
+      </p:grpSp>
+      <p:grpSp>
+        <p:nvGrpSpPr>
+          <p:cNvPr id="93" name="Group 92"/>
+          <p:cNvGrpSpPr/>
+          <p:nvPr/>
+        </p:nvGrpSpPr>
+        <p:grpSpPr>
+          <a:xfrm>
+            <a:off x="5889455" y="4407517"/>
+            <a:ext cx="1558157" cy="1181045"/>
+            <a:chOff x="5889455" y="4864717"/>
+            <a:chExt cx="1558157" cy="1181045"/>
+          </a:xfrm>
+        </p:grpSpPr>
+        <p:pic>
+          <p:nvPicPr>
+            <p:cNvPr id="1032" name="Picture 8" descr="Free Icons: Css Icon | Web"/>
+            <p:cNvPicPr>
+              <a:picLocks noChangeAspect="1" noChangeArrowheads="1"/>
+            </p:cNvPicPr>
+            <p:nvPr/>
+          </p:nvPicPr>
+          <p:blipFill>
+            <a:blip r:embed="rId11" cstate="print">
+              <a:extLst>
+                <a:ext uri="{28A0092B-C50C-407E-A947-70E740481C1C}">
+                  <a14:useLocalDpi xmlns:a14="http://schemas.microsoft.com/office/drawing/2010/main" val="0"/>
+                </a:ext>
+              </a:extLst>
+            </a:blip>
+            <a:srcRect/>
+            <a:stretch>
+              <a:fillRect/>
+            </a:stretch>
+          </p:blipFill>
+          <p:spPr bwMode="auto">
+            <a:xfrm>
+              <a:off x="6201139" y="4864717"/>
+              <a:ext cx="955974" cy="955974"/>
+            </a:xfrm>
+            <a:prstGeom prst="rect">
+              <a:avLst/>
+            </a:prstGeom>
+            <a:noFill/>
+            <a:extLst>
+              <a:ext uri="{909E8E84-426E-40DD-AFC4-6F175D3DCCD1}">
+                <a14:hiddenFill xmlns:a14="http://schemas.microsoft.com/office/drawing/2010/main">
+                  <a:solidFill>
+                    <a:srgbClr val="FFFFFF"/>
+                  </a:solidFill>
+                </a14:hiddenFill>
+              </a:ext>
+            </a:extLst>
+          </p:spPr>
+        </p:pic>
+        <p:sp>
+          <p:nvSpPr>
+            <p:cNvPr id="101" name="Content Placeholder 5"/>
+            <p:cNvSpPr txBox="1">
+              <a:spLocks/>
+            </p:cNvSpPr>
+            <p:nvPr/>
+          </p:nvSpPr>
+          <p:spPr>
+            <a:xfrm>
+              <a:off x="5889455" y="5761757"/>
+              <a:ext cx="1558157" cy="284005"/>
+            </a:xfrm>
+            <a:prstGeom prst="rect">
+              <a:avLst/>
+            </a:prstGeom>
+          </p:spPr>
+          <p:txBody>
+            <a:bodyPr anchor="t">
+              <a:noAutofit/>
+            </a:bodyPr>
+            <a:lstStyle>
+              <a:lvl1pPr marL="285750" indent="-285750" algn="l" defTabSz="457200" rtl="0" eaLnBrk="1" latinLnBrk="0" hangingPunct="1">
+                <a:spcBef>
+                  <a:spcPct val="20000"/>
+                </a:spcBef>
+                <a:spcAft>
+                  <a:spcPts val="600"/>
+                </a:spcAft>
+                <a:buClr>
+                  <a:schemeClr val="accent1">
+                    <a:lumMod val="75000"/>
+                  </a:schemeClr>
+                </a:buClr>
+                <a:buSzPct val="145000"/>
+                <a:buFont typeface="Arial"/>
+                <a:buChar char="•"/>
+                <a:defRPr sz="2400" kern="1200" cap="none">
+                  <a:solidFill>
+                    <a:schemeClr val="tx1"/>
+                  </a:solidFill>
+                  <a:effectLst/>
+                  <a:latin typeface="+mn-lt"/>
+                  <a:ea typeface="+mn-ea"/>
+                  <a:cs typeface="+mn-cs"/>
+                </a:defRPr>
+              </a:lvl1pPr>
+              <a:lvl2pPr marL="742950" indent="-285750" algn="l" defTabSz="457200" rtl="0" eaLnBrk="1" latinLnBrk="0" hangingPunct="1">
+                <a:spcBef>
+                  <a:spcPct val="20000"/>
+                </a:spcBef>
+                <a:spcAft>
+                  <a:spcPts val="600"/>
+                </a:spcAft>
+                <a:buClr>
+                  <a:schemeClr val="accent1">
+                    <a:lumMod val="75000"/>
+                  </a:schemeClr>
+                </a:buClr>
+                <a:buSzPct val="145000"/>
+                <a:buFont typeface="Arial"/>
+                <a:buChar char="•"/>
+                <a:defRPr sz="2000" kern="1200" cap="none">
+                  <a:solidFill>
+                    <a:schemeClr val="tx1"/>
+                  </a:solidFill>
+                  <a:effectLst/>
+                  <a:latin typeface="+mn-lt"/>
+                  <a:ea typeface="+mn-ea"/>
+                  <a:cs typeface="+mn-cs"/>
+                </a:defRPr>
+              </a:lvl2pPr>
+              <a:lvl3pPr marL="1200150" indent="-285750" algn="l" defTabSz="457200" rtl="0" eaLnBrk="1" latinLnBrk="0" hangingPunct="1">
+                <a:spcBef>
+                  <a:spcPct val="20000"/>
+                </a:spcBef>
+                <a:spcAft>
+                  <a:spcPts val="600"/>
+                </a:spcAft>
+                <a:buClr>
+                  <a:schemeClr val="accent1">
+                    <a:lumMod val="75000"/>
+                  </a:schemeClr>
+                </a:buClr>
+                <a:buSzPct val="145000"/>
+                <a:buFont typeface="Arial"/>
+                <a:buChar char="•"/>
+                <a:defRPr sz="1800" kern="1200" cap="none">
+                  <a:solidFill>
+                    <a:schemeClr val="tx1"/>
+                  </a:solidFill>
+                  <a:effectLst/>
+                  <a:latin typeface="+mn-lt"/>
+                  <a:ea typeface="+mn-ea"/>
+                  <a:cs typeface="+mn-cs"/>
+                </a:defRPr>
+              </a:lvl3pPr>
+              <a:lvl4pPr marL="1543050" indent="-171450" algn="l" defTabSz="457200" rtl="0" eaLnBrk="1" latinLnBrk="0" hangingPunct="1">
+                <a:spcBef>
+                  <a:spcPct val="20000"/>
+                </a:spcBef>
+                <a:spcAft>
+                  <a:spcPts val="600"/>
+                </a:spcAft>
+                <a:buClr>
+                  <a:schemeClr val="accent1">
+                    <a:lumMod val="75000"/>
+                  </a:schemeClr>
+                </a:buClr>
+                <a:buSzPct val="145000"/>
+                <a:buFont typeface="Arial"/>
+                <a:buChar char="•"/>
+                <a:defRPr sz="1600" kern="1200" cap="none">
+                  <a:solidFill>
+                    <a:schemeClr val="tx1"/>
+                  </a:solidFill>
+                  <a:effectLst/>
+                  <a:latin typeface="+mn-lt"/>
+                  <a:ea typeface="+mn-ea"/>
+                  <a:cs typeface="+mn-cs"/>
+                </a:defRPr>
+              </a:lvl4pPr>
+              <a:lvl5pPr marL="2000250" indent="-171450" algn="l" defTabSz="457200" rtl="0" eaLnBrk="1" latinLnBrk="0" hangingPunct="1">
+                <a:spcBef>
+                  <a:spcPct val="20000"/>
+                </a:spcBef>
+                <a:spcAft>
+                  <a:spcPts val="600"/>
+                </a:spcAft>
+                <a:buClr>
+                  <a:schemeClr val="accent1">
+                    <a:lumMod val="75000"/>
+                  </a:schemeClr>
+                </a:buClr>
+                <a:buSzPct val="145000"/>
+                <a:buFont typeface="Arial"/>
+                <a:buChar char="•"/>
+                <a:defRPr sz="1400" kern="1200" cap="none">
+                  <a:solidFill>
+                    <a:schemeClr val="tx1"/>
+                  </a:solidFill>
+                  <a:effectLst/>
+                  <a:latin typeface="+mn-lt"/>
+                  <a:ea typeface="+mn-ea"/>
+                  <a:cs typeface="+mn-cs"/>
+                </a:defRPr>
+              </a:lvl5pPr>
+              <a:lvl6pPr marL="2514600" indent="-228600" algn="l" defTabSz="457200" rtl="0" eaLnBrk="1" latinLnBrk="0" hangingPunct="1">
+                <a:spcBef>
+                  <a:spcPct val="20000"/>
+                </a:spcBef>
+                <a:spcAft>
+                  <a:spcPts val="600"/>
+                </a:spcAft>
+                <a:buClr>
+                  <a:schemeClr val="accent1">
+                    <a:lumMod val="75000"/>
+                  </a:schemeClr>
+                </a:buClr>
+                <a:buSzPct val="145000"/>
+                <a:buFont typeface="Arial"/>
+                <a:buChar char="•"/>
+                <a:defRPr sz="1400" kern="1200" cap="none">
+                  <a:solidFill>
+                    <a:schemeClr val="tx1"/>
+                  </a:solidFill>
+                  <a:effectLst/>
+                  <a:latin typeface="+mn-lt"/>
+                  <a:ea typeface="+mn-ea"/>
+                  <a:cs typeface="+mn-cs"/>
+                </a:defRPr>
+              </a:lvl6pPr>
+              <a:lvl7pPr marL="2971800" indent="-228600" algn="l" defTabSz="457200" rtl="0" eaLnBrk="1" latinLnBrk="0" hangingPunct="1">
+                <a:spcBef>
+                  <a:spcPct val="20000"/>
+                </a:spcBef>
+                <a:spcAft>
+                  <a:spcPts val="600"/>
+                </a:spcAft>
+                <a:buClr>
+                  <a:schemeClr val="accent1">
+                    <a:lumMod val="75000"/>
+                  </a:schemeClr>
+                </a:buClr>
+                <a:buSzPct val="145000"/>
+                <a:buFont typeface="Arial"/>
+                <a:buChar char="•"/>
+                <a:defRPr sz="1400" kern="1200" cap="none">
+                  <a:solidFill>
+                    <a:schemeClr val="tx1"/>
+                  </a:solidFill>
+                  <a:effectLst/>
+                  <a:latin typeface="+mn-lt"/>
+                  <a:ea typeface="+mn-ea"/>
+                  <a:cs typeface="+mn-cs"/>
+                </a:defRPr>
+              </a:lvl7pPr>
+              <a:lvl8pPr marL="3429000" indent="-228600" algn="l" defTabSz="457200" rtl="0" eaLnBrk="1" latinLnBrk="0" hangingPunct="1">
+                <a:spcBef>
+                  <a:spcPct val="20000"/>
+                </a:spcBef>
+                <a:spcAft>
+                  <a:spcPts val="600"/>
+                </a:spcAft>
+                <a:buClr>
+                  <a:schemeClr val="accent1">
+                    <a:lumMod val="75000"/>
+                  </a:schemeClr>
+                </a:buClr>
+                <a:buSzPct val="145000"/>
+                <a:buFont typeface="Arial"/>
+                <a:buChar char="•"/>
+                <a:defRPr sz="1400" kern="1200" cap="none">
+                  <a:solidFill>
+                    <a:schemeClr val="tx1"/>
+                  </a:solidFill>
+                  <a:effectLst/>
+                  <a:latin typeface="+mn-lt"/>
+                  <a:ea typeface="+mn-ea"/>
+                  <a:cs typeface="+mn-cs"/>
+                </a:defRPr>
+              </a:lvl8pPr>
+              <a:lvl9pPr marL="3886200" indent="-228600" algn="l" defTabSz="457200" rtl="0" eaLnBrk="1" latinLnBrk="0" hangingPunct="1">
+                <a:spcBef>
+                  <a:spcPct val="20000"/>
+                </a:spcBef>
+                <a:spcAft>
+                  <a:spcPts val="600"/>
+                </a:spcAft>
+                <a:buClr>
+                  <a:schemeClr val="accent1">
+                    <a:lumMod val="75000"/>
+                  </a:schemeClr>
+                </a:buClr>
+                <a:buSzPct val="145000"/>
+                <a:buFont typeface="Arial"/>
+                <a:buChar char="•"/>
+                <a:defRPr sz="1400" kern="1200" cap="none">
+                  <a:solidFill>
+                    <a:schemeClr val="tx1"/>
+                  </a:solidFill>
+                  <a:effectLst/>
+                  <a:latin typeface="+mn-lt"/>
+                  <a:ea typeface="+mn-ea"/>
+                  <a:cs typeface="+mn-cs"/>
+                </a:defRPr>
+              </a:lvl9pPr>
+            </a:lstStyle>
+            <a:p>
+              <a:pPr marL="0" indent="0" algn="ctr">
+                <a:buFont typeface="Arial"/>
+                <a:buNone/>
+              </a:pPr>
+              <a:r>
+                <a:rPr lang="en-GB" sz="1400" dirty="0"/>
+                <a:t>CSS stylesheets</a:t>
+              </a:r>
+              <a:endParaRPr lang="de-DE" sz="1400" dirty="0"/>
+            </a:p>
+          </p:txBody>
+        </p:sp>
+      </p:grpSp>
+      <p:grpSp>
+        <p:nvGrpSpPr>
+          <p:cNvPr id="54" name="Gruppieren 53"/>
+          <p:cNvGrpSpPr/>
+          <p:nvPr/>
+        </p:nvGrpSpPr>
+        <p:grpSpPr>
+          <a:xfrm>
+            <a:off x="7546185" y="4351166"/>
+            <a:ext cx="1901968" cy="1129422"/>
+            <a:chOff x="5772151" y="4611673"/>
+            <a:chExt cx="1901968" cy="1129422"/>
+          </a:xfrm>
+        </p:grpSpPr>
+        <p:grpSp>
+          <p:nvGrpSpPr>
+            <p:cNvPr id="55" name="Gruppieren 54"/>
+            <p:cNvGrpSpPr/>
+            <p:nvPr/>
+          </p:nvGrpSpPr>
+          <p:grpSpPr>
+            <a:xfrm>
+              <a:off x="5932289" y="4611673"/>
+              <a:ext cx="1684081" cy="897987"/>
+              <a:chOff x="5932289" y="4834081"/>
+              <a:chExt cx="1684081" cy="897987"/>
+            </a:xfrm>
+          </p:grpSpPr>
+          <p:pic>
+            <p:nvPicPr>
+              <p:cNvPr id="62" name="Grafik 61" descr="Netzwerk"/>
+              <p:cNvPicPr>
+                <a:picLocks noChangeAspect="1"/>
+              </p:cNvPicPr>
+              <p:nvPr/>
+            </p:nvPicPr>
+            <p:blipFill>
+              <a:blip r:embed="rId12" cstate="print">
+                <a:extLst>
+                  <a:ext uri="{28A0092B-C50C-407E-A947-70E740481C1C}">
+                    <a14:useLocalDpi xmlns:a14="http://schemas.microsoft.com/office/drawing/2010/main" val="0"/>
+                  </a:ext>
+                  <a:ext uri="{96DAC541-7B7A-43D3-8B79-37D633B846F1}">
+                    <asvg:svgBlip xmlns:asvg="http://schemas.microsoft.com/office/drawing/2016/SVG/main" r:embed="rId13"/>
+                  </a:ext>
+                </a:extLst>
+              </a:blip>
+              <a:stretch>
+                <a:fillRect/>
+              </a:stretch>
+            </p:blipFill>
+            <p:spPr>
+              <a:xfrm rot="20111766">
+                <a:off x="6274967" y="4985804"/>
+                <a:ext cx="746264" cy="746264"/>
+              </a:xfrm>
+              <a:prstGeom prst="rect">
+                <a:avLst/>
+              </a:prstGeom>
+            </p:spPr>
+          </p:pic>
+          <p:pic>
+            <p:nvPicPr>
+              <p:cNvPr id="63" name="Grafik 62" descr="Benutzer"/>
+              <p:cNvPicPr>
+                <a:picLocks noChangeAspect="1"/>
+              </p:cNvPicPr>
+              <p:nvPr/>
+            </p:nvPicPr>
+            <p:blipFill>
+              <a:blip r:embed="rId14" cstate="print">
+                <a:extLst>
+                  <a:ext uri="{28A0092B-C50C-407E-A947-70E740481C1C}">
+                    <a14:useLocalDpi xmlns:a14="http://schemas.microsoft.com/office/drawing/2010/main" val="0"/>
+                  </a:ext>
+                  <a:ext uri="{96DAC541-7B7A-43D3-8B79-37D633B846F1}">
+                    <asvg:svgBlip xmlns:asvg="http://schemas.microsoft.com/office/drawing/2016/SVG/main" r:embed="rId15"/>
+                  </a:ext>
+                </a:extLst>
+              </a:blip>
+              <a:stretch>
+                <a:fillRect/>
+              </a:stretch>
+            </p:blipFill>
+            <p:spPr>
+              <a:xfrm>
+                <a:off x="6662206" y="4862427"/>
+                <a:ext cx="505454" cy="505454"/>
+              </a:xfrm>
+              <a:prstGeom prst="rect">
+                <a:avLst/>
+              </a:prstGeom>
+            </p:spPr>
+          </p:pic>
+          <p:pic>
+            <p:nvPicPr>
+              <p:cNvPr id="64" name="Picture 4" descr="City hall building Free Icon"/>
+              <p:cNvPicPr>
+                <a:picLocks noChangeAspect="1" noChangeArrowheads="1"/>
+              </p:cNvPicPr>
+              <p:nvPr/>
+            </p:nvPicPr>
+            <p:blipFill>
+              <a:blip r:embed="rId16" cstate="print">
+                <a:extLst>
+                  <a:ext uri="{BEBA8EAE-BF5A-486C-A8C5-ECC9F3942E4B}">
+                    <a14:imgProps xmlns:a14="http://schemas.microsoft.com/office/drawing/2010/main">
+                      <a14:imgLayer r:embed="rId17">
+                        <a14:imgEffect>
+                          <a14:backgroundRemoval t="9425" b="94089" l="0" r="100000">
+                            <a14:foregroundMark x1="5272" y1="63419" x2="5272" y2="63419"/>
+                            <a14:foregroundMark x1="40096" y1="85144" x2="40096" y2="85144"/>
+                            <a14:foregroundMark x1="87700" y1="79233" x2="87700" y2="79233"/>
+                          </a14:backgroundRemoval>
+                        </a14:imgEffect>
+                      </a14:imgLayer>
+                    </a14:imgProps>
+                  </a:ext>
+                  <a:ext uri="{28A0092B-C50C-407E-A947-70E740481C1C}">
+                    <a14:useLocalDpi xmlns:a14="http://schemas.microsoft.com/office/drawing/2010/main" val="0"/>
+                  </a:ext>
+                </a:extLst>
+              </a:blip>
+              <a:srcRect/>
+              <a:stretch>
+                <a:fillRect/>
+              </a:stretch>
+            </p:blipFill>
+            <p:spPr bwMode="auto">
+              <a:xfrm>
+                <a:off x="5932289" y="4987924"/>
+                <a:ext cx="554235" cy="554235"/>
+              </a:xfrm>
+              <a:prstGeom prst="rect">
+                <a:avLst/>
+              </a:prstGeom>
+              <a:noFill/>
+            </p:spPr>
+          </p:pic>
+          <p:pic>
+            <p:nvPicPr>
+              <p:cNvPr id="65" name="Grafik 64"/>
+              <p:cNvPicPr>
+                <a:picLocks noChangeAspect="1"/>
+              </p:cNvPicPr>
+              <p:nvPr/>
+            </p:nvPicPr>
+            <p:blipFill rotWithShape="1">
+              <a:blip r:embed="rId18" cstate="print">
+                <a:extLst>
+                  <a:ext uri="{28A0092B-C50C-407E-A947-70E740481C1C}">
+                    <a14:useLocalDpi xmlns:a14="http://schemas.microsoft.com/office/drawing/2010/main" val="0"/>
+                  </a:ext>
+                </a:extLst>
+              </a:blip>
+              <a:srcRect l="20002" t="30011" r="18445" b="12840"/>
+              <a:stretch/>
+            </p:blipFill>
+            <p:spPr>
+              <a:xfrm>
+                <a:off x="7088465" y="4834081"/>
+                <a:ext cx="527905" cy="490126"/>
+              </a:xfrm>
+              <a:prstGeom prst="rect">
+                <a:avLst/>
+              </a:prstGeom>
+            </p:spPr>
+          </p:pic>
+        </p:grpSp>
+        <p:sp>
+          <p:nvSpPr>
+            <p:cNvPr id="59" name="TextBox 94"/>
+            <p:cNvSpPr txBox="1"/>
+            <p:nvPr/>
+          </p:nvSpPr>
+          <p:spPr>
+            <a:xfrm>
+              <a:off x="5772151" y="5433318"/>
+              <a:ext cx="1901968" cy="307777"/>
+            </a:xfrm>
+            <a:prstGeom prst="rect">
+              <a:avLst/>
+            </a:prstGeom>
+            <a:noFill/>
+          </p:spPr>
+          <p:txBody>
+            <a:bodyPr wrap="square" rtlCol="0">
+              <a:spAutoFit/>
+            </a:bodyPr>
+            <a:lstStyle/>
+            <a:p>
+              <a:pPr algn="ctr"/>
+              <a:r>
+                <a:rPr lang="en-GB" sz="1400" dirty="0"/>
+                <a:t>Context and Properties</a:t>
+              </a:r>
+              <a:endParaRPr lang="de-DE" sz="1400" dirty="0"/>
+            </a:p>
+          </p:txBody>
+        </p:sp>
+      </p:grpSp>
+    </p:spTree>
+    <p:extLst>
+      <p:ext uri="{BB962C8B-B14F-4D97-AF65-F5344CB8AC3E}">
+        <p14:creationId xmlns:p14="http://schemas.microsoft.com/office/powerpoint/2010/main" val="1302027525"/>
+      </p:ext>
+    </p:extLst>
+  </p:cSld>
+  <p:clrMapOvr>
+    <a:masterClrMapping/>
+  </p:clrMapOvr>
+  <p:timing>
+    <p:tnLst>
+      <p:par>
+        <p:cTn id="1" dur="indefinite" restart="never" nodeType="tmRoot">
+          <p:childTnLst>
+            <p:seq concurrent="1" nextAc="seek">
+              <p:cTn id="2" dur="indefinite" nodeType="mainSeq">
+                <p:childTnLst>
+                  <p:par>
+                    <p:cTn id="3" fill="hold">
+                      <p:stCondLst>
+                        <p:cond delay="indefinite"/>
+                        <p:cond evt="onBegin" delay="0">
+                          <p:tn val="2"/>
+                        </p:cond>
+                      </p:stCondLst>
+                      <p:childTnLst>
+                        <p:par>
+                          <p:cTn id="4" fill="hold">
+                            <p:stCondLst>
+                              <p:cond delay="0"/>
+                            </p:stCondLst>
+                            <p:childTnLst>
+                              <p:par>
+                                <p:cTn id="5" presetID="1" presetClass="entr" presetSubtype="0" fill="hold" grpId="0" nodeType="withEffect">
+                                  <p:stCondLst>
+                                    <p:cond delay="0"/>
+                                  </p:stCondLst>
+                                  <p:childTnLst>
+                                    <p:set>
+                                      <p:cBhvr>
+                                        <p:cTn id="6" dur="1" fill="hold">
+                                          <p:stCondLst>
+                                            <p:cond delay="0"/>
+                                          </p:stCondLst>
+                                        </p:cTn>
+                                        <p:tgtEl>
+                                          <p:spTgt spid="13"/>
+                                        </p:tgtEl>
+                                        <p:attrNameLst>
+                                          <p:attrName>style.visibility</p:attrName>
+                                        </p:attrNameLst>
+                                      </p:cBhvr>
+                                      <p:to>
+                                        <p:strVal val="visible"/>
+                                      </p:to>
+                                    </p:set>
+                                  </p:childTnLst>
+                                </p:cTn>
+                              </p:par>
+                              <p:par>
+                                <p:cTn id="7" presetID="1" presetClass="entr" presetSubtype="0" fill="hold" nodeType="withEffect">
+                                  <p:stCondLst>
+                                    <p:cond delay="0"/>
+                                  </p:stCondLst>
+                                  <p:childTnLst>
+                                    <p:set>
+                                      <p:cBhvr>
+                                        <p:cTn id="8" dur="1" fill="hold">
+                                          <p:stCondLst>
+                                            <p:cond delay="0"/>
+                                          </p:stCondLst>
+                                        </p:cTn>
+                                        <p:tgtEl>
+                                          <p:spTgt spid="54"/>
+                                        </p:tgtEl>
+                                        <p:attrNameLst>
+                                          <p:attrName>style.visibility</p:attrName>
+                                        </p:attrNameLst>
+                                      </p:cBhvr>
+                                      <p:to>
+                                        <p:strVal val="visible"/>
+                                      </p:to>
+                                    </p:set>
+                                  </p:childTnLst>
+                                </p:cTn>
+                              </p:par>
+                            </p:childTnLst>
+                          </p:cTn>
+                        </p:par>
+                      </p:childTnLst>
+                    </p:cTn>
+                  </p:par>
+                </p:childTnLst>
+              </p:cTn>
+              <p:prevCondLst>
+                <p:cond evt="onPrev" delay="0">
+                  <p:tgtEl>
+                    <p:sldTgt/>
+                  </p:tgtEl>
+                </p:cond>
+              </p:prevCondLst>
+              <p:nextCondLst>
+                <p:cond evt="onNext" delay="0">
+                  <p:tgtEl>
+                    <p:sldTgt/>
+                  </p:tgtEl>
+                </p:cond>
+              </p:nextCondLst>
+            </p:seq>
+          </p:childTnLst>
+        </p:cTn>
+      </p:par>
+    </p:tnLst>
+    <p:bldLst>
+      <p:bldP spid="13" grpId="0" animBg="1"/>
+    </p:bldLst>
+  </p:timing>
+</p:sld>
+</file>
+
+<file path=ppt/slides/slide8.xml><?xml version="1.0" encoding="utf-8"?>
+<p:sld xmlns:a="http://schemas.openxmlformats.org/drawingml/2006/main" xmlns:r="http://schemas.openxmlformats.org/officeDocument/2006/relationships" xmlns:p="http://schemas.openxmlformats.org/presentationml/2006/main">
+  <p:cSld>
+    <p:spTree>
+      <p:nvGrpSpPr>
+        <p:cNvPr id="1" name=""/>
+        <p:cNvGrpSpPr/>
+        <p:nvPr/>
+      </p:nvGrpSpPr>
+      <p:grpSpPr>
+        <a:xfrm>
+          <a:off x="0" y="0"/>
+          <a:ext cx="0" cy="0"/>
+          <a:chOff x="0" y="0"/>
+          <a:chExt cx="0" cy="0"/>
+        </a:xfrm>
+      </p:grpSpPr>
+      <p:sp>
+        <p:nvSpPr>
           <p:cNvPr id="5" name="Title 4"/>
           <p:cNvSpPr>
             <a:spLocks noGrp="1"/>
@@ -17046,7 +19842,7 @@
             <a:fld id="{2921BF44-F096-42DF-ADC3-B535522D2EE1}" type="slidenum">
               <a:rPr lang="en-GB" smtClean="0"/>
               <a:pPr/>
-              <a:t>7</a:t>
+              <a:t>8</a:t>
             </a:fld>
             <a:endParaRPr lang="en-GB" dirty="0"/>
           </a:p>
@@ -17065,7 +19861,7 @@
 </p:sld>
 </file>
 
-<file path=ppt/slides/slide8.xml><?xml version="1.0" encoding="utf-8"?>
+<file path=ppt/slides/slide9.xml><?xml version="1.0" encoding="utf-8"?>
 <p:sld xmlns:a="http://schemas.openxmlformats.org/drawingml/2006/main" xmlns:r="http://schemas.openxmlformats.org/officeDocument/2006/relationships" xmlns:p="http://schemas.openxmlformats.org/presentationml/2006/main">
   <p:cSld>
     <p:spTree>
@@ -17123,7 +19919,7 @@
             <a:fld id="{2921BF44-F096-42DF-ADC3-B535522D2EE1}" type="slidenum">
               <a:rPr lang="en-GB" smtClean="0"/>
               <a:pPr/>
-              <a:t>8</a:t>
+              <a:t>9</a:t>
             </a:fld>
             <a:endParaRPr lang="en-GB" dirty="0"/>
           </a:p>
@@ -17606,7 +20402,7 @@
                   <a14:useLocalDpi xmlns:a14="http://schemas.microsoft.com/office/drawing/2010/main" val="0"/>
                 </a:ext>
                 <a:ext uri="{96DAC541-7B7A-43D3-8B79-37D633B846F1}">
-                  <asvg:svgBlip xmlns:asvg="http://schemas.microsoft.com/office/drawing/2016/SVG/main" xmlns="" r:embed="rId7"/>
+                  <asvg:svgBlip xmlns:asvg="http://schemas.microsoft.com/office/drawing/2016/SVG/main" r:embed="rId7"/>
                 </a:ext>
               </a:extLst>
             </a:blip>
@@ -17639,7 +20435,7 @@
                   <a14:useLocalDpi xmlns:a14="http://schemas.microsoft.com/office/drawing/2010/main" val="0"/>
                 </a:ext>
                 <a:ext uri="{96DAC541-7B7A-43D3-8B79-37D633B846F1}">
-                  <asvg:svgBlip xmlns:asvg="http://schemas.microsoft.com/office/drawing/2016/SVG/main" xmlns="" r:embed="rId9"/>
+                  <asvg:svgBlip xmlns:asvg="http://schemas.microsoft.com/office/drawing/2016/SVG/main" r:embed="rId9"/>
                 </a:ext>
               </a:extLst>
             </a:blip>
@@ -17928,102 +20724,6 @@
     <p:extLst>
       <p:ext uri="{BB962C8B-B14F-4D97-AF65-F5344CB8AC3E}">
         <p14:creationId xmlns:p14="http://schemas.microsoft.com/office/powerpoint/2010/main" val="2861008330"/>
-      </p:ext>
-    </p:extLst>
-  </p:cSld>
-  <p:clrMapOvr>
-    <a:masterClrMapping/>
-  </p:clrMapOvr>
-</p:sld>
-</file>
-
-<file path=ppt/slides/slide9.xml><?xml version="1.0" encoding="utf-8"?>
-<p:sld xmlns:a="http://schemas.openxmlformats.org/drawingml/2006/main" xmlns:r="http://schemas.openxmlformats.org/officeDocument/2006/relationships" xmlns:p="http://schemas.openxmlformats.org/presentationml/2006/main">
-  <p:cSld>
-    <p:spTree>
-      <p:nvGrpSpPr>
-        <p:cNvPr id="1" name=""/>
-        <p:cNvGrpSpPr/>
-        <p:nvPr/>
-      </p:nvGrpSpPr>
-      <p:grpSpPr>
-        <a:xfrm>
-          <a:off x="0" y="0"/>
-          <a:ext cx="0" cy="0"/>
-          <a:chOff x="0" y="0"/>
-          <a:chExt cx="0" cy="0"/>
-        </a:xfrm>
-      </p:grpSpPr>
-      <p:sp>
-        <p:nvSpPr>
-          <p:cNvPr id="2" name="Title 1"/>
-          <p:cNvSpPr>
-            <a:spLocks noGrp="1"/>
-          </p:cNvSpPr>
-          <p:nvPr>
-            <p:ph type="title"/>
-          </p:nvPr>
-        </p:nvSpPr>
-        <p:spPr/>
-        <p:txBody>
-          <a:bodyPr/>
-          <a:lstStyle/>
-          <a:p>
-            <a:r>
-              <a:rPr lang="en-GB" dirty="0"/>
-              <a:t>Backup</a:t>
-            </a:r>
-            <a:endParaRPr lang="de-DE" dirty="0"/>
-          </a:p>
-        </p:txBody>
-      </p:sp>
-      <p:sp>
-        <p:nvSpPr>
-          <p:cNvPr id="3" name="Content Placeholder 2"/>
-          <p:cNvSpPr>
-            <a:spLocks noGrp="1"/>
-          </p:cNvSpPr>
-          <p:nvPr>
-            <p:ph idx="1"/>
-          </p:nvPr>
-        </p:nvSpPr>
-        <p:spPr/>
-        <p:txBody>
-          <a:bodyPr/>
-          <a:lstStyle/>
-          <a:p>
-            <a:endParaRPr lang="de-DE"/>
-          </a:p>
-        </p:txBody>
-      </p:sp>
-      <p:sp>
-        <p:nvSpPr>
-          <p:cNvPr id="4" name="Slide Number Placeholder 3"/>
-          <p:cNvSpPr>
-            <a:spLocks noGrp="1"/>
-          </p:cNvSpPr>
-          <p:nvPr>
-            <p:ph type="sldNum" sz="quarter" idx="12"/>
-          </p:nvPr>
-        </p:nvSpPr>
-        <p:spPr/>
-        <p:txBody>
-          <a:bodyPr/>
-          <a:lstStyle/>
-          <a:p>
-            <a:fld id="{2921BF44-F096-42DF-ADC3-B535522D2EE1}" type="slidenum">
-              <a:rPr lang="en-GB" smtClean="0"/>
-              <a:pPr/>
-              <a:t>9</a:t>
-            </a:fld>
-            <a:endParaRPr lang="en-GB" dirty="0"/>
-          </a:p>
-        </p:txBody>
-      </p:sp>
-    </p:spTree>
-    <p:extLst>
-      <p:ext uri="{BB962C8B-B14F-4D97-AF65-F5344CB8AC3E}">
-        <p14:creationId xmlns:p14="http://schemas.microsoft.com/office/powerpoint/2010/main" val="333537589"/>
       </p:ext>
     </p:extLst>
   </p:cSld>
@@ -18283,7 +20983,7 @@
   <a:extraClrSchemeLst/>
   <a:extLst>
     <a:ext uri="{05A4C25C-085E-4340-85A3-A5531E510DB2}">
-      <thm15:themeFamily xmlns:thm15="http://schemas.microsoft.com/office/thememl/2012/main" xmlns="" name="Parallax" id="{3388167B-A2EB-4685-9635-1831D9AEF8C4}" vid="{4F7A876A-7598-49CA-AFC8-8EDA2551E4A7}"/>
+      <thm15:themeFamily xmlns:thm15="http://schemas.microsoft.com/office/thememl/2012/main" name="Parallax" id="{3388167B-A2EB-4685-9635-1831D9AEF8C4}" vid="{4F7A876A-7598-49CA-AFC8-8EDA2551E4A7}"/>
     </a:ext>
   </a:extLst>
 </a:theme>
@@ -18544,7 +21244,7 @@
   <a:extraClrSchemeLst/>
   <a:extLst>
     <a:ext uri="{05A4C25C-085E-4340-85A3-A5531E510DB2}">
-      <thm15:themeFamily xmlns:thm15="http://schemas.microsoft.com/office/thememl/2012/main" xmlns="" name="Office Theme" id="{62F939B6-93AF-4DB8-9C6B-D6C7DFDC589F}" vid="{4A3C46E8-61CC-4603-A589-7422A47A8E4A}"/>
+      <thm15:themeFamily xmlns:thm15="http://schemas.microsoft.com/office/thememl/2012/main" name="Office Theme" id="{62F939B6-93AF-4DB8-9C6B-D6C7DFDC589F}" vid="{4A3C46E8-61CC-4603-A589-7422A47A8E4A}"/>
     </a:ext>
   </a:extLst>
 </a:theme>

</xml_diff>

<commit_message>
Removed DATE from NER§
</commit_message>
<xml_diff>
--- a/ProjectPresentation/EntityAnnotation.pptx
+++ b/ProjectPresentation/EntityAnnotation.pptx
@@ -5,7 +5,7 @@
     <p:sldMasterId id="2147483660" r:id="rId1"/>
   </p:sldMasterIdLst>
   <p:notesMasterIdLst>
-    <p:notesMasterId r:id="rId15"/>
+    <p:notesMasterId r:id="rId16"/>
   </p:notesMasterIdLst>
   <p:sldIdLst>
     <p:sldId id="259" r:id="rId2"/>
@@ -16,11 +16,12 @@
     <p:sldId id="294" r:id="rId7"/>
     <p:sldId id="291" r:id="rId8"/>
     <p:sldId id="285" r:id="rId9"/>
-    <p:sldId id="289" r:id="rId10"/>
-    <p:sldId id="258" r:id="rId11"/>
-    <p:sldId id="292" r:id="rId12"/>
-    <p:sldId id="287" r:id="rId13"/>
-    <p:sldId id="288" r:id="rId14"/>
+    <p:sldId id="296" r:id="rId10"/>
+    <p:sldId id="289" r:id="rId11"/>
+    <p:sldId id="258" r:id="rId12"/>
+    <p:sldId id="292" r:id="rId13"/>
+    <p:sldId id="287" r:id="rId14"/>
+    <p:sldId id="288" r:id="rId15"/>
   </p:sldIdLst>
   <p:sldSz cx="12192000" cy="6858000"/>
   <p:notesSz cx="6858000" cy="9144000"/>
@@ -121,7 +122,7 @@
   </p:defaultTextStyle>
   <p:extLst>
     <p:ext uri="{EFAFB233-063F-42B5-8137-9DF3F51BA10A}">
-      <p15:sldGuideLst xmlns:p15="http://schemas.microsoft.com/office/powerpoint/2012/main" xmlns="">
+      <p15:sldGuideLst xmlns:p15="http://schemas.microsoft.com/office/powerpoint/2012/main">
         <p15:guide id="1" orient="horz" pos="2160">
           <p15:clr>
             <a:srgbClr val="A4A3A4"/>
@@ -1478,98 +1479,109 @@
           <a:lstStyle/>
           <a:p>
             <a:r>
-              <a:rPr lang="en-GB" dirty="0"/>
-              <a:t>Demo script:</a:t>
-            </a:r>
-          </a:p>
-          <a:p>
-            <a:r>
-              <a:rPr lang="en-GB" dirty="0"/>
-              <a:t>User</a:t>
-            </a:r>
-            <a:r>
-              <a:rPr lang="en-GB" baseline="0" dirty="0"/>
-              <a:t> visits his favourite website (Spiegel, </a:t>
-            </a:r>
-            <a:r>
-              <a:rPr lang="en-GB" baseline="0" dirty="0" err="1"/>
-              <a:t>bbc</a:t>
-            </a:r>
-            <a:r>
-              <a:rPr lang="en-GB" baseline="0" dirty="0"/>
-              <a:t>, CNN)</a:t>
-            </a:r>
-          </a:p>
-          <a:p>
-            <a:r>
-              <a:rPr lang="en-GB" baseline="0" dirty="0"/>
-              <a:t>Reads an article about foreign politics: Trump is filling </a:t>
-            </a:r>
-            <a:r>
-              <a:rPr lang="en-GB" baseline="0"/>
-              <a:t>his cabinet (example: http://www.bbc.com/news/world-us-canada-38168382) </a:t>
-            </a:r>
-            <a:endParaRPr lang="en-GB" baseline="0" dirty="0"/>
-          </a:p>
-          <a:p>
-            <a:r>
-              <a:rPr lang="en-GB" baseline="0" dirty="0"/>
-              <a:t>Now Trump obviously he knows, but who is this other person that is mentioned here? </a:t>
-            </a:r>
-          </a:p>
-          <a:p>
-            <a:pPr marL="171450" indent="-171450">
-              <a:buFont typeface="Wingdings" pitchFamily="2" charset="2"/>
-              <a:buChar char="è"/>
-            </a:pPr>
-            <a:r>
-              <a:rPr lang="en-GB" baseline="0" dirty="0">
-                <a:sym typeface="Wingdings" panose="05000000000000000000" pitchFamily="2" charset="2"/>
-              </a:rPr>
-              <a:t>Select the text and click the button!</a:t>
-            </a:r>
-          </a:p>
-          <a:p>
-            <a:pPr marL="0" indent="0">
-              <a:buFont typeface="Wingdings" pitchFamily="2" charset="2"/>
-              <a:buNone/>
-            </a:pPr>
-            <a:r>
-              <a:rPr lang="en-GB" baseline="0" dirty="0">
-                <a:sym typeface="Wingdings" panose="05000000000000000000" pitchFamily="2" charset="2"/>
-              </a:rPr>
-              <a:t>View information about the named entities that were found:</a:t>
-            </a:r>
-          </a:p>
-          <a:p>
-            <a:pPr marL="171450" indent="-171450">
-              <a:buFont typeface="Wingdings" pitchFamily="2" charset="2"/>
-              <a:buChar char="è"/>
-            </a:pPr>
-            <a:r>
-              <a:rPr lang="en-GB" baseline="0" dirty="0">
-                <a:sym typeface="Wingdings" panose="05000000000000000000" pitchFamily="2" charset="2"/>
-              </a:rPr>
-              <a:t>Information about Trump (there seems to be a lot) and the other person</a:t>
-            </a:r>
-          </a:p>
-          <a:p>
-            <a:pPr marL="171450" indent="-171450">
-              <a:buFont typeface="Wingdings" pitchFamily="2" charset="2"/>
-              <a:buChar char="è"/>
-            </a:pPr>
-            <a:r>
-              <a:rPr lang="en-GB" baseline="0" dirty="0">
-                <a:sym typeface="Wingdings" panose="05000000000000000000" pitchFamily="2" charset="2"/>
-              </a:rPr>
-              <a:t>Now this is useful, but what connects Trump to this person? View visualization</a:t>
-            </a:r>
-          </a:p>
-          <a:p>
-            <a:pPr marL="171450" indent="-171450">
-              <a:buFont typeface="Wingdings" pitchFamily="2" charset="2"/>
-              <a:buChar char="è"/>
-            </a:pPr>
+              <a:rPr lang="de-DE" dirty="0" smtClean="0"/>
+              <a:t>Last </a:t>
+            </a:r>
+            <a:r>
+              <a:rPr lang="de-DE" dirty="0" err="1" smtClean="0"/>
+              <a:t>step</a:t>
+            </a:r>
+            <a:r>
+              <a:rPr lang="de-DE" dirty="0" smtClean="0"/>
+              <a:t>: </a:t>
+            </a:r>
+            <a:r>
+              <a:rPr lang="de-DE" dirty="0" err="1" smtClean="0"/>
+              <a:t>context</a:t>
+            </a:r>
+            <a:r>
+              <a:rPr lang="de-DE" dirty="0" smtClean="0"/>
+              <a:t> </a:t>
+            </a:r>
+            <a:r>
+              <a:rPr lang="de-DE" dirty="0" err="1" smtClean="0"/>
+              <a:t>and</a:t>
+            </a:r>
+            <a:r>
+              <a:rPr lang="de-DE" dirty="0" smtClean="0"/>
+              <a:t> </a:t>
+            </a:r>
+            <a:r>
+              <a:rPr lang="de-DE" dirty="0" err="1" smtClean="0"/>
+              <a:t>properties</a:t>
+            </a:r>
+            <a:r>
+              <a:rPr lang="de-DE" baseline="0" dirty="0" smtClean="0"/>
+              <a:t> </a:t>
+            </a:r>
+            <a:r>
+              <a:rPr lang="de-DE" baseline="0" dirty="0" err="1" smtClean="0"/>
+              <a:t>for</a:t>
+            </a:r>
+            <a:r>
+              <a:rPr lang="de-DE" baseline="0" dirty="0" smtClean="0"/>
+              <a:t> a </a:t>
+            </a:r>
+            <a:r>
+              <a:rPr lang="de-DE" baseline="0" dirty="0" err="1" smtClean="0"/>
+              <a:t>given</a:t>
+            </a:r>
+            <a:r>
+              <a:rPr lang="de-DE" baseline="0" dirty="0" smtClean="0"/>
+              <a:t> </a:t>
+            </a:r>
+            <a:r>
+              <a:rPr lang="de-DE" baseline="0" dirty="0" err="1" smtClean="0"/>
+              <a:t>set</a:t>
+            </a:r>
+            <a:r>
+              <a:rPr lang="de-DE" baseline="0" dirty="0" smtClean="0"/>
+              <a:t> </a:t>
+            </a:r>
+            <a:r>
+              <a:rPr lang="de-DE" baseline="0" dirty="0" err="1" smtClean="0"/>
+              <a:t>of</a:t>
+            </a:r>
+            <a:r>
+              <a:rPr lang="de-DE" baseline="0" dirty="0" smtClean="0"/>
+              <a:t> </a:t>
+            </a:r>
+            <a:r>
+              <a:rPr lang="de-DE" baseline="0" dirty="0" err="1" smtClean="0"/>
+              <a:t>named</a:t>
+            </a:r>
+            <a:r>
+              <a:rPr lang="de-DE" baseline="0" dirty="0" smtClean="0"/>
+              <a:t> </a:t>
+            </a:r>
+            <a:r>
+              <a:rPr lang="de-DE" baseline="0" dirty="0" err="1" smtClean="0"/>
+              <a:t>entities</a:t>
+            </a:r>
+            <a:r>
+              <a:rPr lang="de-DE" baseline="0" dirty="0" smtClean="0"/>
+              <a:t> </a:t>
+            </a:r>
+            <a:r>
+              <a:rPr lang="de-DE" baseline="0" dirty="0" err="1" smtClean="0"/>
+              <a:t>that</a:t>
+            </a:r>
+            <a:r>
+              <a:rPr lang="de-DE" baseline="0" dirty="0" smtClean="0"/>
+              <a:t> </a:t>
+            </a:r>
+            <a:r>
+              <a:rPr lang="de-DE" baseline="0" dirty="0" err="1" smtClean="0"/>
+              <a:t>were</a:t>
+            </a:r>
+            <a:r>
+              <a:rPr lang="de-DE" baseline="0" dirty="0" smtClean="0"/>
+              <a:t> </a:t>
+            </a:r>
+            <a:r>
+              <a:rPr lang="de-DE" baseline="0" dirty="0" err="1" smtClean="0"/>
+              <a:t>retrieved</a:t>
+            </a:r>
             <a:endParaRPr lang="de-DE" dirty="0"/>
           </a:p>
         </p:txBody>
@@ -1591,7 +1603,7 @@
           <a:p>
             <a:fld id="{6B56D088-27D1-433A-A9A9-E30AD3E13E16}" type="slidenum">
               <a:rPr lang="en-GB" smtClean="0"/>
-              <a:t>7</a:t>
+              <a:t>6</a:t>
             </a:fld>
             <a:endParaRPr lang="en-GB"/>
           </a:p>
@@ -1600,7 +1612,7 @@
     </p:spTree>
     <p:extLst>
       <p:ext uri="{BB962C8B-B14F-4D97-AF65-F5344CB8AC3E}">
-        <p14:creationId xmlns:p14="http://schemas.microsoft.com/office/powerpoint/2010/main" val="2749297725"/>
+        <p14:creationId xmlns:p14="http://schemas.microsoft.com/office/powerpoint/2010/main" val="4067828839"/>
       </p:ext>
     </p:extLst>
   </p:cSld>
@@ -1656,6 +1668,183 @@
           <a:p>
             <a:r>
               <a:rPr lang="en-GB" dirty="0"/>
+              <a:t>Demo script:</a:t>
+            </a:r>
+          </a:p>
+          <a:p>
+            <a:r>
+              <a:rPr lang="en-GB" dirty="0"/>
+              <a:t>User</a:t>
+            </a:r>
+            <a:r>
+              <a:rPr lang="en-GB" baseline="0" dirty="0"/>
+              <a:t> visits his favourite website (Spiegel, </a:t>
+            </a:r>
+            <a:r>
+              <a:rPr lang="en-GB" baseline="0" dirty="0" err="1"/>
+              <a:t>bbc</a:t>
+            </a:r>
+            <a:r>
+              <a:rPr lang="en-GB" baseline="0" dirty="0"/>
+              <a:t>, CNN)</a:t>
+            </a:r>
+          </a:p>
+          <a:p>
+            <a:r>
+              <a:rPr lang="en-GB" baseline="0" dirty="0"/>
+              <a:t>Reads an article about foreign politics: Trump is filling </a:t>
+            </a:r>
+            <a:r>
+              <a:rPr lang="en-GB" baseline="0"/>
+              <a:t>his cabinet (example: http://www.bbc.com/news/world-us-canada-38168382) </a:t>
+            </a:r>
+            <a:endParaRPr lang="en-GB" baseline="0" dirty="0"/>
+          </a:p>
+          <a:p>
+            <a:r>
+              <a:rPr lang="en-GB" baseline="0" dirty="0"/>
+              <a:t>Now Trump obviously he knows, but who is this other person that is mentioned here? </a:t>
+            </a:r>
+          </a:p>
+          <a:p>
+            <a:pPr marL="171450" indent="-171450">
+              <a:buFont typeface="Wingdings" pitchFamily="2" charset="2"/>
+              <a:buChar char="è"/>
+            </a:pPr>
+            <a:r>
+              <a:rPr lang="en-GB" baseline="0" dirty="0">
+                <a:sym typeface="Wingdings" panose="05000000000000000000" pitchFamily="2" charset="2"/>
+              </a:rPr>
+              <a:t>Select the text and click the button!</a:t>
+            </a:r>
+          </a:p>
+          <a:p>
+            <a:pPr marL="0" indent="0">
+              <a:buFont typeface="Wingdings" pitchFamily="2" charset="2"/>
+              <a:buNone/>
+            </a:pPr>
+            <a:r>
+              <a:rPr lang="en-GB" baseline="0" dirty="0">
+                <a:sym typeface="Wingdings" panose="05000000000000000000" pitchFamily="2" charset="2"/>
+              </a:rPr>
+              <a:t>View information about the named entities that were found:</a:t>
+            </a:r>
+          </a:p>
+          <a:p>
+            <a:pPr marL="171450" indent="-171450">
+              <a:buFont typeface="Wingdings" pitchFamily="2" charset="2"/>
+              <a:buChar char="è"/>
+            </a:pPr>
+            <a:r>
+              <a:rPr lang="en-GB" baseline="0" dirty="0">
+                <a:sym typeface="Wingdings" panose="05000000000000000000" pitchFamily="2" charset="2"/>
+              </a:rPr>
+              <a:t>Information about Trump (there seems to be a lot) and the other person</a:t>
+            </a:r>
+          </a:p>
+          <a:p>
+            <a:pPr marL="171450" indent="-171450">
+              <a:buFont typeface="Wingdings" pitchFamily="2" charset="2"/>
+              <a:buChar char="è"/>
+            </a:pPr>
+            <a:r>
+              <a:rPr lang="en-GB" baseline="0" dirty="0">
+                <a:sym typeface="Wingdings" panose="05000000000000000000" pitchFamily="2" charset="2"/>
+              </a:rPr>
+              <a:t>Now this is useful, but what connects Trump to this person? View visualization</a:t>
+            </a:r>
+          </a:p>
+          <a:p>
+            <a:pPr marL="171450" indent="-171450">
+              <a:buFont typeface="Wingdings" pitchFamily="2" charset="2"/>
+              <a:buChar char="è"/>
+            </a:pPr>
+            <a:endParaRPr lang="de-DE" dirty="0"/>
+          </a:p>
+        </p:txBody>
+      </p:sp>
+      <p:sp>
+        <p:nvSpPr>
+          <p:cNvPr id="4" name="Slide Number Placeholder 3"/>
+          <p:cNvSpPr>
+            <a:spLocks noGrp="1"/>
+          </p:cNvSpPr>
+          <p:nvPr>
+            <p:ph type="sldNum" sz="quarter" idx="10"/>
+          </p:nvPr>
+        </p:nvSpPr>
+        <p:spPr/>
+        <p:txBody>
+          <a:bodyPr/>
+          <a:lstStyle/>
+          <a:p>
+            <a:fld id="{6B56D088-27D1-433A-A9A9-E30AD3E13E16}" type="slidenum">
+              <a:rPr lang="en-GB" smtClean="0"/>
+              <a:t>7</a:t>
+            </a:fld>
+            <a:endParaRPr lang="en-GB"/>
+          </a:p>
+        </p:txBody>
+      </p:sp>
+    </p:spTree>
+    <p:extLst>
+      <p:ext uri="{BB962C8B-B14F-4D97-AF65-F5344CB8AC3E}">
+        <p14:creationId xmlns:p14="http://schemas.microsoft.com/office/powerpoint/2010/main" val="2749297725"/>
+      </p:ext>
+    </p:extLst>
+  </p:cSld>
+  <p:clrMapOvr>
+    <a:masterClrMapping/>
+  </p:clrMapOvr>
+</p:notes>
+</file>
+
+<file path=ppt/notesSlides/notesSlide7.xml><?xml version="1.0" encoding="utf-8"?>
+<p:notes xmlns:a="http://schemas.openxmlformats.org/drawingml/2006/main" xmlns:r="http://schemas.openxmlformats.org/officeDocument/2006/relationships" xmlns:p="http://schemas.openxmlformats.org/presentationml/2006/main">
+  <p:cSld>
+    <p:spTree>
+      <p:nvGrpSpPr>
+        <p:cNvPr id="1" name=""/>
+        <p:cNvGrpSpPr/>
+        <p:nvPr/>
+      </p:nvGrpSpPr>
+      <p:grpSpPr>
+        <a:xfrm>
+          <a:off x="0" y="0"/>
+          <a:ext cx="0" cy="0"/>
+          <a:chOff x="0" y="0"/>
+          <a:chExt cx="0" cy="0"/>
+        </a:xfrm>
+      </p:grpSpPr>
+      <p:sp>
+        <p:nvSpPr>
+          <p:cNvPr id="2" name="Slide Image Placeholder 1"/>
+          <p:cNvSpPr>
+            <a:spLocks noGrp="1" noRot="1" noChangeAspect="1"/>
+          </p:cNvSpPr>
+          <p:nvPr>
+            <p:ph type="sldImg"/>
+          </p:nvPr>
+        </p:nvSpPr>
+        <p:spPr/>
+      </p:sp>
+      <p:sp>
+        <p:nvSpPr>
+          <p:cNvPr id="3" name="Notes Placeholder 2"/>
+          <p:cNvSpPr>
+            <a:spLocks noGrp="1"/>
+          </p:cNvSpPr>
+          <p:nvPr>
+            <p:ph type="body" idx="1"/>
+          </p:nvPr>
+        </p:nvSpPr>
+        <p:spPr/>
+        <p:txBody>
+          <a:bodyPr/>
+          <a:lstStyle/>
+          <a:p>
+            <a:r>
+              <a:rPr lang="en-GB" dirty="0"/>
               <a:t>On the technical side: architecture is extensible, as in new sources can</a:t>
             </a:r>
             <a:r>
@@ -1786,7 +1975,179 @@
 </p:notes>
 </file>
 
-<file path=ppt/notesSlides/notesSlide7.xml><?xml version="1.0" encoding="utf-8"?>
+<file path=ppt/notesSlides/notesSlide8.xml><?xml version="1.0" encoding="utf-8"?>
+<p:notes xmlns:a="http://schemas.openxmlformats.org/drawingml/2006/main" xmlns:r="http://schemas.openxmlformats.org/officeDocument/2006/relationships" xmlns:p="http://schemas.openxmlformats.org/presentationml/2006/main">
+  <p:cSld>
+    <p:spTree>
+      <p:nvGrpSpPr>
+        <p:cNvPr id="1" name=""/>
+        <p:cNvGrpSpPr/>
+        <p:nvPr/>
+      </p:nvGrpSpPr>
+      <p:grpSpPr>
+        <a:xfrm>
+          <a:off x="0" y="0"/>
+          <a:ext cx="0" cy="0"/>
+          <a:chOff x="0" y="0"/>
+          <a:chExt cx="0" cy="0"/>
+        </a:xfrm>
+      </p:grpSpPr>
+      <p:sp>
+        <p:nvSpPr>
+          <p:cNvPr id="2" name="Slide Image Placeholder 1"/>
+          <p:cNvSpPr>
+            <a:spLocks noGrp="1" noRot="1" noChangeAspect="1"/>
+          </p:cNvSpPr>
+          <p:nvPr>
+            <p:ph type="sldImg"/>
+          </p:nvPr>
+        </p:nvSpPr>
+        <p:spPr/>
+      </p:sp>
+      <p:sp>
+        <p:nvSpPr>
+          <p:cNvPr id="3" name="Notes Placeholder 2"/>
+          <p:cNvSpPr>
+            <a:spLocks noGrp="1"/>
+          </p:cNvSpPr>
+          <p:nvPr>
+            <p:ph type="body" idx="1"/>
+          </p:nvPr>
+        </p:nvSpPr>
+        <p:spPr/>
+        <p:txBody>
+          <a:bodyPr/>
+          <a:lstStyle/>
+          <a:p>
+            <a:r>
+              <a:rPr lang="en-GB" dirty="0"/>
+              <a:t>Demo script:</a:t>
+            </a:r>
+          </a:p>
+          <a:p>
+            <a:r>
+              <a:rPr lang="en-GB" dirty="0"/>
+              <a:t>User</a:t>
+            </a:r>
+            <a:r>
+              <a:rPr lang="en-GB" baseline="0" dirty="0"/>
+              <a:t> visits his favourite website (Spiegel, </a:t>
+            </a:r>
+            <a:r>
+              <a:rPr lang="en-GB" baseline="0" dirty="0" err="1"/>
+              <a:t>bbc</a:t>
+            </a:r>
+            <a:r>
+              <a:rPr lang="en-GB" baseline="0" dirty="0"/>
+              <a:t>, CNN)</a:t>
+            </a:r>
+          </a:p>
+          <a:p>
+            <a:r>
+              <a:rPr lang="en-GB" baseline="0" dirty="0"/>
+              <a:t>Reads an article about foreign politics: Trump is filling his cabinet (example: http://www.bbc.com/news/world-us-canada-38168382) </a:t>
+            </a:r>
+          </a:p>
+          <a:p>
+            <a:r>
+              <a:rPr lang="en-GB" baseline="0" dirty="0"/>
+              <a:t>Now Trump obviously he knows, but who is this other person that is mentioned here? </a:t>
+            </a:r>
+          </a:p>
+          <a:p>
+            <a:pPr marL="171450" indent="-171450">
+              <a:buFont typeface="Wingdings" pitchFamily="2" charset="2"/>
+              <a:buChar char="è"/>
+            </a:pPr>
+            <a:r>
+              <a:rPr lang="en-GB" baseline="0" dirty="0">
+                <a:sym typeface="Wingdings" panose="05000000000000000000" pitchFamily="2" charset="2"/>
+              </a:rPr>
+              <a:t>Select the text and click the button!</a:t>
+            </a:r>
+          </a:p>
+          <a:p>
+            <a:pPr marL="0" indent="0">
+              <a:buFont typeface="Wingdings" pitchFamily="2" charset="2"/>
+              <a:buNone/>
+            </a:pPr>
+            <a:r>
+              <a:rPr lang="en-GB" baseline="0" dirty="0">
+                <a:sym typeface="Wingdings" panose="05000000000000000000" pitchFamily="2" charset="2"/>
+              </a:rPr>
+              <a:t>View information about the named entities that were found:</a:t>
+            </a:r>
+          </a:p>
+          <a:p>
+            <a:pPr marL="171450" indent="-171450">
+              <a:buFont typeface="Wingdings" pitchFamily="2" charset="2"/>
+              <a:buChar char="è"/>
+            </a:pPr>
+            <a:r>
+              <a:rPr lang="en-GB" baseline="0" dirty="0">
+                <a:sym typeface="Wingdings" panose="05000000000000000000" pitchFamily="2" charset="2"/>
+              </a:rPr>
+              <a:t>Information about Trump (there seems to be a lot) and the other person</a:t>
+            </a:r>
+          </a:p>
+          <a:p>
+            <a:pPr marL="171450" indent="-171450">
+              <a:buFont typeface="Wingdings" pitchFamily="2" charset="2"/>
+              <a:buChar char="è"/>
+            </a:pPr>
+            <a:r>
+              <a:rPr lang="en-GB" baseline="0" dirty="0">
+                <a:sym typeface="Wingdings" panose="05000000000000000000" pitchFamily="2" charset="2"/>
+              </a:rPr>
+              <a:t>Now this is useful, but what connects Trump to this person? View visualization</a:t>
+            </a:r>
+          </a:p>
+          <a:p>
+            <a:pPr marL="171450" indent="-171450">
+              <a:buFont typeface="Wingdings" pitchFamily="2" charset="2"/>
+              <a:buChar char="è"/>
+            </a:pPr>
+            <a:endParaRPr lang="de-DE" dirty="0"/>
+          </a:p>
+        </p:txBody>
+      </p:sp>
+      <p:sp>
+        <p:nvSpPr>
+          <p:cNvPr id="4" name="Slide Number Placeholder 3"/>
+          <p:cNvSpPr>
+            <a:spLocks noGrp="1"/>
+          </p:cNvSpPr>
+          <p:nvPr>
+            <p:ph type="sldNum" sz="quarter" idx="10"/>
+          </p:nvPr>
+        </p:nvSpPr>
+        <p:spPr/>
+        <p:txBody>
+          <a:bodyPr/>
+          <a:lstStyle/>
+          <a:p>
+            <a:fld id="{6B56D088-27D1-433A-A9A9-E30AD3E13E16}" type="slidenum">
+              <a:rPr lang="en-GB" smtClean="0"/>
+              <a:t>9</a:t>
+            </a:fld>
+            <a:endParaRPr lang="en-GB"/>
+          </a:p>
+        </p:txBody>
+      </p:sp>
+    </p:spTree>
+    <p:extLst>
+      <p:ext uri="{BB962C8B-B14F-4D97-AF65-F5344CB8AC3E}">
+        <p14:creationId xmlns:p14="http://schemas.microsoft.com/office/powerpoint/2010/main" val="2316174046"/>
+      </p:ext>
+    </p:extLst>
+  </p:cSld>
+  <p:clrMapOvr>
+    <a:masterClrMapping/>
+  </p:clrMapOvr>
+</p:notes>
+</file>
+
+<file path=ppt/notesSlides/notesSlide9.xml><?xml version="1.0" encoding="utf-8"?>
 <p:notes xmlns:a="http://schemas.openxmlformats.org/drawingml/2006/main" xmlns:r="http://schemas.openxmlformats.org/officeDocument/2006/relationships" xmlns:p="http://schemas.openxmlformats.org/presentationml/2006/main">
   <p:cSld>
     <p:spTree>
@@ -1851,7 +2212,7 @@
           <a:p>
             <a:fld id="{6B56D088-27D1-433A-A9A9-E30AD3E13E16}" type="slidenum">
               <a:rPr lang="en-GB" smtClean="0"/>
-              <a:t>10</a:t>
+              <a:t>11</a:t>
             </a:fld>
             <a:endParaRPr lang="en-GB"/>
           </a:p>
@@ -7770,6 +8131,102 @@
 </file>
 
 <file path=ppt/slides/slide10.xml><?xml version="1.0" encoding="utf-8"?>
+<p:sld xmlns:a="http://schemas.openxmlformats.org/drawingml/2006/main" xmlns:r="http://schemas.openxmlformats.org/officeDocument/2006/relationships" xmlns:p="http://schemas.openxmlformats.org/presentationml/2006/main">
+  <p:cSld>
+    <p:spTree>
+      <p:nvGrpSpPr>
+        <p:cNvPr id="1" name=""/>
+        <p:cNvGrpSpPr/>
+        <p:nvPr/>
+      </p:nvGrpSpPr>
+      <p:grpSpPr>
+        <a:xfrm>
+          <a:off x="0" y="0"/>
+          <a:ext cx="0" cy="0"/>
+          <a:chOff x="0" y="0"/>
+          <a:chExt cx="0" cy="0"/>
+        </a:xfrm>
+      </p:grpSpPr>
+      <p:sp>
+        <p:nvSpPr>
+          <p:cNvPr id="2" name="Title 1"/>
+          <p:cNvSpPr>
+            <a:spLocks noGrp="1"/>
+          </p:cNvSpPr>
+          <p:nvPr>
+            <p:ph type="title"/>
+          </p:nvPr>
+        </p:nvSpPr>
+        <p:spPr/>
+        <p:txBody>
+          <a:bodyPr/>
+          <a:lstStyle/>
+          <a:p>
+            <a:r>
+              <a:rPr lang="en-GB" dirty="0"/>
+              <a:t>Backup</a:t>
+            </a:r>
+            <a:endParaRPr lang="de-DE" dirty="0"/>
+          </a:p>
+        </p:txBody>
+      </p:sp>
+      <p:sp>
+        <p:nvSpPr>
+          <p:cNvPr id="3" name="Content Placeholder 2"/>
+          <p:cNvSpPr>
+            <a:spLocks noGrp="1"/>
+          </p:cNvSpPr>
+          <p:nvPr>
+            <p:ph idx="1"/>
+          </p:nvPr>
+        </p:nvSpPr>
+        <p:spPr/>
+        <p:txBody>
+          <a:bodyPr/>
+          <a:lstStyle/>
+          <a:p>
+            <a:endParaRPr lang="de-DE"/>
+          </a:p>
+        </p:txBody>
+      </p:sp>
+      <p:sp>
+        <p:nvSpPr>
+          <p:cNvPr id="4" name="Slide Number Placeholder 3"/>
+          <p:cNvSpPr>
+            <a:spLocks noGrp="1"/>
+          </p:cNvSpPr>
+          <p:nvPr>
+            <p:ph type="sldNum" sz="quarter" idx="12"/>
+          </p:nvPr>
+        </p:nvSpPr>
+        <p:spPr/>
+        <p:txBody>
+          <a:bodyPr/>
+          <a:lstStyle/>
+          <a:p>
+            <a:fld id="{2921BF44-F096-42DF-ADC3-B535522D2EE1}" type="slidenum">
+              <a:rPr lang="en-GB" smtClean="0"/>
+              <a:pPr/>
+              <a:t>10</a:t>
+            </a:fld>
+            <a:endParaRPr lang="en-GB" dirty="0"/>
+          </a:p>
+        </p:txBody>
+      </p:sp>
+    </p:spTree>
+    <p:extLst>
+      <p:ext uri="{BB962C8B-B14F-4D97-AF65-F5344CB8AC3E}">
+        <p14:creationId xmlns:p14="http://schemas.microsoft.com/office/powerpoint/2010/main" val="333537589"/>
+      </p:ext>
+    </p:extLst>
+  </p:cSld>
+  <p:clrMapOvr>
+    <a:masterClrMapping/>
+  </p:clrMapOvr>
+</p:sld>
+</file>
+
+<file path=ppt/slides/slide11.xml><?xml version="1.0" encoding="utf-8"?>
 <p:sld xmlns:a="http://schemas.openxmlformats.org/drawingml/2006/main" xmlns:r="http://schemas.openxmlformats.org/officeDocument/2006/relationships" xmlns:p="http://schemas.openxmlformats.org/presentationml/2006/main" show="0">
   <p:cSld>
     <p:spTree>
@@ -7826,7 +8283,7 @@
           <a:p>
             <a:fld id="{2921BF44-F096-42DF-ADC3-B535522D2EE1}" type="slidenum">
               <a:rPr lang="en-GB" smtClean="0"/>
-              <a:t>10</a:t>
+              <a:t>11</a:t>
             </a:fld>
             <a:endParaRPr lang="en-GB"/>
           </a:p>
@@ -7980,18 +8437,18 @@
   <p:clrMapOvr>
     <a:masterClrMapping/>
   </p:clrMapOvr>
-  <mc:AlternateContent xmlns:mc="http://schemas.openxmlformats.org/markup-compatibility/2006">
-    <mc:Choice xmlns:p14="http://schemas.microsoft.com/office/powerpoint/2010/main" Requires="p14">
+  <mc:AlternateContent xmlns:mc="http://schemas.openxmlformats.org/markup-compatibility/2006" xmlns:p14="http://schemas.microsoft.com/office/powerpoint/2010/main">
+    <mc:Choice Requires="p14">
       <p:transition spd="slow" p14:dur="2000"/>
     </mc:Choice>
-    <mc:Fallback>
+    <mc:Fallback xmlns="">
       <p:transition spd="slow"/>
     </mc:Fallback>
   </mc:AlternateContent>
 </p:sld>
 </file>
 
-<file path=ppt/slides/slide11.xml><?xml version="1.0" encoding="utf-8"?>
+<file path=ppt/slides/slide12.xml><?xml version="1.0" encoding="utf-8"?>
 <p:sld xmlns:a="http://schemas.openxmlformats.org/drawingml/2006/main" xmlns:r="http://schemas.openxmlformats.org/officeDocument/2006/relationships" xmlns:p="http://schemas.openxmlformats.org/presentationml/2006/main">
   <p:cSld>
     <p:spTree>
@@ -8049,7 +8506,7 @@
             <a:fld id="{2921BF44-F096-42DF-ADC3-B535522D2EE1}" type="slidenum">
               <a:rPr lang="en-GB" smtClean="0"/>
               <a:pPr/>
-              <a:t>11</a:t>
+              <a:t>12</a:t>
             </a:fld>
             <a:endParaRPr lang="en-GB" dirty="0"/>
           </a:p>
@@ -8109,7 +8566,7 @@
 </p:sld>
 </file>
 
-<file path=ppt/slides/slide12.xml><?xml version="1.0" encoding="utf-8"?>
+<file path=ppt/slides/slide13.xml><?xml version="1.0" encoding="utf-8"?>
 <p:sld xmlns:a="http://schemas.openxmlformats.org/drawingml/2006/main" xmlns:r="http://schemas.openxmlformats.org/officeDocument/2006/relationships" xmlns:p="http://schemas.openxmlformats.org/presentationml/2006/main">
   <p:cSld>
     <p:spTree>
@@ -8258,7 +8715,7 @@
             <a:fld id="{2921BF44-F096-42DF-ADC3-B535522D2EE1}" type="slidenum">
               <a:rPr lang="en-GB" smtClean="0"/>
               <a:pPr/>
-              <a:t>12</a:t>
+              <a:t>13</a:t>
             </a:fld>
             <a:endParaRPr lang="en-GB" dirty="0"/>
           </a:p>
@@ -8385,7 +8842,7 @@
 </p:sld>
 </file>
 
-<file path=ppt/slides/slide13.xml><?xml version="1.0" encoding="utf-8"?>
+<file path=ppt/slides/slide14.xml><?xml version="1.0" encoding="utf-8"?>
 <p:sld xmlns:a="http://schemas.openxmlformats.org/drawingml/2006/main" xmlns:r="http://schemas.openxmlformats.org/officeDocument/2006/relationships" xmlns:p="http://schemas.openxmlformats.org/presentationml/2006/main">
   <p:cSld>
     <p:spTree>
@@ -8489,7 +8946,7 @@
             <a:fld id="{2921BF44-F096-42DF-ADC3-B535522D2EE1}" type="slidenum">
               <a:rPr lang="en-GB" smtClean="0"/>
               <a:pPr/>
-              <a:t>13</a:t>
+              <a:t>14</a:t>
             </a:fld>
             <a:endParaRPr lang="en-GB" dirty="0"/>
           </a:p>
@@ -8958,7 +9415,7 @@
                 <a14:useLocalDpi xmlns:a14="http://schemas.microsoft.com/office/drawing/2010/main" val="0"/>
               </a:ext>
               <a:ext uri="{96DAC541-7B7A-43D3-8B79-37D633B846F1}">
-                <asvg:svgBlip xmlns:asvg="http://schemas.microsoft.com/office/drawing/2016/SVG/main" xmlns="" r:embed="rId7"/>
+                <asvg:svgBlip xmlns="" xmlns:asvg="http://schemas.microsoft.com/office/drawing/2016/SVG/main" r:embed="rId7"/>
               </a:ext>
             </a:extLst>
           </a:blip>
@@ -8991,7 +9448,7 @@
                 <a14:useLocalDpi xmlns:a14="http://schemas.microsoft.com/office/drawing/2010/main" val="0"/>
               </a:ext>
               <a:ext uri="{96DAC541-7B7A-43D3-8B79-37D633B846F1}">
-                <asvg:svgBlip xmlns:asvg="http://schemas.microsoft.com/office/drawing/2016/SVG/main" xmlns="" r:embed="rId9"/>
+                <asvg:svgBlip xmlns="" xmlns:asvg="http://schemas.microsoft.com/office/drawing/2016/SVG/main" r:embed="rId9"/>
               </a:ext>
             </a:extLst>
           </a:blip>
@@ -9019,6 +9476,13 @@
   <p:clrMapOvr>
     <a:masterClrMapping/>
   </p:clrMapOvr>
+  <p:timing>
+    <p:tnLst>
+      <p:par>
+        <p:cTn id="1" dur="indefinite" restart="never" nodeType="tmRoot"/>
+      </p:par>
+    </p:tnLst>
+  </p:timing>
 </p:sld>
 </file>
 
@@ -9612,7 +10076,7 @@
                   <a14:useLocalDpi xmlns:a14="http://schemas.microsoft.com/office/drawing/2010/main" val="0"/>
                 </a:ext>
                 <a:ext uri="{96DAC541-7B7A-43D3-8B79-37D633B846F1}">
-                  <asvg:svgBlip xmlns:asvg="http://schemas.microsoft.com/office/drawing/2016/SVG/main" xmlns="" r:embed="rId5"/>
+                  <asvg:svgBlip xmlns="" xmlns:asvg="http://schemas.microsoft.com/office/drawing/2016/SVG/main" r:embed="rId5"/>
                 </a:ext>
               </a:extLst>
             </a:blip>
@@ -9772,7 +10236,7 @@
                   <a14:useLocalDpi xmlns:a14="http://schemas.microsoft.com/office/drawing/2010/main" val="0"/>
                 </a:ext>
                 <a:ext uri="{96DAC541-7B7A-43D3-8B79-37D633B846F1}">
-                  <asvg:svgBlip xmlns:asvg="http://schemas.microsoft.com/office/drawing/2016/SVG/main" xmlns="" r:embed="rId9"/>
+                  <asvg:svgBlip xmlns="" xmlns:asvg="http://schemas.microsoft.com/office/drawing/2016/SVG/main" r:embed="rId9"/>
                 </a:ext>
               </a:extLst>
             </a:blip>
@@ -9865,7 +10329,7 @@
                     <a14:useLocalDpi xmlns:a14="http://schemas.microsoft.com/office/drawing/2010/main" val="0"/>
                   </a:ext>
                   <a:ext uri="{96DAC541-7B7A-43D3-8B79-37D633B846F1}">
-                    <asvg:svgBlip xmlns:asvg="http://schemas.microsoft.com/office/drawing/2016/SVG/main" xmlns="" r:embed="rId11"/>
+                    <asvg:svgBlip xmlns="" xmlns:asvg="http://schemas.microsoft.com/office/drawing/2016/SVG/main" r:embed="rId11"/>
                   </a:ext>
                 </a:extLst>
               </a:blip>
@@ -9898,7 +10362,7 @@
                     <a14:useLocalDpi xmlns:a14="http://schemas.microsoft.com/office/drawing/2010/main" val="0"/>
                   </a:ext>
                   <a:ext uri="{96DAC541-7B7A-43D3-8B79-37D633B846F1}">
-                    <asvg:svgBlip xmlns:asvg="http://schemas.microsoft.com/office/drawing/2016/SVG/main" xmlns="" r:embed="rId13"/>
+                    <asvg:svgBlip xmlns="" xmlns:asvg="http://schemas.microsoft.com/office/drawing/2016/SVG/main" r:embed="rId13"/>
                   </a:ext>
                 </a:extLst>
               </a:blip>
@@ -10080,7 +10544,7 @@
                 <a14:useLocalDpi xmlns:a14="http://schemas.microsoft.com/office/drawing/2010/main" val="0"/>
               </a:ext>
               <a:ext uri="{96DAC541-7B7A-43D3-8B79-37D633B846F1}">
-                <asvg:svgBlip xmlns:asvg="http://schemas.microsoft.com/office/drawing/2016/SVG/main" xmlns="" r:embed="rId18"/>
+                <asvg:svgBlip xmlns="" xmlns:asvg="http://schemas.microsoft.com/office/drawing/2016/SVG/main" r:embed="rId18"/>
               </a:ext>
             </a:extLst>
           </a:blip>
@@ -10113,7 +10577,7 @@
                 <a14:useLocalDpi xmlns:a14="http://schemas.microsoft.com/office/drawing/2010/main" val="0"/>
               </a:ext>
               <a:ext uri="{96DAC541-7B7A-43D3-8B79-37D633B846F1}">
-                <asvg:svgBlip xmlns:asvg="http://schemas.microsoft.com/office/drawing/2016/SVG/main" xmlns="" r:embed="rId20"/>
+                <asvg:svgBlip xmlns="" xmlns:asvg="http://schemas.microsoft.com/office/drawing/2016/SVG/main" r:embed="rId20"/>
               </a:ext>
             </a:extLst>
           </a:blip>
@@ -10498,7 +10962,7 @@
                   <a14:useLocalDpi xmlns:a14="http://schemas.microsoft.com/office/drawing/2010/main" val="0"/>
                 </a:ext>
                 <a:ext uri="{96DAC541-7B7A-43D3-8B79-37D633B846F1}">
-                  <asvg:svgBlip xmlns:asvg="http://schemas.microsoft.com/office/drawing/2016/SVG/main" xmlns="" r:embed="rId13"/>
+                  <asvg:svgBlip xmlns="" xmlns:asvg="http://schemas.microsoft.com/office/drawing/2016/SVG/main" r:embed="rId13"/>
                 </a:ext>
               </a:extLst>
             </a:blip>
@@ -12069,7 +12533,7 @@
                   <a14:useLocalDpi xmlns:a14="http://schemas.microsoft.com/office/drawing/2010/main" val="0"/>
                 </a:ext>
                 <a:ext uri="{96DAC541-7B7A-43D3-8B79-37D633B846F1}">
-                  <asvg:svgBlip xmlns:asvg="http://schemas.microsoft.com/office/drawing/2016/SVG/main" xmlns="" r:embed="rId6"/>
+                  <asvg:svgBlip xmlns="" xmlns:asvg="http://schemas.microsoft.com/office/drawing/2016/SVG/main" r:embed="rId6"/>
                 </a:ext>
               </a:extLst>
             </a:blip>
@@ -12228,7 +12692,7 @@
                 <a14:useLocalDpi xmlns:a14="http://schemas.microsoft.com/office/drawing/2010/main" val="0"/>
               </a:ext>
               <a:ext uri="{96DAC541-7B7A-43D3-8B79-37D633B846F1}">
-                <asvg:svgBlip xmlns:asvg="http://schemas.microsoft.com/office/drawing/2016/SVG/main" xmlns="" r:embed="rId8"/>
+                <asvg:svgBlip xmlns="" xmlns:asvg="http://schemas.microsoft.com/office/drawing/2016/SVG/main" r:embed="rId8"/>
               </a:ext>
             </a:extLst>
           </a:blip>
@@ -12275,7 +12739,7 @@
                   <a14:useLocalDpi xmlns:a14="http://schemas.microsoft.com/office/drawing/2010/main" val="0"/>
                 </a:ext>
                 <a:ext uri="{96DAC541-7B7A-43D3-8B79-37D633B846F1}">
-                  <asvg:svgBlip xmlns:asvg="http://schemas.microsoft.com/office/drawing/2016/SVG/main" xmlns="" r:embed="rId10"/>
+                  <asvg:svgBlip xmlns="" xmlns:asvg="http://schemas.microsoft.com/office/drawing/2016/SVG/main" r:embed="rId10"/>
                 </a:ext>
               </a:extLst>
             </a:blip>
@@ -12368,7 +12832,7 @@
                     <a14:useLocalDpi xmlns:a14="http://schemas.microsoft.com/office/drawing/2010/main" val="0"/>
                   </a:ext>
                   <a:ext uri="{96DAC541-7B7A-43D3-8B79-37D633B846F1}">
-                    <asvg:svgBlip xmlns:asvg="http://schemas.microsoft.com/office/drawing/2016/SVG/main" xmlns="" r:embed="rId12"/>
+                    <asvg:svgBlip xmlns="" xmlns:asvg="http://schemas.microsoft.com/office/drawing/2016/SVG/main" r:embed="rId12"/>
                   </a:ext>
                 </a:extLst>
               </a:blip>
@@ -12522,7 +12986,7 @@
                   <a14:useLocalDpi xmlns:a14="http://schemas.microsoft.com/office/drawing/2010/main" val="0"/>
                 </a:ext>
                 <a:ext uri="{96DAC541-7B7A-43D3-8B79-37D633B846F1}">
-                  <asvg:svgBlip xmlns:asvg="http://schemas.microsoft.com/office/drawing/2016/SVG/main" xmlns="" r:embed="rId16"/>
+                  <asvg:svgBlip xmlns="" xmlns:asvg="http://schemas.microsoft.com/office/drawing/2016/SVG/main" r:embed="rId16"/>
                 </a:ext>
               </a:extLst>
             </a:blip>
@@ -12601,7 +13065,7 @@
                   <a14:useLocalDpi xmlns:a14="http://schemas.microsoft.com/office/drawing/2010/main" val="0"/>
                 </a:ext>
                 <a:ext uri="{96DAC541-7B7A-43D3-8B79-37D633B846F1}">
-                  <asvg:svgBlip xmlns:asvg="http://schemas.microsoft.com/office/drawing/2016/SVG/main" xmlns="" r:embed="rId18"/>
+                  <asvg:svgBlip xmlns="" xmlns:asvg="http://schemas.microsoft.com/office/drawing/2016/SVG/main" r:embed="rId18"/>
                 </a:ext>
               </a:extLst>
             </a:blip>
@@ -12846,7 +13310,7 @@
                     <a14:useLocalDpi xmlns:a14="http://schemas.microsoft.com/office/drawing/2010/main" val="0"/>
                   </a:ext>
                   <a:ext uri="{96DAC541-7B7A-43D3-8B79-37D633B846F1}">
-                    <asvg:svgBlip xmlns:asvg="http://schemas.microsoft.com/office/drawing/2016/SVG/main" xmlns="" r:embed="rId22"/>
+                    <asvg:svgBlip xmlns="" xmlns:asvg="http://schemas.microsoft.com/office/drawing/2016/SVG/main" r:embed="rId22"/>
                   </a:ext>
                 </a:extLst>
               </a:blip>
@@ -12879,7 +13343,7 @@
                     <a14:useLocalDpi xmlns:a14="http://schemas.microsoft.com/office/drawing/2010/main" val="0"/>
                   </a:ext>
                   <a:ext uri="{96DAC541-7B7A-43D3-8B79-37D633B846F1}">
-                    <asvg:svgBlip xmlns:asvg="http://schemas.microsoft.com/office/drawing/2016/SVG/main" xmlns="" r:embed="rId16"/>
+                    <asvg:svgBlip xmlns="" xmlns:asvg="http://schemas.microsoft.com/office/drawing/2016/SVG/main" r:embed="rId16"/>
                   </a:ext>
                 </a:extLst>
               </a:blip>
@@ -14798,13 +15262,13 @@
             <p:nvPr/>
           </p:nvPicPr>
           <p:blipFill>
-            <a:blip r:embed="rId2">
+            <a:blip r:embed="rId3">
               <a:extLst>
                 <a:ext uri="{28A0092B-C50C-407E-A947-70E740481C1C}">
                   <a14:useLocalDpi xmlns:a14="http://schemas.microsoft.com/office/drawing/2010/main" val="0"/>
                 </a:ext>
                 <a:ext uri="{96DAC541-7B7A-43D3-8B79-37D633B846F1}">
-                  <asvg:svgBlip xmlns:asvg="http://schemas.microsoft.com/office/drawing/2016/SVG/main" xmlns="" r:embed="rId3"/>
+                  <asvg:svgBlip xmlns="" xmlns:asvg="http://schemas.microsoft.com/office/drawing/2016/SVG/main" r:embed="rId4"/>
                 </a:ext>
               </a:extLst>
             </a:blip>
@@ -14831,7 +15295,7 @@
             <p:nvPr/>
           </p:nvPicPr>
           <p:blipFill>
-            <a:blip r:embed="rId4"/>
+            <a:blip r:embed="rId5"/>
             <a:stretch>
               <a:fillRect/>
             </a:stretch>
@@ -15059,7 +15523,7 @@
               <p:nvPr/>
             </p:nvPicPr>
             <p:blipFill rotWithShape="1">
-              <a:blip r:embed="rId5" cstate="print">
+              <a:blip r:embed="rId6" cstate="print">
                 <a:extLst>
                   <a:ext uri="{28A0092B-C50C-407E-A947-70E740481C1C}">
                     <a14:useLocalDpi xmlns:a14="http://schemas.microsoft.com/office/drawing/2010/main" val="0"/>
@@ -15147,13 +15611,13 @@
               <p:nvPr/>
             </p:nvPicPr>
             <p:blipFill>
-              <a:blip r:embed="rId6" cstate="print">
+              <a:blip r:embed="rId7" cstate="print">
                 <a:extLst>
                   <a:ext uri="{28A0092B-C50C-407E-A947-70E740481C1C}">
                     <a14:useLocalDpi xmlns:a14="http://schemas.microsoft.com/office/drawing/2010/main" val="0"/>
                   </a:ext>
                   <a:ext uri="{96DAC541-7B7A-43D3-8B79-37D633B846F1}">
-                    <asvg:svgBlip xmlns:asvg="http://schemas.microsoft.com/office/drawing/2016/SVG/main" xmlns="" r:embed="rId7"/>
+                    <asvg:svgBlip xmlns="" xmlns:asvg="http://schemas.microsoft.com/office/drawing/2016/SVG/main" r:embed="rId8"/>
                   </a:ext>
                 </a:extLst>
               </a:blip>
@@ -15279,7 +15743,7 @@
               <p:nvPr/>
             </p:nvPicPr>
             <p:blipFill rotWithShape="1">
-              <a:blip r:embed="rId5" cstate="print">
+              <a:blip r:embed="rId6" cstate="print">
                 <a:extLst>
                   <a:ext uri="{28A0092B-C50C-407E-A947-70E740481C1C}">
                     <a14:useLocalDpi xmlns:a14="http://schemas.microsoft.com/office/drawing/2010/main" val="0"/>
@@ -15681,7 +16145,7 @@
               <p:nvPr/>
             </p:nvPicPr>
             <p:blipFill>
-              <a:blip r:embed="rId8" cstate="print">
+              <a:blip r:embed="rId9" cstate="print">
                 <a:extLst>
                   <a:ext uri="{28A0092B-C50C-407E-A947-70E740481C1C}">
                     <a14:useLocalDpi xmlns:a14="http://schemas.microsoft.com/office/drawing/2010/main" val="0"/>
@@ -16051,7 +16515,7 @@
               <p:nvPr/>
             </p:nvPicPr>
             <p:blipFill>
-              <a:blip r:embed="rId9" cstate="print">
+              <a:blip r:embed="rId10" cstate="print">
                 <a:extLst>
                   <a:ext uri="{28A0092B-C50C-407E-A947-70E740481C1C}">
                     <a14:useLocalDpi xmlns:a14="http://schemas.microsoft.com/office/drawing/2010/main" val="0"/>
@@ -16383,7 +16847,7 @@
               <p:nvPr/>
             </p:nvPicPr>
             <p:blipFill>
-              <a:blip r:embed="rId8" cstate="print">
+              <a:blip r:embed="rId9" cstate="print">
                 <a:extLst>
                   <a:ext uri="{28A0092B-C50C-407E-A947-70E740481C1C}">
                     <a14:useLocalDpi xmlns:a14="http://schemas.microsoft.com/office/drawing/2010/main" val="0"/>
@@ -16739,7 +17203,7 @@
             <p:nvPr/>
           </p:nvPicPr>
           <p:blipFill>
-            <a:blip r:embed="rId10" cstate="print">
+            <a:blip r:embed="rId11" cstate="print">
               <a:extLst>
                 <a:ext uri="{28A0092B-C50C-407E-A947-70E740481C1C}">
                   <a14:useLocalDpi xmlns:a14="http://schemas.microsoft.com/office/drawing/2010/main" val="0"/>
@@ -16795,7 +17259,7 @@
             <p:nvPr/>
           </p:nvPicPr>
           <p:blipFill>
-            <a:blip r:embed="rId11" cstate="print">
+            <a:blip r:embed="rId12" cstate="print">
               <a:extLst>
                 <a:ext uri="{28A0092B-C50C-407E-A947-70E740481C1C}">
                   <a14:useLocalDpi xmlns:a14="http://schemas.microsoft.com/office/drawing/2010/main" val="0"/>
@@ -17178,13 +17642,13 @@
                 <p:nvPr/>
               </p:nvPicPr>
               <p:blipFill>
-                <a:blip r:embed="rId12" cstate="print">
+                <a:blip r:embed="rId13" cstate="print">
                   <a:extLst>
                     <a:ext uri="{28A0092B-C50C-407E-A947-70E740481C1C}">
                       <a14:useLocalDpi xmlns:a14="http://schemas.microsoft.com/office/drawing/2010/main" val="0"/>
                     </a:ext>
                     <a:ext uri="{96DAC541-7B7A-43D3-8B79-37D633B846F1}">
-                      <asvg:svgBlip xmlns:asvg="http://schemas.microsoft.com/office/drawing/2016/SVG/main" xmlns="" r:embed="rId13"/>
+                      <asvg:svgBlip xmlns="" xmlns:asvg="http://schemas.microsoft.com/office/drawing/2016/SVG/main" r:embed="rId14"/>
                     </a:ext>
                   </a:extLst>
                 </a:blip>
@@ -17211,13 +17675,13 @@
                 <p:nvPr/>
               </p:nvPicPr>
               <p:blipFill>
-                <a:blip r:embed="rId14" cstate="print">
+                <a:blip r:embed="rId15" cstate="print">
                   <a:extLst>
                     <a:ext uri="{28A0092B-C50C-407E-A947-70E740481C1C}">
                       <a14:useLocalDpi xmlns:a14="http://schemas.microsoft.com/office/drawing/2010/main" val="0"/>
                     </a:ext>
                     <a:ext uri="{96DAC541-7B7A-43D3-8B79-37D633B846F1}">
-                      <asvg:svgBlip xmlns:asvg="http://schemas.microsoft.com/office/drawing/2016/SVG/main" xmlns="" r:embed="rId15"/>
+                      <asvg:svgBlip xmlns="" xmlns:asvg="http://schemas.microsoft.com/office/drawing/2016/SVG/main" r:embed="rId16"/>
                     </a:ext>
                   </a:extLst>
                 </a:blip>
@@ -17244,11 +17708,11 @@
                 <p:nvPr/>
               </p:nvPicPr>
               <p:blipFill>
-                <a:blip r:embed="rId16" cstate="print">
+                <a:blip r:embed="rId17" cstate="print">
                   <a:extLst>
                     <a:ext uri="{BEBA8EAE-BF5A-486C-A8C5-ECC9F3942E4B}">
                       <a14:imgProps xmlns:a14="http://schemas.microsoft.com/office/drawing/2010/main">
-                        <a14:imgLayer r:embed="rId17">
+                        <a14:imgLayer r:embed="rId18">
                           <a14:imgEffect>
                             <a14:backgroundRemoval t="9425" b="94089" l="0" r="100000">
                               <a14:foregroundMark x1="5272" y1="63419" x2="5272" y2="63419"/>
@@ -17289,7 +17753,7 @@
                 <p:nvPr/>
               </p:nvPicPr>
               <p:blipFill rotWithShape="1">
-                <a:blip r:embed="rId18" cstate="print">
+                <a:blip r:embed="rId19" cstate="print">
                   <a:extLst>
                     <a:ext uri="{28A0092B-C50C-407E-A947-70E740481C1C}">
                       <a14:useLocalDpi xmlns:a14="http://schemas.microsoft.com/office/drawing/2010/main" val="0"/>
@@ -17888,78 +18352,93 @@
           </a:p>
         </p:txBody>
       </p:sp>
-      <p:pic>
-        <p:nvPicPr>
-          <p:cNvPr id="2066" name="Picture 18" descr="https://www.total-toolbar.com/wp-content/uploads/2014/12/Custom-Google-Chrome-Extension-Development3.png"/>
-          <p:cNvPicPr>
-            <a:picLocks noChangeAspect="1" noChangeArrowheads="1"/>
-          </p:cNvPicPr>
+      <p:grpSp>
+        <p:nvGrpSpPr>
+          <p:cNvPr id="3" name="Group 2"/>
+          <p:cNvGrpSpPr/>
           <p:nvPr/>
-        </p:nvPicPr>
-        <p:blipFill>
-          <a:blip r:embed="rId3">
+        </p:nvGrpSpPr>
+        <p:grpSpPr>
+          <a:xfrm>
+            <a:off x="3357975" y="2589719"/>
+            <a:ext cx="2282000" cy="2403197"/>
+            <a:chOff x="3357975" y="2589719"/>
+            <a:chExt cx="2282000" cy="2403197"/>
+          </a:xfrm>
+        </p:grpSpPr>
+        <p:pic>
+          <p:nvPicPr>
+            <p:cNvPr id="2066" name="Picture 18" descr="https://www.total-toolbar.com/wp-content/uploads/2014/12/Custom-Google-Chrome-Extension-Development3.png"/>
+            <p:cNvPicPr>
+              <a:picLocks noChangeAspect="1" noChangeArrowheads="1"/>
+            </p:cNvPicPr>
+            <p:nvPr/>
+          </p:nvPicPr>
+          <p:blipFill>
+            <a:blip r:embed="rId3">
+              <a:extLst>
+                <a:ext uri="{28A0092B-C50C-407E-A947-70E740481C1C}">
+                  <a14:useLocalDpi xmlns:a14="http://schemas.microsoft.com/office/drawing/2010/main" val="0"/>
+                </a:ext>
+              </a:extLst>
+            </a:blip>
+            <a:srcRect/>
+            <a:stretch>
+              <a:fillRect/>
+            </a:stretch>
+          </p:blipFill>
+          <p:spPr bwMode="auto">
+            <a:xfrm>
+              <a:off x="3611834" y="2589719"/>
+              <a:ext cx="1774283" cy="1774283"/>
+            </a:xfrm>
+            <a:prstGeom prst="rect">
+              <a:avLst/>
+            </a:prstGeom>
+            <a:noFill/>
             <a:extLst>
-              <a:ext uri="{28A0092B-C50C-407E-A947-70E740481C1C}">
-                <a14:useLocalDpi xmlns:a14="http://schemas.microsoft.com/office/drawing/2010/main" val="0"/>
+              <a:ext uri="{909E8E84-426E-40DD-AFC4-6F175D3DCCD1}">
+                <a14:hiddenFill xmlns:a14="http://schemas.microsoft.com/office/drawing/2010/main">
+                  <a:solidFill>
+                    <a:srgbClr val="FFFFFF"/>
+                  </a:solidFill>
+                </a14:hiddenFill>
               </a:ext>
             </a:extLst>
-          </a:blip>
-          <a:srcRect/>
-          <a:stretch>
-            <a:fillRect/>
-          </a:stretch>
-        </p:blipFill>
-        <p:spPr bwMode="auto">
-          <a:xfrm>
-            <a:off x="3611834" y="2589719"/>
-            <a:ext cx="1774283" cy="1774283"/>
-          </a:xfrm>
-          <a:prstGeom prst="rect">
-            <a:avLst/>
-          </a:prstGeom>
-          <a:noFill/>
-          <a:extLst>
-            <a:ext uri="{909E8E84-426E-40DD-AFC4-6F175D3DCCD1}">
-              <a14:hiddenFill xmlns:a14="http://schemas.microsoft.com/office/drawing/2010/main">
-                <a:solidFill>
-                  <a:srgbClr val="FFFFFF"/>
-                </a:solidFill>
-              </a14:hiddenFill>
-            </a:ext>
-          </a:extLst>
-        </p:spPr>
-      </p:pic>
-      <p:sp>
-        <p:nvSpPr>
-          <p:cNvPr id="11" name="TextBox 10"/>
-          <p:cNvSpPr txBox="1"/>
-          <p:nvPr/>
-        </p:nvSpPr>
-        <p:spPr>
-          <a:xfrm>
-            <a:off x="3357975" y="4531251"/>
-            <a:ext cx="2282000" cy="461665"/>
-          </a:xfrm>
-          <a:prstGeom prst="rect">
-            <a:avLst/>
-          </a:prstGeom>
-          <a:noFill/>
-        </p:spPr>
-        <p:txBody>
-          <a:bodyPr wrap="square" rtlCol="0">
-            <a:spAutoFit/>
-          </a:bodyPr>
-          <a:lstStyle/>
-          <a:p>
-            <a:pPr algn="ctr"/>
-            <a:r>
-              <a:rPr lang="en-GB" sz="2400" dirty="0"/>
-              <a:t>Easy installation </a:t>
-            </a:r>
-            <a:endParaRPr lang="de-DE" sz="2400" dirty="0"/>
-          </a:p>
-        </p:txBody>
-      </p:sp>
+          </p:spPr>
+        </p:pic>
+        <p:sp>
+          <p:nvSpPr>
+            <p:cNvPr id="11" name="TextBox 10"/>
+            <p:cNvSpPr txBox="1"/>
+            <p:nvPr/>
+          </p:nvSpPr>
+          <p:spPr>
+            <a:xfrm>
+              <a:off x="3357975" y="4531251"/>
+              <a:ext cx="2282000" cy="461665"/>
+            </a:xfrm>
+            <a:prstGeom prst="rect">
+              <a:avLst/>
+            </a:prstGeom>
+            <a:noFill/>
+          </p:spPr>
+          <p:txBody>
+            <a:bodyPr wrap="square" rtlCol="0">
+              <a:spAutoFit/>
+            </a:bodyPr>
+            <a:lstStyle/>
+            <a:p>
+              <a:pPr algn="ctr"/>
+              <a:r>
+                <a:rPr lang="en-GB" sz="2400" dirty="0"/>
+                <a:t>Easy installation </a:t>
+              </a:r>
+              <a:endParaRPr lang="de-DE" sz="2400" dirty="0"/>
+            </a:p>
+          </p:txBody>
+        </p:sp>
+      </p:grpSp>
       <p:grpSp>
         <p:nvGrpSpPr>
           <p:cNvPr id="30" name="Group 29"/>
@@ -18297,352 +18776,382 @@
           </a:p>
         </p:txBody>
       </p:sp>
-      <p:sp>
-        <p:nvSpPr>
-          <p:cNvPr id="43" name="TextBox 42"/>
-          <p:cNvSpPr txBox="1"/>
-          <p:nvPr/>
-        </p:nvSpPr>
-        <p:spPr>
-          <a:xfrm>
-            <a:off x="5881623" y="4531251"/>
-            <a:ext cx="2611099" cy="1569660"/>
-          </a:xfrm>
-          <a:prstGeom prst="rect">
-            <a:avLst/>
-          </a:prstGeom>
-          <a:noFill/>
-        </p:spPr>
-        <p:txBody>
-          <a:bodyPr wrap="square" rtlCol="0">
-            <a:spAutoFit/>
-          </a:bodyPr>
-          <a:lstStyle/>
-          <a:p>
-            <a:r>
-              <a:rPr lang="en-GB" sz="2400" dirty="0"/>
-              <a:t>Shows</a:t>
-            </a:r>
-          </a:p>
-          <a:p>
-            <a:pPr marL="457200" indent="-457200">
-              <a:buFont typeface="+mj-lt"/>
-              <a:buAutoNum type="arabicPeriod"/>
-            </a:pPr>
-            <a:r>
-              <a:rPr lang="en-GB" sz="2400" dirty="0"/>
-              <a:t>Named entities</a:t>
-            </a:r>
-          </a:p>
-          <a:p>
-            <a:pPr marL="457200" indent="-457200">
-              <a:buFont typeface="+mj-lt"/>
-              <a:buAutoNum type="arabicPeriod"/>
-            </a:pPr>
-            <a:r>
-              <a:rPr lang="en-GB" sz="2400" dirty="0" smtClean="0"/>
-              <a:t>Properties</a:t>
-            </a:r>
-          </a:p>
-          <a:p>
-            <a:pPr marL="457200" indent="-457200">
-              <a:buFont typeface="+mj-lt"/>
-              <a:buAutoNum type="arabicPeriod"/>
-            </a:pPr>
-            <a:r>
-              <a:rPr lang="en-GB" sz="2400" dirty="0" smtClean="0"/>
-              <a:t>Connections</a:t>
-            </a:r>
-            <a:endParaRPr lang="de-DE" sz="2400" dirty="0"/>
-          </a:p>
-        </p:txBody>
-      </p:sp>
-      <p:sp>
-        <p:nvSpPr>
-          <p:cNvPr id="44" name="TextBox 43"/>
-          <p:cNvSpPr txBox="1"/>
-          <p:nvPr/>
-        </p:nvSpPr>
-        <p:spPr>
-          <a:xfrm>
-            <a:off x="8663400" y="4580692"/>
-            <a:ext cx="2282000" cy="830997"/>
-          </a:xfrm>
-          <a:prstGeom prst="rect">
-            <a:avLst/>
-          </a:prstGeom>
-          <a:noFill/>
-        </p:spPr>
-        <p:txBody>
-          <a:bodyPr wrap="square" rtlCol="0">
-            <a:spAutoFit/>
-          </a:bodyPr>
-          <a:lstStyle/>
-          <a:p>
-            <a:pPr algn="ctr"/>
-            <a:r>
-              <a:rPr lang="en-GB" sz="2400" dirty="0"/>
-              <a:t>No Wikipedia lookups!</a:t>
-            </a:r>
-            <a:endParaRPr lang="de-DE" sz="2400" dirty="0"/>
-          </a:p>
-        </p:txBody>
-      </p:sp>
       <p:grpSp>
         <p:nvGrpSpPr>
-          <p:cNvPr id="2053" name="Group 2052"/>
+          <p:cNvPr id="6" name="Group 5"/>
           <p:cNvGrpSpPr/>
           <p:nvPr/>
         </p:nvGrpSpPr>
         <p:grpSpPr>
           <a:xfrm>
             <a:off x="8534427" y="2356896"/>
-            <a:ext cx="2539945" cy="2239927"/>
-            <a:chOff x="8534427" y="2509296"/>
-            <a:chExt cx="2539945" cy="2239927"/>
+            <a:ext cx="2539945" cy="3054793"/>
+            <a:chOff x="8534427" y="2356896"/>
+            <a:chExt cx="2539945" cy="3054793"/>
           </a:xfrm>
         </p:grpSpPr>
-        <p:pic>
-          <p:nvPicPr>
-            <p:cNvPr id="2070" name="Picture 22" descr="https://upload.wikimedia.org/wikipedia/commons/thumb/d/de/Wikipedia_Logo_1.0.png/220px-Wikipedia_Logo_1.0.png"/>
-            <p:cNvPicPr>
-              <a:picLocks noChangeAspect="1" noChangeArrowheads="1"/>
-            </p:cNvPicPr>
-            <p:nvPr/>
-          </p:nvPicPr>
-          <p:blipFill>
-            <a:blip r:embed="rId6">
-              <a:extLst>
-                <a:ext uri="{28A0092B-C50C-407E-A947-70E740481C1C}">
-                  <a14:useLocalDpi xmlns:a14="http://schemas.microsoft.com/office/drawing/2010/main" val="0"/>
-                </a:ext>
-              </a:extLst>
-            </a:blip>
-            <a:srcRect/>
-            <a:stretch>
-              <a:fillRect/>
-            </a:stretch>
-          </p:blipFill>
-          <p:spPr bwMode="auto">
-            <a:xfrm>
-              <a:off x="9017210" y="2887198"/>
-              <a:ext cx="1574380" cy="1574381"/>
-            </a:xfrm>
-            <a:prstGeom prst="rect">
-              <a:avLst/>
-            </a:prstGeom>
-            <a:noFill/>
-            <a:extLst>
-              <a:ext uri="{909E8E84-426E-40DD-AFC4-6F175D3DCCD1}">
-                <a14:hiddenFill xmlns:a14="http://schemas.microsoft.com/office/drawing/2010/main">
-                  <a:solidFill>
-                    <a:srgbClr val="FFFFFF"/>
-                  </a:solidFill>
-                </a14:hiddenFill>
-              </a:ext>
-            </a:extLst>
-          </p:spPr>
-        </p:pic>
         <p:sp>
           <p:nvSpPr>
-            <p:cNvPr id="2052" name="Multiply 2051"/>
-            <p:cNvSpPr/>
+            <p:cNvPr id="44" name="TextBox 43"/>
+            <p:cNvSpPr txBox="1"/>
             <p:nvPr/>
           </p:nvSpPr>
           <p:spPr>
             <a:xfrm>
-              <a:off x="8534427" y="2509296"/>
-              <a:ext cx="2539945" cy="2239927"/>
-            </a:xfrm>
-            <a:prstGeom prst="mathMultiply">
-              <a:avLst>
-                <a:gd name="adj1" fmla="val 8349"/>
-              </a:avLst>
-            </a:prstGeom>
-            <a:solidFill>
-              <a:srgbClr val="FF0000"/>
-            </a:solidFill>
-          </p:spPr>
-          <p:style>
-            <a:lnRef idx="2">
-              <a:schemeClr val="accent1">
-                <a:shade val="50000"/>
-              </a:schemeClr>
-            </a:lnRef>
-            <a:fillRef idx="1">
-              <a:schemeClr val="accent1"/>
-            </a:fillRef>
-            <a:effectRef idx="0">
-              <a:schemeClr val="accent1"/>
-            </a:effectRef>
-            <a:fontRef idx="minor">
-              <a:schemeClr val="lt1"/>
-            </a:fontRef>
-          </p:style>
-          <p:txBody>
-            <a:bodyPr rtlCol="0" anchor="ctr"/>
-            <a:lstStyle/>
-            <a:p>
-              <a:pPr algn="ctr"/>
-              <a:endParaRPr lang="de-DE"/>
-            </a:p>
-          </p:txBody>
-        </p:sp>
-      </p:grpSp>
-      <p:grpSp>
-        <p:nvGrpSpPr>
-          <p:cNvPr id="29" name="Gruppieren 54"/>
-          <p:cNvGrpSpPr/>
-          <p:nvPr/>
-        </p:nvGrpSpPr>
-        <p:grpSpPr>
-          <a:xfrm>
-            <a:off x="6168303" y="2990159"/>
-            <a:ext cx="2037738" cy="1086565"/>
-            <a:chOff x="5932289" y="4834081"/>
-            <a:chExt cx="1684081" cy="897987"/>
-          </a:xfrm>
-        </p:grpSpPr>
-        <p:pic>
-          <p:nvPicPr>
-            <p:cNvPr id="33" name="Grafik 61" descr="Netzwerk"/>
-            <p:cNvPicPr>
-              <a:picLocks noChangeAspect="1"/>
-            </p:cNvPicPr>
-            <p:nvPr/>
-          </p:nvPicPr>
-          <p:blipFill>
-            <a:blip r:embed="rId7" cstate="print">
-              <a:extLst>
-                <a:ext uri="{28A0092B-C50C-407E-A947-70E740481C1C}">
-                  <a14:useLocalDpi xmlns:a14="http://schemas.microsoft.com/office/drawing/2010/main" val="0"/>
-                </a:ext>
-                <a:ext uri="{96DAC541-7B7A-43D3-8B79-37D633B846F1}">
-                  <asvg:svgBlip xmlns:asvg="http://schemas.microsoft.com/office/drawing/2016/SVG/main" xmlns="" r:embed="rId13"/>
-                </a:ext>
-              </a:extLst>
-            </a:blip>
-            <a:stretch>
-              <a:fillRect/>
-            </a:stretch>
-          </p:blipFill>
-          <p:spPr>
-            <a:xfrm rot="20111766">
-              <a:off x="6274967" y="4985804"/>
-              <a:ext cx="746264" cy="746264"/>
-            </a:xfrm>
-            <a:prstGeom prst="rect">
-              <a:avLst/>
-            </a:prstGeom>
-          </p:spPr>
-        </p:pic>
-        <p:pic>
-          <p:nvPicPr>
-            <p:cNvPr id="34" name="Grafik 62" descr="Benutzer"/>
-            <p:cNvPicPr>
-              <a:picLocks noChangeAspect="1"/>
-            </p:cNvPicPr>
-            <p:nvPr/>
-          </p:nvPicPr>
-          <p:blipFill>
-            <a:blip r:embed="rId14" cstate="print">
-              <a:extLst>
-                <a:ext uri="{28A0092B-C50C-407E-A947-70E740481C1C}">
-                  <a14:useLocalDpi xmlns:a14="http://schemas.microsoft.com/office/drawing/2010/main" val="0"/>
-                </a:ext>
-                <a:ext uri="{96DAC541-7B7A-43D3-8B79-37D633B846F1}">
-                  <asvg:svgBlip xmlns:asvg="http://schemas.microsoft.com/office/drawing/2016/SVG/main" xmlns="" r:embed="rId15"/>
-                </a:ext>
-              </a:extLst>
-            </a:blip>
-            <a:stretch>
-              <a:fillRect/>
-            </a:stretch>
-          </p:blipFill>
-          <p:spPr>
-            <a:xfrm>
-              <a:off x="6662206" y="4862427"/>
-              <a:ext cx="505454" cy="505454"/>
-            </a:xfrm>
-            <a:prstGeom prst="rect">
-              <a:avLst/>
-            </a:prstGeom>
-          </p:spPr>
-        </p:pic>
-        <p:pic>
-          <p:nvPicPr>
-            <p:cNvPr id="39" name="Picture 4" descr="City hall building Free Icon"/>
-            <p:cNvPicPr>
-              <a:picLocks noChangeAspect="1" noChangeArrowheads="1"/>
-            </p:cNvPicPr>
-            <p:nvPr/>
-          </p:nvPicPr>
-          <p:blipFill>
-            <a:blip r:embed="rId16" cstate="print">
-              <a:extLst>
-                <a:ext uri="{BEBA8EAE-BF5A-486C-A8C5-ECC9F3942E4B}">
-                  <a14:imgProps xmlns:a14="http://schemas.microsoft.com/office/drawing/2010/main">
-                    <a14:imgLayer r:embed="rId17">
-                      <a14:imgEffect>
-                        <a14:backgroundRemoval t="9425" b="94089" l="0" r="100000">
-                          <a14:foregroundMark x1="5272" y1="63419" x2="5272" y2="63419"/>
-                          <a14:foregroundMark x1="40096" y1="85144" x2="40096" y2="85144"/>
-                          <a14:foregroundMark x1="87700" y1="79233" x2="87700" y2="79233"/>
-                        </a14:backgroundRemoval>
-                      </a14:imgEffect>
-                    </a14:imgLayer>
-                  </a14:imgProps>
-                </a:ext>
-                <a:ext uri="{28A0092B-C50C-407E-A947-70E740481C1C}">
-                  <a14:useLocalDpi xmlns:a14="http://schemas.microsoft.com/office/drawing/2010/main" val="0"/>
-                </a:ext>
-              </a:extLst>
-            </a:blip>
-            <a:srcRect/>
-            <a:stretch>
-              <a:fillRect/>
-            </a:stretch>
-          </p:blipFill>
-          <p:spPr bwMode="auto">
-            <a:xfrm>
-              <a:off x="5932289" y="4987924"/>
-              <a:ext cx="554235" cy="554235"/>
+              <a:off x="8663400" y="4580692"/>
+              <a:ext cx="2282000" cy="830997"/>
             </a:xfrm>
             <a:prstGeom prst="rect">
               <a:avLst/>
             </a:prstGeom>
             <a:noFill/>
           </p:spPr>
-        </p:pic>
-        <p:pic>
-          <p:nvPicPr>
-            <p:cNvPr id="40" name="Grafik 64"/>
-            <p:cNvPicPr>
-              <a:picLocks noChangeAspect="1"/>
-            </p:cNvPicPr>
+          <p:txBody>
+            <a:bodyPr wrap="square" rtlCol="0">
+              <a:spAutoFit/>
+            </a:bodyPr>
+            <a:lstStyle/>
+            <a:p>
+              <a:pPr algn="ctr"/>
+              <a:r>
+                <a:rPr lang="en-GB" sz="2400" dirty="0"/>
+                <a:t>No Wikipedia lookups!</a:t>
+              </a:r>
+              <a:endParaRPr lang="de-DE" sz="2400" dirty="0"/>
+            </a:p>
+          </p:txBody>
+        </p:sp>
+        <p:grpSp>
+          <p:nvGrpSpPr>
+            <p:cNvPr id="2053" name="Group 2052"/>
+            <p:cNvGrpSpPr/>
             <p:nvPr/>
-          </p:nvPicPr>
-          <p:blipFill rotWithShape="1">
-            <a:blip r:embed="rId18" cstate="print">
+          </p:nvGrpSpPr>
+          <p:grpSpPr>
+            <a:xfrm>
+              <a:off x="8534427" y="2356896"/>
+              <a:ext cx="2539945" cy="2239927"/>
+              <a:chOff x="8534427" y="2509296"/>
+              <a:chExt cx="2539945" cy="2239927"/>
+            </a:xfrm>
+          </p:grpSpPr>
+          <p:pic>
+            <p:nvPicPr>
+              <p:cNvPr id="2070" name="Picture 22" descr="https://upload.wikimedia.org/wikipedia/commons/thumb/d/de/Wikipedia_Logo_1.0.png/220px-Wikipedia_Logo_1.0.png"/>
+              <p:cNvPicPr>
+                <a:picLocks noChangeAspect="1" noChangeArrowheads="1"/>
+              </p:cNvPicPr>
+              <p:nvPr/>
+            </p:nvPicPr>
+            <p:blipFill>
+              <a:blip r:embed="rId6">
+                <a:extLst>
+                  <a:ext uri="{28A0092B-C50C-407E-A947-70E740481C1C}">
+                    <a14:useLocalDpi xmlns:a14="http://schemas.microsoft.com/office/drawing/2010/main" val="0"/>
+                  </a:ext>
+                </a:extLst>
+              </a:blip>
+              <a:srcRect/>
+              <a:stretch>
+                <a:fillRect/>
+              </a:stretch>
+            </p:blipFill>
+            <p:spPr bwMode="auto">
+              <a:xfrm>
+                <a:off x="9017210" y="2887198"/>
+                <a:ext cx="1574380" cy="1574381"/>
+              </a:xfrm>
+              <a:prstGeom prst="rect">
+                <a:avLst/>
+              </a:prstGeom>
+              <a:noFill/>
               <a:extLst>
-                <a:ext uri="{28A0092B-C50C-407E-A947-70E740481C1C}">
-                  <a14:useLocalDpi xmlns:a14="http://schemas.microsoft.com/office/drawing/2010/main" val="0"/>
+                <a:ext uri="{909E8E84-426E-40DD-AFC4-6F175D3DCCD1}">
+                  <a14:hiddenFill xmlns:a14="http://schemas.microsoft.com/office/drawing/2010/main">
+                    <a:solidFill>
+                      <a:srgbClr val="FFFFFF"/>
+                    </a:solidFill>
+                  </a14:hiddenFill>
                 </a:ext>
               </a:extLst>
-            </a:blip>
-            <a:srcRect l="20002" t="30011" r="18445" b="12840"/>
-            <a:stretch/>
-          </p:blipFill>
+            </p:spPr>
+          </p:pic>
+          <p:sp>
+            <p:nvSpPr>
+              <p:cNvPr id="2052" name="Multiply 2051"/>
+              <p:cNvSpPr/>
+              <p:nvPr/>
+            </p:nvSpPr>
+            <p:spPr>
+              <a:xfrm>
+                <a:off x="8534427" y="2509296"/>
+                <a:ext cx="2539945" cy="2239927"/>
+              </a:xfrm>
+              <a:prstGeom prst="mathMultiply">
+                <a:avLst>
+                  <a:gd name="adj1" fmla="val 8349"/>
+                </a:avLst>
+              </a:prstGeom>
+              <a:solidFill>
+                <a:srgbClr val="FF0000"/>
+              </a:solidFill>
+            </p:spPr>
+            <p:style>
+              <a:lnRef idx="2">
+                <a:schemeClr val="accent1">
+                  <a:shade val="50000"/>
+                </a:schemeClr>
+              </a:lnRef>
+              <a:fillRef idx="1">
+                <a:schemeClr val="accent1"/>
+              </a:fillRef>
+              <a:effectRef idx="0">
+                <a:schemeClr val="accent1"/>
+              </a:effectRef>
+              <a:fontRef idx="minor">
+                <a:schemeClr val="lt1"/>
+              </a:fontRef>
+            </p:style>
+            <p:txBody>
+              <a:bodyPr rtlCol="0" anchor="ctr"/>
+              <a:lstStyle/>
+              <a:p>
+                <a:pPr algn="ctr"/>
+                <a:endParaRPr lang="de-DE"/>
+              </a:p>
+            </p:txBody>
+          </p:sp>
+        </p:grpSp>
+      </p:grpSp>
+      <p:grpSp>
+        <p:nvGrpSpPr>
+          <p:cNvPr id="5" name="Group 4"/>
+          <p:cNvGrpSpPr/>
+          <p:nvPr/>
+        </p:nvGrpSpPr>
+        <p:grpSpPr>
+          <a:xfrm>
+            <a:off x="5881623" y="2990159"/>
+            <a:ext cx="2611099" cy="3110752"/>
+            <a:chOff x="5881623" y="2990159"/>
+            <a:chExt cx="2611099" cy="3110752"/>
+          </a:xfrm>
+        </p:grpSpPr>
+        <p:sp>
+          <p:nvSpPr>
+            <p:cNvPr id="43" name="TextBox 42"/>
+            <p:cNvSpPr txBox="1"/>
+            <p:nvPr/>
+          </p:nvSpPr>
           <p:spPr>
             <a:xfrm>
-              <a:off x="7088465" y="4834081"/>
-              <a:ext cx="527905" cy="490126"/>
+              <a:off x="5881623" y="4531251"/>
+              <a:ext cx="2611099" cy="1569660"/>
             </a:xfrm>
             <a:prstGeom prst="rect">
               <a:avLst/>
             </a:prstGeom>
+            <a:noFill/>
           </p:spPr>
-        </p:pic>
+          <p:txBody>
+            <a:bodyPr wrap="square" rtlCol="0">
+              <a:spAutoFit/>
+            </a:bodyPr>
+            <a:lstStyle/>
+            <a:p>
+              <a:r>
+                <a:rPr lang="en-GB" sz="2400" dirty="0"/>
+                <a:t>Shows</a:t>
+              </a:r>
+            </a:p>
+            <a:p>
+              <a:pPr marL="457200" indent="-457200">
+                <a:buFont typeface="+mj-lt"/>
+                <a:buAutoNum type="arabicPeriod"/>
+              </a:pPr>
+              <a:r>
+                <a:rPr lang="en-GB" sz="2400" dirty="0"/>
+                <a:t>Named entities</a:t>
+              </a:r>
+            </a:p>
+            <a:p>
+              <a:pPr marL="457200" indent="-457200">
+                <a:buFont typeface="+mj-lt"/>
+                <a:buAutoNum type="arabicPeriod"/>
+              </a:pPr>
+              <a:r>
+                <a:rPr lang="en-GB" sz="2400" dirty="0" smtClean="0"/>
+                <a:t>Properties</a:t>
+              </a:r>
+            </a:p>
+            <a:p>
+              <a:pPr marL="457200" indent="-457200">
+                <a:buFont typeface="+mj-lt"/>
+                <a:buAutoNum type="arabicPeriod"/>
+              </a:pPr>
+              <a:r>
+                <a:rPr lang="en-GB" sz="2400" dirty="0" smtClean="0"/>
+                <a:t>Connections</a:t>
+              </a:r>
+              <a:endParaRPr lang="de-DE" sz="2400" dirty="0"/>
+            </a:p>
+          </p:txBody>
+        </p:sp>
+        <p:grpSp>
+          <p:nvGrpSpPr>
+            <p:cNvPr id="29" name="Gruppieren 54"/>
+            <p:cNvGrpSpPr/>
+            <p:nvPr/>
+          </p:nvGrpSpPr>
+          <p:grpSpPr>
+            <a:xfrm>
+              <a:off x="6168303" y="2990159"/>
+              <a:ext cx="2037738" cy="1086565"/>
+              <a:chOff x="5932289" y="4834081"/>
+              <a:chExt cx="1684081" cy="897987"/>
+            </a:xfrm>
+          </p:grpSpPr>
+          <p:pic>
+            <p:nvPicPr>
+              <p:cNvPr id="33" name="Grafik 61" descr="Netzwerk"/>
+              <p:cNvPicPr>
+                <a:picLocks noChangeAspect="1"/>
+              </p:cNvPicPr>
+              <p:nvPr/>
+            </p:nvPicPr>
+            <p:blipFill>
+              <a:blip r:embed="rId7" cstate="print">
+                <a:extLst>
+                  <a:ext uri="{28A0092B-C50C-407E-A947-70E740481C1C}">
+                    <a14:useLocalDpi xmlns:a14="http://schemas.microsoft.com/office/drawing/2010/main" val="0"/>
+                  </a:ext>
+                  <a:ext uri="{96DAC541-7B7A-43D3-8B79-37D633B846F1}">
+                    <asvg:svgBlip xmlns="" xmlns:asvg="http://schemas.microsoft.com/office/drawing/2016/SVG/main" r:embed="rId13"/>
+                  </a:ext>
+                </a:extLst>
+              </a:blip>
+              <a:stretch>
+                <a:fillRect/>
+              </a:stretch>
+            </p:blipFill>
+            <p:spPr>
+              <a:xfrm rot="20111766">
+                <a:off x="6274967" y="4985804"/>
+                <a:ext cx="746264" cy="746264"/>
+              </a:xfrm>
+              <a:prstGeom prst="rect">
+                <a:avLst/>
+              </a:prstGeom>
+            </p:spPr>
+          </p:pic>
+          <p:pic>
+            <p:nvPicPr>
+              <p:cNvPr id="34" name="Grafik 62" descr="Benutzer"/>
+              <p:cNvPicPr>
+                <a:picLocks noChangeAspect="1"/>
+              </p:cNvPicPr>
+              <p:nvPr/>
+            </p:nvPicPr>
+            <p:blipFill>
+              <a:blip r:embed="rId14" cstate="print">
+                <a:extLst>
+                  <a:ext uri="{28A0092B-C50C-407E-A947-70E740481C1C}">
+                    <a14:useLocalDpi xmlns:a14="http://schemas.microsoft.com/office/drawing/2010/main" val="0"/>
+                  </a:ext>
+                  <a:ext uri="{96DAC541-7B7A-43D3-8B79-37D633B846F1}">
+                    <asvg:svgBlip xmlns="" xmlns:asvg="http://schemas.microsoft.com/office/drawing/2016/SVG/main" r:embed="rId15"/>
+                  </a:ext>
+                </a:extLst>
+              </a:blip>
+              <a:stretch>
+                <a:fillRect/>
+              </a:stretch>
+            </p:blipFill>
+            <p:spPr>
+              <a:xfrm>
+                <a:off x="6662206" y="4862427"/>
+                <a:ext cx="505454" cy="505454"/>
+              </a:xfrm>
+              <a:prstGeom prst="rect">
+                <a:avLst/>
+              </a:prstGeom>
+            </p:spPr>
+          </p:pic>
+          <p:pic>
+            <p:nvPicPr>
+              <p:cNvPr id="39" name="Picture 4" descr="City hall building Free Icon"/>
+              <p:cNvPicPr>
+                <a:picLocks noChangeAspect="1" noChangeArrowheads="1"/>
+              </p:cNvPicPr>
+              <p:nvPr/>
+            </p:nvPicPr>
+            <p:blipFill>
+              <a:blip r:embed="rId16" cstate="print">
+                <a:extLst>
+                  <a:ext uri="{BEBA8EAE-BF5A-486C-A8C5-ECC9F3942E4B}">
+                    <a14:imgProps xmlns:a14="http://schemas.microsoft.com/office/drawing/2010/main">
+                      <a14:imgLayer r:embed="rId17">
+                        <a14:imgEffect>
+                          <a14:backgroundRemoval t="9425" b="94089" l="0" r="100000">
+                            <a14:foregroundMark x1="5272" y1="63419" x2="5272" y2="63419"/>
+                            <a14:foregroundMark x1="40096" y1="85144" x2="40096" y2="85144"/>
+                            <a14:foregroundMark x1="87700" y1="79233" x2="87700" y2="79233"/>
+                          </a14:backgroundRemoval>
+                        </a14:imgEffect>
+                      </a14:imgLayer>
+                    </a14:imgProps>
+                  </a:ext>
+                  <a:ext uri="{28A0092B-C50C-407E-A947-70E740481C1C}">
+                    <a14:useLocalDpi xmlns:a14="http://schemas.microsoft.com/office/drawing/2010/main" val="0"/>
+                  </a:ext>
+                </a:extLst>
+              </a:blip>
+              <a:srcRect/>
+              <a:stretch>
+                <a:fillRect/>
+              </a:stretch>
+            </p:blipFill>
+            <p:spPr bwMode="auto">
+              <a:xfrm>
+                <a:off x="5932289" y="4987924"/>
+                <a:ext cx="554235" cy="554235"/>
+              </a:xfrm>
+              <a:prstGeom prst="rect">
+                <a:avLst/>
+              </a:prstGeom>
+              <a:noFill/>
+            </p:spPr>
+          </p:pic>
+          <p:pic>
+            <p:nvPicPr>
+              <p:cNvPr id="40" name="Grafik 64"/>
+              <p:cNvPicPr>
+                <a:picLocks noChangeAspect="1"/>
+              </p:cNvPicPr>
+              <p:nvPr/>
+            </p:nvPicPr>
+            <p:blipFill rotWithShape="1">
+              <a:blip r:embed="rId18" cstate="print">
+                <a:extLst>
+                  <a:ext uri="{28A0092B-C50C-407E-A947-70E740481C1C}">
+                    <a14:useLocalDpi xmlns:a14="http://schemas.microsoft.com/office/drawing/2010/main" val="0"/>
+                  </a:ext>
+                </a:extLst>
+              </a:blip>
+              <a:srcRect l="20002" t="30011" r="18445" b="12840"/>
+              <a:stretch/>
+            </p:blipFill>
+            <p:spPr>
+              <a:xfrm>
+                <a:off x="7088465" y="4834081"/>
+                <a:ext cx="527905" cy="490126"/>
+              </a:xfrm>
+              <a:prstGeom prst="rect">
+                <a:avLst/>
+              </a:prstGeom>
+            </p:spPr>
+          </p:pic>
+        </p:grpSp>
       </p:grpSp>
     </p:spTree>
     <p:extLst>
@@ -18657,7 +19166,165 @@
   <p:timing>
     <p:tnLst>
       <p:par>
-        <p:cTn id="1" dur="indefinite" restart="never" nodeType="tmRoot"/>
+        <p:cTn id="1" dur="indefinite" restart="never" nodeType="tmRoot">
+          <p:childTnLst>
+            <p:seq concurrent="1" nextAc="seek">
+              <p:cTn id="2" dur="indefinite" nodeType="mainSeq">
+                <p:childTnLst>
+                  <p:par>
+                    <p:cTn id="3" fill="hold">
+                      <p:stCondLst>
+                        <p:cond delay="indefinite"/>
+                      </p:stCondLst>
+                      <p:childTnLst>
+                        <p:par>
+                          <p:cTn id="4" fill="hold">
+                            <p:stCondLst>
+                              <p:cond delay="0"/>
+                            </p:stCondLst>
+                            <p:childTnLst>
+                              <p:par>
+                                <p:cTn id="5" presetID="1" presetClass="entr" presetSubtype="0" fill="hold" nodeType="clickEffect">
+                                  <p:stCondLst>
+                                    <p:cond delay="0"/>
+                                  </p:stCondLst>
+                                  <p:childTnLst>
+                                    <p:set>
+                                      <p:cBhvr>
+                                        <p:cTn id="6" dur="1" fill="hold">
+                                          <p:stCondLst>
+                                            <p:cond delay="0"/>
+                                          </p:stCondLst>
+                                        </p:cTn>
+                                        <p:tgtEl>
+                                          <p:spTgt spid="3"/>
+                                        </p:tgtEl>
+                                        <p:attrNameLst>
+                                          <p:attrName>style.visibility</p:attrName>
+                                        </p:attrNameLst>
+                                      </p:cBhvr>
+                                      <p:to>
+                                        <p:strVal val="visible"/>
+                                      </p:to>
+                                    </p:set>
+                                  </p:childTnLst>
+                                </p:cTn>
+                              </p:par>
+                            </p:childTnLst>
+                          </p:cTn>
+                        </p:par>
+                      </p:childTnLst>
+                    </p:cTn>
+                  </p:par>
+                  <p:par>
+                    <p:cTn id="7" fill="hold">
+                      <p:stCondLst>
+                        <p:cond delay="indefinite"/>
+                      </p:stCondLst>
+                      <p:childTnLst>
+                        <p:par>
+                          <p:cTn id="8" fill="hold">
+                            <p:stCondLst>
+                              <p:cond delay="0"/>
+                            </p:stCondLst>
+                            <p:childTnLst>
+                              <p:par>
+                                <p:cTn id="9" presetID="1" presetClass="entr" presetSubtype="0" fill="hold" nodeType="clickEffect">
+                                  <p:stCondLst>
+                                    <p:cond delay="0"/>
+                                  </p:stCondLst>
+                                  <p:childTnLst>
+                                    <p:set>
+                                      <p:cBhvr>
+                                        <p:cTn id="10" dur="1" fill="hold">
+                                          <p:stCondLst>
+                                            <p:cond delay="0"/>
+                                          </p:stCondLst>
+                                        </p:cTn>
+                                        <p:tgtEl>
+                                          <p:spTgt spid="5"/>
+                                        </p:tgtEl>
+                                        <p:attrNameLst>
+                                          <p:attrName>style.visibility</p:attrName>
+                                        </p:attrNameLst>
+                                      </p:cBhvr>
+                                      <p:to>
+                                        <p:strVal val="visible"/>
+                                      </p:to>
+                                    </p:set>
+                                  </p:childTnLst>
+                                </p:cTn>
+                              </p:par>
+                            </p:childTnLst>
+                          </p:cTn>
+                        </p:par>
+                      </p:childTnLst>
+                    </p:cTn>
+                  </p:par>
+                  <p:par>
+                    <p:cTn id="11" fill="hold">
+                      <p:stCondLst>
+                        <p:cond delay="indefinite"/>
+                      </p:stCondLst>
+                      <p:childTnLst>
+                        <p:par>
+                          <p:cTn id="12" fill="hold">
+                            <p:stCondLst>
+                              <p:cond delay="0"/>
+                            </p:stCondLst>
+                            <p:childTnLst>
+                              <p:par>
+                                <p:cTn id="13" presetID="1" presetClass="entr" presetSubtype="0" fill="hold" nodeType="clickEffect">
+                                  <p:stCondLst>
+                                    <p:cond delay="0"/>
+                                  </p:stCondLst>
+                                  <p:childTnLst>
+                                    <p:set>
+                                      <p:cBhvr>
+                                        <p:cTn id="14" dur="1" fill="hold">
+                                          <p:stCondLst>
+                                            <p:cond delay="0"/>
+                                          </p:stCondLst>
+                                        </p:cTn>
+                                        <p:tgtEl>
+                                          <p:spTgt spid="6"/>
+                                        </p:tgtEl>
+                                        <p:attrNameLst>
+                                          <p:attrName>style.visibility</p:attrName>
+                                        </p:attrNameLst>
+                                      </p:cBhvr>
+                                      <p:to>
+                                        <p:strVal val="visible"/>
+                                      </p:to>
+                                    </p:set>
+                                  </p:childTnLst>
+                                </p:cTn>
+                              </p:par>
+                            </p:childTnLst>
+                          </p:cTn>
+                        </p:par>
+                      </p:childTnLst>
+                    </p:cTn>
+                  </p:par>
+                </p:childTnLst>
+              </p:cTn>
+              <p:prevCondLst>
+                <p:cond evt="onPrev" delay="0">
+                  <p:tgtEl>
+                    <p:sldTgt/>
+                  </p:tgtEl>
+                </p:cond>
+              </p:prevCondLst>
+              <p:nextCondLst>
+                <p:cond evt="onNext" delay="0">
+                  <p:tgtEl>
+                    <p:sldTgt/>
+                  </p:tgtEl>
+                </p:cond>
+              </p:nextCondLst>
+            </p:seq>
+          </p:childTnLst>
+        </p:cTn>
       </p:par>
     </p:tnLst>
   </p:timing>
@@ -18683,43 +19350,30 @@
       </p:grpSpPr>
       <p:sp>
         <p:nvSpPr>
-          <p:cNvPr id="2" name="Title 1"/>
+          <p:cNvPr id="5" name="Title 4"/>
           <p:cNvSpPr>
             <a:spLocks noGrp="1"/>
           </p:cNvSpPr>
           <p:nvPr>
-            <p:ph type="title"/>
+            <p:ph type="ctrTitle"/>
           </p:nvPr>
         </p:nvSpPr>
-        <p:spPr/>
+        <p:spPr>
+          <a:xfrm>
+            <a:off x="1687430" y="2098525"/>
+            <a:ext cx="8574622" cy="2616199"/>
+          </a:xfrm>
+        </p:spPr>
         <p:txBody>
-          <a:bodyPr/>
+          <a:bodyPr anchor="ctr"/>
           <a:lstStyle/>
           <a:p>
-            <a:r>
-              <a:rPr lang="en-GB" dirty="0"/>
-              <a:t>Backup</a:t>
+            <a:pPr algn="ctr"/>
+            <a:r>
+              <a:rPr lang="en-GB" dirty="0" smtClean="0"/>
+              <a:t>Thanks!</a:t>
             </a:r>
             <a:endParaRPr lang="de-DE" dirty="0"/>
-          </a:p>
-        </p:txBody>
-      </p:sp>
-      <p:sp>
-        <p:nvSpPr>
-          <p:cNvPr id="3" name="Content Placeholder 2"/>
-          <p:cNvSpPr>
-            <a:spLocks noGrp="1"/>
-          </p:cNvSpPr>
-          <p:nvPr>
-            <p:ph idx="1"/>
-          </p:nvPr>
-        </p:nvSpPr>
-        <p:spPr/>
-        <p:txBody>
-          <a:bodyPr/>
-          <a:lstStyle/>
-          <a:p>
-            <a:endParaRPr lang="de-DE"/>
           </a:p>
         </p:txBody>
       </p:sp>
@@ -18750,13 +19404,20 @@
     </p:spTree>
     <p:extLst>
       <p:ext uri="{BB962C8B-B14F-4D97-AF65-F5344CB8AC3E}">
-        <p14:creationId xmlns:p14="http://schemas.microsoft.com/office/powerpoint/2010/main" val="333537589"/>
+        <p14:creationId xmlns:p14="http://schemas.microsoft.com/office/powerpoint/2010/main" val="4227077605"/>
       </p:ext>
     </p:extLst>
   </p:cSld>
   <p:clrMapOvr>
     <a:masterClrMapping/>
   </p:clrMapOvr>
+  <p:timing>
+    <p:tnLst>
+      <p:par>
+        <p:cTn id="1" dur="indefinite" restart="never" nodeType="tmRoot"/>
+      </p:par>
+    </p:tnLst>
+  </p:timing>
 </p:sld>
 </file>
 
@@ -19010,7 +19671,7 @@
   <a:extraClrSchemeLst/>
   <a:extLst>
     <a:ext uri="{05A4C25C-085E-4340-85A3-A5531E510DB2}">
-      <thm15:themeFamily xmlns:thm15="http://schemas.microsoft.com/office/thememl/2012/main" xmlns="" name="Parallax" id="{3388167B-A2EB-4685-9635-1831D9AEF8C4}" vid="{4F7A876A-7598-49CA-AFC8-8EDA2551E4A7}"/>
+      <thm15:themeFamily xmlns:thm15="http://schemas.microsoft.com/office/thememl/2012/main" name="Parallax" id="{3388167B-A2EB-4685-9635-1831D9AEF8C4}" vid="{4F7A876A-7598-49CA-AFC8-8EDA2551E4A7}"/>
     </a:ext>
   </a:extLst>
 </a:theme>
@@ -19271,7 +19932,7 @@
   <a:extraClrSchemeLst/>
   <a:extLst>
     <a:ext uri="{05A4C25C-085E-4340-85A3-A5531E510DB2}">
-      <thm15:themeFamily xmlns:thm15="http://schemas.microsoft.com/office/thememl/2012/main" xmlns="" name="Office Theme" id="{62F939B6-93AF-4DB8-9C6B-D6C7DFDC589F}" vid="{4A3C46E8-61CC-4603-A589-7422A47A8E4A}"/>
+      <thm15:themeFamily xmlns:thm15="http://schemas.microsoft.com/office/thememl/2012/main" name="Office Theme" id="{62F939B6-93AF-4DB8-9C6B-D6C7DFDC589F}" vid="{4A3C46E8-61CC-4603-A589-7422A47A8E4A}"/>
     </a:ext>
   </a:extLst>
 </a:theme>

</xml_diff>